<commit_message>
#10 [Snake] SnakeGame::MoveStraight() 구현 , 뱀 함수 추가(Snake::GetNextPosiiton())
</commit_message>
<xml_diff>
--- a/참고문서/뱀_UML_20170626.pptx
+++ b/참고문서/뱀_UML_20170626.pptx
@@ -5928,7 +5928,7 @@
           <p:nvPr>
             <p:extLst>
               <p:ext uri="{D42A27DB-BD31-4B8C-83A1-F6EECF244321}">
-                <p14:modId xmlns:p14="http://schemas.microsoft.com/office/powerpoint/2010/main" val="3516034298"/>
+                <p14:modId xmlns:p14="http://schemas.microsoft.com/office/powerpoint/2010/main" val="4284734846"/>
               </p:ext>
             </p:extLst>
           </p:nvPr>
@@ -7060,16 +7060,13 @@
                       </a:pPr>
                       <a:r>
                         <a:rPr lang="en-US" altLang="ko-KR" sz="1200" baseline="0" dirty="0" smtClean="0"/>
-                        <a:t>+ </a:t>
-                      </a:r>
-                      <a:r>
-                        <a:rPr lang="en-US" altLang="ko-KR" sz="1200" baseline="0" dirty="0" err="1" smtClean="0"/>
-                        <a:t>bool</a:t>
-                      </a:r>
-                      <a:r>
-                        <a:rPr lang="en-US" altLang="ko-KR" sz="1200" baseline="0" dirty="0" smtClean="0"/>
-                        <a:t> Move();</a:t>
-                      </a:r>
+                        <a:t>+ bool </a:t>
+                      </a:r>
+                      <a:r>
+                        <a:rPr lang="en-US" altLang="ko-KR" sz="1200" baseline="0" dirty="0" smtClean="0"/>
+                        <a:t>Move();</a:t>
+                      </a:r>
+                      <a:endParaRPr lang="en-US" altLang="ko-KR" sz="1200" baseline="0" dirty="0" smtClean="0"/>
                     </a:p>
                     <a:p>
                       <a:pPr marL="0" marR="0" indent="0" algn="l" defTabSz="914400" rtl="0" eaLnBrk="1" fontAlgn="auto" latinLnBrk="1" hangingPunct="1">
@@ -7106,15 +7103,11 @@
                       <a:pPr latinLnBrk="1"/>
                       <a:r>
                         <a:rPr lang="en-US" altLang="ko-KR" sz="1200" baseline="0" dirty="0" smtClean="0"/>
-                        <a:t>-&gt; </a:t>
-                      </a:r>
-                      <a:r>
-                        <a:rPr lang="en-US" altLang="ko-KR" sz="1200" baseline="0" dirty="0" err="1" smtClean="0"/>
-                        <a:t>bool</a:t>
-                      </a:r>
-                      <a:r>
-                        <a:rPr lang="en-US" altLang="ko-KR" sz="1200" baseline="0" dirty="0" smtClean="0"/>
-                        <a:t> ret1 = </a:t>
+                        <a:t>-&gt; bool ret1 </a:t>
+                      </a:r>
+                      <a:r>
+                        <a:rPr lang="en-US" altLang="ko-KR" sz="1200" baseline="0" dirty="0" smtClean="0"/>
+                        <a:t>= </a:t>
                       </a:r>
                       <a:r>
                         <a:rPr lang="en-US" altLang="ko-KR" sz="1200" baseline="0" dirty="0" err="1" smtClean="0"/>
@@ -7129,15 +7122,7 @@
                       <a:pPr latinLnBrk="1"/>
                       <a:r>
                         <a:rPr lang="en-US" altLang="ko-KR" sz="1200" baseline="0" dirty="0" smtClean="0"/>
-                        <a:t>-&gt; </a:t>
-                      </a:r>
-                      <a:r>
-                        <a:rPr lang="en-US" altLang="ko-KR" sz="1200" baseline="0" dirty="0" err="1" smtClean="0"/>
-                        <a:t>bool</a:t>
-                      </a:r>
-                      <a:r>
-                        <a:rPr lang="en-US" altLang="ko-KR" sz="1200" baseline="0" dirty="0" smtClean="0"/>
-                        <a:t> ret2 = </a:t>
+                        <a:t>-&gt; bool ret2 = </a:t>
                       </a:r>
                       <a:r>
                         <a:rPr lang="en-US" altLang="ko-KR" sz="1200" baseline="0" dirty="0" err="1" smtClean="0"/>
@@ -7164,11 +7149,7 @@
                       <a:pPr latinLnBrk="1"/>
                       <a:r>
                         <a:rPr lang="en-US" altLang="ko-KR" sz="1200" baseline="0" dirty="0" smtClean="0"/>
-                        <a:t>-&gt; !ret1 ||!</a:t>
-                      </a:r>
-                      <a:r>
-                        <a:rPr lang="en-US" altLang="ko-KR" sz="1200" baseline="0" smtClean="0"/>
-                        <a:t>ret2 return false </a:t>
+                        <a:t>-&gt; !ret1 ||!ret2 return false </a:t>
                       </a:r>
                       <a:endParaRPr lang="en-US" altLang="ko-KR" sz="1200" baseline="0" dirty="0" smtClean="0"/>
                     </a:p>
@@ -7375,7 +7356,7 @@
           <p:nvPr>
             <p:extLst>
               <p:ext uri="{D42A27DB-BD31-4B8C-83A1-F6EECF244321}">
-                <p14:modId xmlns:p14="http://schemas.microsoft.com/office/powerpoint/2010/main" val="3477165016"/>
+                <p14:modId xmlns:p14="http://schemas.microsoft.com/office/powerpoint/2010/main" val="1424018044"/>
               </p:ext>
             </p:extLst>
           </p:nvPr>
@@ -7623,9 +7604,42 @@
                     </a:p>
                     <a:p>
                       <a:pPr latinLnBrk="1"/>
-                      <a:endParaRPr lang="en-US" altLang="ko-KR" sz="1100" kern="1200" baseline="0" dirty="0" smtClean="0">
+                      <a:r>
+                        <a:rPr lang="en-US" altLang="ko-KR" sz="1100" b="1" kern="1200" baseline="0" dirty="0" smtClean="0">
+                          <a:solidFill>
+                            <a:srgbClr val="7030A0"/>
+                          </a:solidFill>
+                          <a:latin typeface="+mn-lt"/>
+                          <a:ea typeface="+mn-ea"/>
+                          <a:cs typeface="+mn-cs"/>
+                        </a:rPr>
+                        <a:t>+ Point </a:t>
+                      </a:r>
+                      <a:r>
+                        <a:rPr lang="en-US" altLang="ko-KR" sz="1100" b="1" kern="1200" baseline="0" dirty="0" err="1" smtClean="0">
+                          <a:solidFill>
+                            <a:srgbClr val="7030A0"/>
+                          </a:solidFill>
+                          <a:latin typeface="+mn-lt"/>
+                          <a:ea typeface="+mn-ea"/>
+                          <a:cs typeface="+mn-cs"/>
+                        </a:rPr>
+                        <a:t>GetNextPosition</a:t>
+                      </a:r>
+                      <a:r>
+                        <a:rPr lang="en-US" altLang="ko-KR" sz="1100" b="1" kern="1200" baseline="0" dirty="0" smtClean="0">
+                          <a:solidFill>
+                            <a:srgbClr val="7030A0"/>
+                          </a:solidFill>
+                          <a:latin typeface="+mn-lt"/>
+                          <a:ea typeface="+mn-ea"/>
+                          <a:cs typeface="+mn-cs"/>
+                        </a:rPr>
+                        <a:t>();</a:t>
+                      </a:r>
+                      <a:endParaRPr lang="en-US" altLang="ko-KR" sz="1100" b="1" kern="1200" baseline="0" dirty="0" smtClean="0">
                         <a:solidFill>
-                          <a:schemeClr val="dk1"/>
+                          <a:srgbClr val="7030A0"/>
                         </a:solidFill>
                         <a:latin typeface="+mn-lt"/>
                         <a:ea typeface="+mn-ea"/>
@@ -8086,7 +8100,6 @@
                         <a:rPr lang="en-US" altLang="ko-KR" sz="1100" baseline="0" dirty="0" smtClean="0"/>
                         <a:t>();</a:t>
                       </a:r>
-                      <a:endParaRPr lang="en-US" altLang="ko-KR" sz="1100" baseline="0" dirty="0" smtClean="0"/>
                     </a:p>
                   </a:txBody>
                   <a:tcPr/>
@@ -8282,11 +8295,7 @@
                       </a:r>
                       <a:r>
                         <a:rPr lang="en-US" altLang="ko-KR" sz="1100" baseline="0" dirty="0" smtClean="0"/>
-                        <a:t> y</a:t>
-                      </a:r>
-                      <a:r>
-                        <a:rPr lang="en-US" altLang="ko-KR" sz="1100" baseline="0" dirty="0" smtClean="0"/>
-                        <a:t>);</a:t>
+                        <a:t> y);</a:t>
                       </a:r>
                     </a:p>
                     <a:p>
@@ -8374,11 +8383,7 @@
                       </a:r>
                       <a:r>
                         <a:rPr lang="en-US" altLang="ko-KR" sz="1100" baseline="0" dirty="0" smtClean="0"/>
-                        <a:t> </a:t>
-                      </a:r>
-                      <a:r>
-                        <a:rPr lang="en-US" altLang="ko-KR" sz="1100" baseline="0" dirty="0" smtClean="0"/>
-                        <a:t>x, </a:t>
+                        <a:t> x, </a:t>
                       </a:r>
                       <a:r>
                         <a:rPr lang="en-US" altLang="ko-KR" sz="1100" b="1" baseline="0" dirty="0" err="1" smtClean="0">
@@ -8428,7 +8433,6 @@
                         <a:rPr lang="en-US" altLang="ko-KR" sz="1100" baseline="0" dirty="0" smtClean="0"/>
                         <a:t>);</a:t>
                       </a:r>
-                      <a:endParaRPr lang="en-US" altLang="ko-KR" sz="1100" baseline="0" dirty="0" smtClean="0"/>
                     </a:p>
                     <a:p>
                       <a:pPr latinLnBrk="1"/>
@@ -8474,11 +8478,7 @@
                       </a:r>
                       <a:r>
                         <a:rPr lang="en-US" altLang="ko-KR" sz="1100" baseline="0" dirty="0" smtClean="0"/>
-                        <a:t> </a:t>
-                      </a:r>
-                      <a:r>
-                        <a:rPr lang="en-US" altLang="ko-KR" sz="1100" baseline="0" dirty="0" smtClean="0"/>
-                        <a:t>x, </a:t>
+                        <a:t> x, </a:t>
                       </a:r>
                       <a:r>
                         <a:rPr lang="en-US" altLang="ko-KR" sz="1100" b="1" baseline="0" dirty="0" err="1" smtClean="0">
@@ -8498,11 +8498,7 @@
                       </a:r>
                       <a:r>
                         <a:rPr lang="en-US" altLang="ko-KR" sz="1100" baseline="0" dirty="0" smtClean="0"/>
-                        <a:t> </a:t>
-                      </a:r>
-                      <a:r>
-                        <a:rPr lang="en-US" altLang="ko-KR" sz="1100" baseline="0" dirty="0" smtClean="0"/>
-                        <a:t>y);</a:t>
+                        <a:t> y);</a:t>
                       </a:r>
                     </a:p>
                     <a:p>
@@ -8537,11 +8533,7 @@
                       </a:r>
                       <a:r>
                         <a:rPr lang="en-US" altLang="ko-KR" sz="1100" baseline="0" dirty="0" smtClean="0"/>
-                        <a:t> </a:t>
-                      </a:r>
-                      <a:r>
-                        <a:rPr lang="en-US" altLang="ko-KR" sz="1100" baseline="0" dirty="0" smtClean="0"/>
-                        <a:t>x, </a:t>
+                        <a:t> x, </a:t>
                       </a:r>
                       <a:r>
                         <a:rPr lang="en-US" altLang="ko-KR" sz="1100" b="1" baseline="0" dirty="0" err="1" smtClean="0">
@@ -8561,15 +8553,7 @@
                       </a:r>
                       <a:r>
                         <a:rPr lang="en-US" altLang="ko-KR" sz="1100" baseline="0" dirty="0" smtClean="0"/>
-                        <a:t> </a:t>
-                      </a:r>
-                      <a:r>
-                        <a:rPr lang="en-US" altLang="ko-KR" sz="1100" baseline="0" dirty="0" smtClean="0"/>
-                        <a:t>y</a:t>
-                      </a:r>
-                      <a:r>
-                        <a:rPr lang="en-US" altLang="ko-KR" sz="1100" baseline="0" dirty="0" smtClean="0"/>
-                        <a:t>) </a:t>
+                        <a:t> y) </a:t>
                       </a:r>
                       <a:r>
                         <a:rPr lang="en-US" altLang="ko-KR" sz="1100" b="1" baseline="0" dirty="0" err="1" smtClean="0">
@@ -8614,7 +8598,7 @@
         </p:nvGraphicFramePr>
         <p:xfrm>
           <a:off x="469600" y="1947785"/>
-          <a:ext cx="2534461" cy="2545080"/>
+          <a:ext cx="2534461" cy="2194560"/>
         </p:xfrm>
         <a:graphic>
           <a:graphicData uri="http://schemas.openxmlformats.org/drawingml/2006/table">
@@ -8773,15 +8757,15 @@
                       </a:pPr>
                       <a:r>
                         <a:rPr lang="en-US" altLang="ko-KR" sz="1100" baseline="0" dirty="0" smtClean="0"/>
-                        <a:t>+ </a:t>
+                        <a:t>+ bool </a:t>
                       </a:r>
                       <a:r>
                         <a:rPr lang="en-US" altLang="ko-KR" sz="1100" baseline="0" dirty="0" err="1" smtClean="0"/>
-                        <a:t>bool</a:t>
+                        <a:t>MoveStraight</a:t>
                       </a:r>
                       <a:r>
                         <a:rPr lang="en-US" altLang="ko-KR" sz="1100" baseline="0" dirty="0" smtClean="0"/>
-                        <a:t> Move();</a:t>
+                        <a:t>();</a:t>
                       </a:r>
                     </a:p>
                     <a:p>
@@ -8808,6 +8792,45 @@
                       </a:r>
                       <a:r>
                         <a:rPr lang="en-US" altLang="ko-KR" sz="1100" baseline="0" dirty="0" err="1" smtClean="0"/>
+                        <a:t>destroyWall</a:t>
+                      </a:r>
+                      <a:r>
+                        <a:rPr lang="en-US" altLang="ko-KR" sz="1100" baseline="0" dirty="0" smtClean="0"/>
+                        <a:t>(Snake’s </a:t>
+                      </a:r>
+                      <a:r>
+                        <a:rPr lang="en-US" altLang="ko-KR" sz="1100" baseline="0" dirty="0" err="1" smtClean="0"/>
+                        <a:t>head.x</a:t>
+                      </a:r>
+                      <a:r>
+                        <a:rPr lang="en-US" altLang="ko-KR" sz="1100" baseline="0" dirty="0" smtClean="0"/>
+                        <a:t>, y);</a:t>
+                      </a:r>
+                    </a:p>
+                    <a:p>
+                      <a:pPr marL="0" marR="0" indent="0" algn="l" defTabSz="914400" rtl="0" eaLnBrk="1" fontAlgn="auto" latinLnBrk="1" hangingPunct="1">
+                        <a:lnSpc>
+                          <a:spcPct val="100000"/>
+                        </a:lnSpc>
+                        <a:spcBef>
+                          <a:spcPts val="0"/>
+                        </a:spcBef>
+                        <a:spcAft>
+                          <a:spcPts val="0"/>
+                        </a:spcAft>
+                        <a:buClrTx/>
+                        <a:buSzTx/>
+                        <a:buFontTx/>
+                        <a:buNone/>
+                        <a:tabLst/>
+                        <a:defRPr/>
+                      </a:pPr>
+                      <a:r>
+                        <a:rPr lang="en-US" altLang="ko-KR" sz="1100" baseline="0" dirty="0" smtClean="0"/>
+                        <a:t>-&gt; </a:t>
+                      </a:r>
+                      <a:r>
+                        <a:rPr lang="en-US" altLang="ko-KR" sz="1100" baseline="0" dirty="0" err="1" smtClean="0"/>
                         <a:t>existapple</a:t>
                       </a:r>
                       <a:r>
@@ -8819,15 +8842,7 @@
                       <a:pPr latinLnBrk="1"/>
                       <a:r>
                         <a:rPr lang="en-US" altLang="ko-KR" sz="1100" baseline="0" dirty="0" smtClean="0"/>
-                        <a:t>-&gt; </a:t>
-                      </a:r>
-                      <a:r>
-                        <a:rPr lang="en-US" altLang="ko-KR" sz="1100" baseline="0" dirty="0" err="1" smtClean="0"/>
-                        <a:t>bool</a:t>
-                      </a:r>
-                      <a:r>
-                        <a:rPr lang="en-US" altLang="ko-KR" sz="1100" baseline="0" dirty="0" smtClean="0"/>
-                        <a:t> ret1 = </a:t>
+                        <a:t>-&gt; ret1 = </a:t>
                       </a:r>
                       <a:r>
                         <a:rPr lang="en-US" altLang="ko-KR" sz="1100" baseline="0" dirty="0" err="1" smtClean="0"/>
@@ -8842,47 +8857,9 @@
                       <a:pPr latinLnBrk="1"/>
                       <a:r>
                         <a:rPr lang="en-US" altLang="ko-KR" sz="1100" baseline="0" dirty="0" smtClean="0"/>
-                        <a:t>-&gt; </a:t>
-                      </a:r>
-                      <a:r>
-                        <a:rPr lang="en-US" altLang="ko-KR" sz="1100" baseline="0" dirty="0" err="1" smtClean="0"/>
-                        <a:t>bool</a:t>
-                      </a:r>
-                      <a:r>
-                        <a:rPr lang="en-US" altLang="ko-KR" sz="1100" baseline="0" dirty="0" smtClean="0"/>
-                        <a:t> ret2 = </a:t>
-                      </a:r>
-                      <a:r>
-                        <a:rPr lang="en-US" altLang="ko-KR" sz="1100" baseline="0" dirty="0" err="1" smtClean="0"/>
-                        <a:t>destroyWall</a:t>
-                      </a:r>
-                      <a:r>
-                        <a:rPr lang="en-US" altLang="ko-KR" sz="1100" baseline="0" dirty="0" smtClean="0"/>
-                        <a:t>(Snake’s </a:t>
-                      </a:r>
-                      <a:r>
-                        <a:rPr lang="en-US" altLang="ko-KR" sz="1100" baseline="0" dirty="0" err="1" smtClean="0"/>
-                        <a:t>head.x</a:t>
-                      </a:r>
-                      <a:r>
-                        <a:rPr lang="en-US" altLang="ko-KR" sz="1100" baseline="0" dirty="0" smtClean="0"/>
-                        <a:t>, y);</a:t>
-                      </a:r>
-                    </a:p>
-                    <a:p>
-                      <a:pPr latinLnBrk="1"/>
-                      <a:endParaRPr lang="en-US" altLang="ko-KR" sz="1100" baseline="0" dirty="0" smtClean="0"/>
-                    </a:p>
-                    <a:p>
-                      <a:pPr latinLnBrk="1"/>
-                      <a:r>
-                        <a:rPr lang="en-US" altLang="ko-KR" sz="1100" baseline="0" dirty="0" smtClean="0"/>
-                        <a:t>-&gt; !ret1 ||!ret2 return false</a:t>
-                      </a:r>
-                      <a:r>
-                        <a:rPr lang="en-US" altLang="ko-KR" sz="1200" baseline="0" dirty="0" smtClean="0"/>
-                        <a:t> </a:t>
-                      </a:r>
+                        <a:t>-&gt; return ret1 </a:t>
+                      </a:r>
+                      <a:endParaRPr lang="en-US" altLang="ko-KR" sz="1200" baseline="0" dirty="0" smtClean="0"/>
                     </a:p>
                     <a:p>
                       <a:pPr latinLnBrk="1"/>
@@ -9011,7 +8988,7 @@
         <p:spPr>
           <a:xfrm>
             <a:off x="6917822" y="5104215"/>
-            <a:ext cx="4831772" cy="369332"/>
+            <a:ext cx="5293437" cy="369332"/>
           </a:xfrm>
           <a:prstGeom prst="rect">
             <a:avLst/>
@@ -9038,7 +9015,23 @@
             </a:r>
             <a:r>
               <a:rPr lang="ko-KR" altLang="en-US" dirty="0" smtClean="0"/>
-              <a:t>짜면서 수정된 사항</a:t>
+              <a:t>짜면서 </a:t>
+            </a:r>
+            <a:r>
+              <a:rPr lang="ko-KR" altLang="en-US" dirty="0" err="1" smtClean="0"/>
+              <a:t>추가</a:t>
+            </a:r>
+            <a:r>
+              <a:rPr lang="ko-KR" altLang="en-US" dirty="0" err="1" smtClean="0"/>
+              <a:t>수정된</a:t>
+            </a:r>
+            <a:r>
+              <a:rPr lang="ko-KR" altLang="en-US" dirty="0" smtClean="0"/>
+              <a:t> </a:t>
+            </a:r>
+            <a:r>
+              <a:rPr lang="ko-KR" altLang="en-US" dirty="0" smtClean="0"/>
+              <a:t>사항</a:t>
             </a:r>
             <a:r>
               <a:rPr lang="en-US" altLang="ko-KR" dirty="0" smtClean="0"/>

</xml_diff>

<commit_message>
[Snake] Score 계산/출력 기능 구현, debugging module class 분리, uml 문서 수정
</commit_message>
<xml_diff>
--- a/참고문서/뱀_UML_20170626.pptx
+++ b/참고문서/뱀_UML_20170626.pptx
@@ -9,6 +9,7 @@
     <p:sldId id="258" r:id="rId3"/>
     <p:sldId id="259" r:id="rId4"/>
     <p:sldId id="260" r:id="rId5"/>
+    <p:sldId id="261" r:id="rId6"/>
   </p:sldIdLst>
   <p:sldSz cx="12192000" cy="6858000"/>
   <p:notesSz cx="6858000" cy="9144000"/>
@@ -246,7 +247,7 @@
           <a:p>
             <a:fld id="{F521F576-3884-49B5-B31D-3C26BE7923B3}" type="datetimeFigureOut">
               <a:rPr lang="ko-KR" altLang="en-US" smtClean="0"/>
-              <a:t>2017-06-30</a:t>
+              <a:t>2017-07-19</a:t>
             </a:fld>
             <a:endParaRPr lang="ko-KR" altLang="en-US"/>
           </a:p>
@@ -416,7 +417,7 @@
           <a:p>
             <a:fld id="{F521F576-3884-49B5-B31D-3C26BE7923B3}" type="datetimeFigureOut">
               <a:rPr lang="ko-KR" altLang="en-US" smtClean="0"/>
-              <a:t>2017-06-30</a:t>
+              <a:t>2017-07-19</a:t>
             </a:fld>
             <a:endParaRPr lang="ko-KR" altLang="en-US"/>
           </a:p>
@@ -596,7 +597,7 @@
           <a:p>
             <a:fld id="{F521F576-3884-49B5-B31D-3C26BE7923B3}" type="datetimeFigureOut">
               <a:rPr lang="ko-KR" altLang="en-US" smtClean="0"/>
-              <a:t>2017-06-30</a:t>
+              <a:t>2017-07-19</a:t>
             </a:fld>
             <a:endParaRPr lang="ko-KR" altLang="en-US"/>
           </a:p>
@@ -766,7 +767,7 @@
           <a:p>
             <a:fld id="{F521F576-3884-49B5-B31D-3C26BE7923B3}" type="datetimeFigureOut">
               <a:rPr lang="ko-KR" altLang="en-US" smtClean="0"/>
-              <a:t>2017-06-30</a:t>
+              <a:t>2017-07-19</a:t>
             </a:fld>
             <a:endParaRPr lang="ko-KR" altLang="en-US"/>
           </a:p>
@@ -1012,7 +1013,7 @@
           <a:p>
             <a:fld id="{F521F576-3884-49B5-B31D-3C26BE7923B3}" type="datetimeFigureOut">
               <a:rPr lang="ko-KR" altLang="en-US" smtClean="0"/>
-              <a:t>2017-06-30</a:t>
+              <a:t>2017-07-19</a:t>
             </a:fld>
             <a:endParaRPr lang="ko-KR" altLang="en-US"/>
           </a:p>
@@ -1244,7 +1245,7 @@
           <a:p>
             <a:fld id="{F521F576-3884-49B5-B31D-3C26BE7923B3}" type="datetimeFigureOut">
               <a:rPr lang="ko-KR" altLang="en-US" smtClean="0"/>
-              <a:t>2017-06-30</a:t>
+              <a:t>2017-07-19</a:t>
             </a:fld>
             <a:endParaRPr lang="ko-KR" altLang="en-US"/>
           </a:p>
@@ -1611,7 +1612,7 @@
           <a:p>
             <a:fld id="{F521F576-3884-49B5-B31D-3C26BE7923B3}" type="datetimeFigureOut">
               <a:rPr lang="ko-KR" altLang="en-US" smtClean="0"/>
-              <a:t>2017-06-30</a:t>
+              <a:t>2017-07-19</a:t>
             </a:fld>
             <a:endParaRPr lang="ko-KR" altLang="en-US"/>
           </a:p>
@@ -1729,7 +1730,7 @@
           <a:p>
             <a:fld id="{F521F576-3884-49B5-B31D-3C26BE7923B3}" type="datetimeFigureOut">
               <a:rPr lang="ko-KR" altLang="en-US" smtClean="0"/>
-              <a:t>2017-06-30</a:t>
+              <a:t>2017-07-19</a:t>
             </a:fld>
             <a:endParaRPr lang="ko-KR" altLang="en-US"/>
           </a:p>
@@ -1824,7 +1825,7 @@
           <a:p>
             <a:fld id="{F521F576-3884-49B5-B31D-3C26BE7923B3}" type="datetimeFigureOut">
               <a:rPr lang="ko-KR" altLang="en-US" smtClean="0"/>
-              <a:t>2017-06-30</a:t>
+              <a:t>2017-07-19</a:t>
             </a:fld>
             <a:endParaRPr lang="ko-KR" altLang="en-US"/>
           </a:p>
@@ -2101,7 +2102,7 @@
           <a:p>
             <a:fld id="{F521F576-3884-49B5-B31D-3C26BE7923B3}" type="datetimeFigureOut">
               <a:rPr lang="ko-KR" altLang="en-US" smtClean="0"/>
-              <a:t>2017-06-30</a:t>
+              <a:t>2017-07-19</a:t>
             </a:fld>
             <a:endParaRPr lang="ko-KR" altLang="en-US"/>
           </a:p>
@@ -2354,7 +2355,7 @@
           <a:p>
             <a:fld id="{F521F576-3884-49B5-B31D-3C26BE7923B3}" type="datetimeFigureOut">
               <a:rPr lang="ko-KR" altLang="en-US" smtClean="0"/>
-              <a:t>2017-06-30</a:t>
+              <a:t>2017-07-19</a:t>
             </a:fld>
             <a:endParaRPr lang="ko-KR" altLang="en-US"/>
           </a:p>
@@ -2567,7 +2568,7 @@
           <a:p>
             <a:fld id="{F521F576-3884-49B5-B31D-3C26BE7923B3}" type="datetimeFigureOut">
               <a:rPr lang="ko-KR" altLang="en-US" smtClean="0"/>
-              <a:t>2017-06-30</a:t>
+              <a:t>2017-07-19</a:t>
             </a:fld>
             <a:endParaRPr lang="ko-KR" altLang="en-US"/>
           </a:p>
@@ -3000,7 +3001,7 @@
                 <a:gridCol w="2603500">
                   <a:extLst>
                     <a:ext uri="{9D8B030D-6E8A-4147-A177-3AD203B41FA5}">
-                      <a16:colId xmlns:a16="http://schemas.microsoft.com/office/drawing/2014/main" xmlns="" val="20000"/>
+                      <a16:colId xmlns:a16="http://schemas.microsoft.com/office/drawing/2014/main" val="20000"/>
                     </a:ext>
                   </a:extLst>
                 </a:gridCol>
@@ -3043,7 +3044,7 @@
                 </a:tc>
                 <a:extLst>
                   <a:ext uri="{0D108BD9-81ED-4DB2-BD59-A6C34878D82A}">
-                    <a16:rowId xmlns:a16="http://schemas.microsoft.com/office/drawing/2014/main" xmlns="" val="10000"/>
+                    <a16:rowId xmlns:a16="http://schemas.microsoft.com/office/drawing/2014/main" val="10000"/>
                   </a:ext>
                 </a:extLst>
               </a:tr>
@@ -3100,7 +3101,7 @@
                 </a:tc>
                 <a:extLst>
                   <a:ext uri="{0D108BD9-81ED-4DB2-BD59-A6C34878D82A}">
-                    <a16:rowId xmlns:a16="http://schemas.microsoft.com/office/drawing/2014/main" xmlns="" val="10001"/>
+                    <a16:rowId xmlns:a16="http://schemas.microsoft.com/office/drawing/2014/main" val="10001"/>
                   </a:ext>
                 </a:extLst>
               </a:tr>
@@ -3248,7 +3249,7 @@
                 </a:tc>
                 <a:extLst>
                   <a:ext uri="{0D108BD9-81ED-4DB2-BD59-A6C34878D82A}">
-                    <a16:rowId xmlns:a16="http://schemas.microsoft.com/office/drawing/2014/main" xmlns="" val="10002"/>
+                    <a16:rowId xmlns:a16="http://schemas.microsoft.com/office/drawing/2014/main" val="10002"/>
                   </a:ext>
                 </a:extLst>
               </a:tr>
@@ -3284,7 +3285,7 @@
                 <a:gridCol w="2667000">
                   <a:extLst>
                     <a:ext uri="{9D8B030D-6E8A-4147-A177-3AD203B41FA5}">
-                      <a16:colId xmlns:a16="http://schemas.microsoft.com/office/drawing/2014/main" xmlns="" val="20000"/>
+                      <a16:colId xmlns:a16="http://schemas.microsoft.com/office/drawing/2014/main" val="20000"/>
                     </a:ext>
                   </a:extLst>
                 </a:gridCol>
@@ -3327,7 +3328,7 @@
                 </a:tc>
                 <a:extLst>
                   <a:ext uri="{0D108BD9-81ED-4DB2-BD59-A6C34878D82A}">
-                    <a16:rowId xmlns:a16="http://schemas.microsoft.com/office/drawing/2014/main" xmlns="" val="10000"/>
+                    <a16:rowId xmlns:a16="http://schemas.microsoft.com/office/drawing/2014/main" val="10000"/>
                   </a:ext>
                 </a:extLst>
               </a:tr>
@@ -3380,7 +3381,7 @@
                 </a:tc>
                 <a:extLst>
                   <a:ext uri="{0D108BD9-81ED-4DB2-BD59-A6C34878D82A}">
-                    <a16:rowId xmlns:a16="http://schemas.microsoft.com/office/drawing/2014/main" xmlns="" val="10001"/>
+                    <a16:rowId xmlns:a16="http://schemas.microsoft.com/office/drawing/2014/main" val="10001"/>
                   </a:ext>
                 </a:extLst>
               </a:tr>
@@ -3566,7 +3567,7 @@
                 </a:tc>
                 <a:extLst>
                   <a:ext uri="{0D108BD9-81ED-4DB2-BD59-A6C34878D82A}">
-                    <a16:rowId xmlns:a16="http://schemas.microsoft.com/office/drawing/2014/main" xmlns="" val="10002"/>
+                    <a16:rowId xmlns:a16="http://schemas.microsoft.com/office/drawing/2014/main" val="10002"/>
                   </a:ext>
                 </a:extLst>
               </a:tr>
@@ -3602,7 +3603,7 @@
                 <a:gridCol w="2667000">
                   <a:extLst>
                     <a:ext uri="{9D8B030D-6E8A-4147-A177-3AD203B41FA5}">
-                      <a16:colId xmlns:a16="http://schemas.microsoft.com/office/drawing/2014/main" xmlns="" val="20000"/>
+                      <a16:colId xmlns:a16="http://schemas.microsoft.com/office/drawing/2014/main" val="20000"/>
                     </a:ext>
                   </a:extLst>
                 </a:gridCol>
@@ -3645,7 +3646,7 @@
                 </a:tc>
                 <a:extLst>
                   <a:ext uri="{0D108BD9-81ED-4DB2-BD59-A6C34878D82A}">
-                    <a16:rowId xmlns:a16="http://schemas.microsoft.com/office/drawing/2014/main" xmlns="" val="10000"/>
+                    <a16:rowId xmlns:a16="http://schemas.microsoft.com/office/drawing/2014/main" val="10000"/>
                   </a:ext>
                 </a:extLst>
               </a:tr>
@@ -3724,7 +3725,7 @@
                 </a:tc>
                 <a:extLst>
                   <a:ext uri="{0D108BD9-81ED-4DB2-BD59-A6C34878D82A}">
-                    <a16:rowId xmlns:a16="http://schemas.microsoft.com/office/drawing/2014/main" xmlns="" val="10001"/>
+                    <a16:rowId xmlns:a16="http://schemas.microsoft.com/office/drawing/2014/main" val="10001"/>
                   </a:ext>
                 </a:extLst>
               </a:tr>
@@ -3879,7 +3880,7 @@
                 </a:tc>
                 <a:extLst>
                   <a:ext uri="{0D108BD9-81ED-4DB2-BD59-A6C34878D82A}">
-                    <a16:rowId xmlns:a16="http://schemas.microsoft.com/office/drawing/2014/main" xmlns="" val="10002"/>
+                    <a16:rowId xmlns:a16="http://schemas.microsoft.com/office/drawing/2014/main" val="10002"/>
                   </a:ext>
                 </a:extLst>
               </a:tr>
@@ -3915,7 +3916,7 @@
                 <a:gridCol w="2032000">
                   <a:extLst>
                     <a:ext uri="{9D8B030D-6E8A-4147-A177-3AD203B41FA5}">
-                      <a16:colId xmlns:a16="http://schemas.microsoft.com/office/drawing/2014/main" xmlns="" val="20000"/>
+                      <a16:colId xmlns:a16="http://schemas.microsoft.com/office/drawing/2014/main" val="20000"/>
                     </a:ext>
                   </a:extLst>
                 </a:gridCol>
@@ -3946,7 +3947,7 @@
                 </a:tc>
                 <a:extLst>
                   <a:ext uri="{0D108BD9-81ED-4DB2-BD59-A6C34878D82A}">
-                    <a16:rowId xmlns:a16="http://schemas.microsoft.com/office/drawing/2014/main" xmlns="" val="10000"/>
+                    <a16:rowId xmlns:a16="http://schemas.microsoft.com/office/drawing/2014/main" val="10000"/>
                   </a:ext>
                 </a:extLst>
               </a:tr>
@@ -3964,7 +3965,7 @@
                 </a:tc>
                 <a:extLst>
                   <a:ext uri="{0D108BD9-81ED-4DB2-BD59-A6C34878D82A}">
-                    <a16:rowId xmlns:a16="http://schemas.microsoft.com/office/drawing/2014/main" xmlns="" val="10001"/>
+                    <a16:rowId xmlns:a16="http://schemas.microsoft.com/office/drawing/2014/main" val="10001"/>
                   </a:ext>
                 </a:extLst>
               </a:tr>
@@ -3999,7 +4000,7 @@
                 </a:tc>
                 <a:extLst>
                   <a:ext uri="{0D108BD9-81ED-4DB2-BD59-A6C34878D82A}">
-                    <a16:rowId xmlns:a16="http://schemas.microsoft.com/office/drawing/2014/main" xmlns="" val="10002"/>
+                    <a16:rowId xmlns:a16="http://schemas.microsoft.com/office/drawing/2014/main" val="10002"/>
                   </a:ext>
                 </a:extLst>
               </a:tr>
@@ -4035,7 +4036,7 @@
                 <a:gridCol w="2032000">
                   <a:extLst>
                     <a:ext uri="{9D8B030D-6E8A-4147-A177-3AD203B41FA5}">
-                      <a16:colId xmlns:a16="http://schemas.microsoft.com/office/drawing/2014/main" xmlns="" val="20000"/>
+                      <a16:colId xmlns:a16="http://schemas.microsoft.com/office/drawing/2014/main" val="20000"/>
                     </a:ext>
                   </a:extLst>
                 </a:gridCol>
@@ -4066,7 +4067,7 @@
                 </a:tc>
                 <a:extLst>
                   <a:ext uri="{0D108BD9-81ED-4DB2-BD59-A6C34878D82A}">
-                    <a16:rowId xmlns:a16="http://schemas.microsoft.com/office/drawing/2014/main" xmlns="" val="10000"/>
+                    <a16:rowId xmlns:a16="http://schemas.microsoft.com/office/drawing/2014/main" val="10000"/>
                   </a:ext>
                 </a:extLst>
               </a:tr>
@@ -4100,7 +4101,7 @@
                 </a:tc>
                 <a:extLst>
                   <a:ext uri="{0D108BD9-81ED-4DB2-BD59-A6C34878D82A}">
-                    <a16:rowId xmlns:a16="http://schemas.microsoft.com/office/drawing/2014/main" xmlns="" val="10001"/>
+                    <a16:rowId xmlns:a16="http://schemas.microsoft.com/office/drawing/2014/main" val="10001"/>
                   </a:ext>
                 </a:extLst>
               </a:tr>
@@ -4135,7 +4136,7 @@
                 </a:tc>
                 <a:extLst>
                   <a:ext uri="{0D108BD9-81ED-4DB2-BD59-A6C34878D82A}">
-                    <a16:rowId xmlns:a16="http://schemas.microsoft.com/office/drawing/2014/main" xmlns="" val="10002"/>
+                    <a16:rowId xmlns:a16="http://schemas.microsoft.com/office/drawing/2014/main" val="10002"/>
                   </a:ext>
                 </a:extLst>
               </a:tr>
@@ -4171,7 +4172,7 @@
                 <a:gridCol w="2032000">
                   <a:extLst>
                     <a:ext uri="{9D8B030D-6E8A-4147-A177-3AD203B41FA5}">
-                      <a16:colId xmlns:a16="http://schemas.microsoft.com/office/drawing/2014/main" xmlns="" val="20000"/>
+                      <a16:colId xmlns:a16="http://schemas.microsoft.com/office/drawing/2014/main" val="20000"/>
                     </a:ext>
                   </a:extLst>
                 </a:gridCol>
@@ -4202,7 +4203,7 @@
                 </a:tc>
                 <a:extLst>
                   <a:ext uri="{0D108BD9-81ED-4DB2-BD59-A6C34878D82A}">
-                    <a16:rowId xmlns:a16="http://schemas.microsoft.com/office/drawing/2014/main" xmlns="" val="10000"/>
+                    <a16:rowId xmlns:a16="http://schemas.microsoft.com/office/drawing/2014/main" val="10000"/>
                   </a:ext>
                 </a:extLst>
               </a:tr>
@@ -4265,7 +4266,7 @@
                 </a:tc>
                 <a:extLst>
                   <a:ext uri="{0D108BD9-81ED-4DB2-BD59-A6C34878D82A}">
-                    <a16:rowId xmlns:a16="http://schemas.microsoft.com/office/drawing/2014/main" xmlns="" val="10001"/>
+                    <a16:rowId xmlns:a16="http://schemas.microsoft.com/office/drawing/2014/main" val="10001"/>
                   </a:ext>
                 </a:extLst>
               </a:tr>
@@ -4312,7 +4313,7 @@
                 </a:tc>
                 <a:extLst>
                   <a:ext uri="{0D108BD9-81ED-4DB2-BD59-A6C34878D82A}">
-                    <a16:rowId xmlns:a16="http://schemas.microsoft.com/office/drawing/2014/main" xmlns="" val="10002"/>
+                    <a16:rowId xmlns:a16="http://schemas.microsoft.com/office/drawing/2014/main" val="10002"/>
                   </a:ext>
                 </a:extLst>
               </a:tr>
@@ -4582,7 +4583,7 @@
                 <a:gridCol w="2603500">
                   <a:extLst>
                     <a:ext uri="{9D8B030D-6E8A-4147-A177-3AD203B41FA5}">
-                      <a16:colId xmlns:a16="http://schemas.microsoft.com/office/drawing/2014/main" xmlns="" val="20000"/>
+                      <a16:colId xmlns:a16="http://schemas.microsoft.com/office/drawing/2014/main" val="20000"/>
                     </a:ext>
                   </a:extLst>
                 </a:gridCol>
@@ -4625,7 +4626,7 @@
                 </a:tc>
                 <a:extLst>
                   <a:ext uri="{0D108BD9-81ED-4DB2-BD59-A6C34878D82A}">
-                    <a16:rowId xmlns:a16="http://schemas.microsoft.com/office/drawing/2014/main" xmlns="" val="10000"/>
+                    <a16:rowId xmlns:a16="http://schemas.microsoft.com/office/drawing/2014/main" val="10000"/>
                   </a:ext>
                 </a:extLst>
               </a:tr>
@@ -4682,7 +4683,7 @@
                 </a:tc>
                 <a:extLst>
                   <a:ext uri="{0D108BD9-81ED-4DB2-BD59-A6C34878D82A}">
-                    <a16:rowId xmlns:a16="http://schemas.microsoft.com/office/drawing/2014/main" xmlns="" val="10001"/>
+                    <a16:rowId xmlns:a16="http://schemas.microsoft.com/office/drawing/2014/main" val="10001"/>
                   </a:ext>
                 </a:extLst>
               </a:tr>
@@ -4888,7 +4889,7 @@
                 </a:tc>
                 <a:extLst>
                   <a:ext uri="{0D108BD9-81ED-4DB2-BD59-A6C34878D82A}">
-                    <a16:rowId xmlns:a16="http://schemas.microsoft.com/office/drawing/2014/main" xmlns="" val="10002"/>
+                    <a16:rowId xmlns:a16="http://schemas.microsoft.com/office/drawing/2014/main" val="10002"/>
                   </a:ext>
                 </a:extLst>
               </a:tr>
@@ -4920,7 +4921,7 @@
                 <a:gridCol w="2667000">
                   <a:extLst>
                     <a:ext uri="{9D8B030D-6E8A-4147-A177-3AD203B41FA5}">
-                      <a16:colId xmlns:a16="http://schemas.microsoft.com/office/drawing/2014/main" xmlns="" val="20000"/>
+                      <a16:colId xmlns:a16="http://schemas.microsoft.com/office/drawing/2014/main" val="20000"/>
                     </a:ext>
                   </a:extLst>
                 </a:gridCol>
@@ -4963,7 +4964,7 @@
                 </a:tc>
                 <a:extLst>
                   <a:ext uri="{0D108BD9-81ED-4DB2-BD59-A6C34878D82A}">
-                    <a16:rowId xmlns:a16="http://schemas.microsoft.com/office/drawing/2014/main" xmlns="" val="10000"/>
+                    <a16:rowId xmlns:a16="http://schemas.microsoft.com/office/drawing/2014/main" val="10000"/>
                   </a:ext>
                 </a:extLst>
               </a:tr>
@@ -5004,7 +5005,7 @@
                 </a:tc>
                 <a:extLst>
                   <a:ext uri="{0D108BD9-81ED-4DB2-BD59-A6C34878D82A}">
-                    <a16:rowId xmlns:a16="http://schemas.microsoft.com/office/drawing/2014/main" xmlns="" val="10001"/>
+                    <a16:rowId xmlns:a16="http://schemas.microsoft.com/office/drawing/2014/main" val="10001"/>
                   </a:ext>
                 </a:extLst>
               </a:tr>
@@ -5099,7 +5100,7 @@
                 </a:tc>
                 <a:extLst>
                   <a:ext uri="{0D108BD9-81ED-4DB2-BD59-A6C34878D82A}">
-                    <a16:rowId xmlns:a16="http://schemas.microsoft.com/office/drawing/2014/main" xmlns="" val="10002"/>
+                    <a16:rowId xmlns:a16="http://schemas.microsoft.com/office/drawing/2014/main" val="10002"/>
                   </a:ext>
                 </a:extLst>
               </a:tr>
@@ -5131,7 +5132,7 @@
                 <a:gridCol w="2667000">
                   <a:extLst>
                     <a:ext uri="{9D8B030D-6E8A-4147-A177-3AD203B41FA5}">
-                      <a16:colId xmlns:a16="http://schemas.microsoft.com/office/drawing/2014/main" xmlns="" val="20000"/>
+                      <a16:colId xmlns:a16="http://schemas.microsoft.com/office/drawing/2014/main" val="20000"/>
                     </a:ext>
                   </a:extLst>
                 </a:gridCol>
@@ -5174,7 +5175,7 @@
                 </a:tc>
                 <a:extLst>
                   <a:ext uri="{0D108BD9-81ED-4DB2-BD59-A6C34878D82A}">
-                    <a16:rowId xmlns:a16="http://schemas.microsoft.com/office/drawing/2014/main" xmlns="" val="10000"/>
+                    <a16:rowId xmlns:a16="http://schemas.microsoft.com/office/drawing/2014/main" val="10000"/>
                   </a:ext>
                 </a:extLst>
               </a:tr>
@@ -5240,7 +5241,7 @@
                 </a:tc>
                 <a:extLst>
                   <a:ext uri="{0D108BD9-81ED-4DB2-BD59-A6C34878D82A}">
-                    <a16:rowId xmlns:a16="http://schemas.microsoft.com/office/drawing/2014/main" xmlns="" val="10001"/>
+                    <a16:rowId xmlns:a16="http://schemas.microsoft.com/office/drawing/2014/main" val="10001"/>
                   </a:ext>
                 </a:extLst>
               </a:tr>
@@ -5434,7 +5435,7 @@
                 </a:tc>
                 <a:extLst>
                   <a:ext uri="{0D108BD9-81ED-4DB2-BD59-A6C34878D82A}">
-                    <a16:rowId xmlns:a16="http://schemas.microsoft.com/office/drawing/2014/main" xmlns="" val="10002"/>
+                    <a16:rowId xmlns:a16="http://schemas.microsoft.com/office/drawing/2014/main" val="10002"/>
                   </a:ext>
                 </a:extLst>
               </a:tr>
@@ -5466,7 +5467,7 @@
                 <a:gridCol w="2032000">
                   <a:extLst>
                     <a:ext uri="{9D8B030D-6E8A-4147-A177-3AD203B41FA5}">
-                      <a16:colId xmlns:a16="http://schemas.microsoft.com/office/drawing/2014/main" xmlns="" val="20000"/>
+                      <a16:colId xmlns:a16="http://schemas.microsoft.com/office/drawing/2014/main" val="20000"/>
                     </a:ext>
                   </a:extLst>
                 </a:gridCol>
@@ -5497,7 +5498,7 @@
                 </a:tc>
                 <a:extLst>
                   <a:ext uri="{0D108BD9-81ED-4DB2-BD59-A6C34878D82A}">
-                    <a16:rowId xmlns:a16="http://schemas.microsoft.com/office/drawing/2014/main" xmlns="" val="10000"/>
+                    <a16:rowId xmlns:a16="http://schemas.microsoft.com/office/drawing/2014/main" val="10000"/>
                   </a:ext>
                 </a:extLst>
               </a:tr>
@@ -5553,7 +5554,7 @@
                 </a:tc>
                 <a:extLst>
                   <a:ext uri="{0D108BD9-81ED-4DB2-BD59-A6C34878D82A}">
-                    <a16:rowId xmlns:a16="http://schemas.microsoft.com/office/drawing/2014/main" xmlns="" val="10001"/>
+                    <a16:rowId xmlns:a16="http://schemas.microsoft.com/office/drawing/2014/main" val="10001"/>
                   </a:ext>
                 </a:extLst>
               </a:tr>
@@ -5734,7 +5735,7 @@
                 </a:tc>
                 <a:extLst>
                   <a:ext uri="{0D108BD9-81ED-4DB2-BD59-A6C34878D82A}">
-                    <a16:rowId xmlns:a16="http://schemas.microsoft.com/office/drawing/2014/main" xmlns="" val="10002"/>
+                    <a16:rowId xmlns:a16="http://schemas.microsoft.com/office/drawing/2014/main" val="10002"/>
                   </a:ext>
                 </a:extLst>
               </a:tr>
@@ -5947,7 +5948,7 @@
                 <a:gridCol w="3419140">
                   <a:extLst>
                     <a:ext uri="{9D8B030D-6E8A-4147-A177-3AD203B41FA5}">
-                      <a16:colId xmlns:a16="http://schemas.microsoft.com/office/drawing/2014/main" xmlns="" val="20000"/>
+                      <a16:colId xmlns:a16="http://schemas.microsoft.com/office/drawing/2014/main" val="20000"/>
                     </a:ext>
                   </a:extLst>
                 </a:gridCol>
@@ -5990,7 +5991,7 @@
                 </a:tc>
                 <a:extLst>
                   <a:ext uri="{0D108BD9-81ED-4DB2-BD59-A6C34878D82A}">
-                    <a16:rowId xmlns:a16="http://schemas.microsoft.com/office/drawing/2014/main" xmlns="" val="10000"/>
+                    <a16:rowId xmlns:a16="http://schemas.microsoft.com/office/drawing/2014/main" val="10000"/>
                   </a:ext>
                 </a:extLst>
               </a:tr>
@@ -6047,7 +6048,7 @@
                 </a:tc>
                 <a:extLst>
                   <a:ext uri="{0D108BD9-81ED-4DB2-BD59-A6C34878D82A}">
-                    <a16:rowId xmlns:a16="http://schemas.microsoft.com/office/drawing/2014/main" xmlns="" val="10001"/>
+                    <a16:rowId xmlns:a16="http://schemas.microsoft.com/office/drawing/2014/main" val="10001"/>
                   </a:ext>
                 </a:extLst>
               </a:tr>
@@ -6249,7 +6250,7 @@
                 </a:tc>
                 <a:extLst>
                   <a:ext uri="{0D108BD9-81ED-4DB2-BD59-A6C34878D82A}">
-                    <a16:rowId xmlns:a16="http://schemas.microsoft.com/office/drawing/2014/main" xmlns="" val="10002"/>
+                    <a16:rowId xmlns:a16="http://schemas.microsoft.com/office/drawing/2014/main" val="10002"/>
                   </a:ext>
                 </a:extLst>
               </a:tr>
@@ -6285,7 +6286,7 @@
                 <a:gridCol w="3368182">
                   <a:extLst>
                     <a:ext uri="{9D8B030D-6E8A-4147-A177-3AD203B41FA5}">
-                      <a16:colId xmlns:a16="http://schemas.microsoft.com/office/drawing/2014/main" xmlns="" val="20000"/>
+                      <a16:colId xmlns:a16="http://schemas.microsoft.com/office/drawing/2014/main" val="20000"/>
                     </a:ext>
                   </a:extLst>
                 </a:gridCol>
@@ -6328,7 +6329,7 @@
                 </a:tc>
                 <a:extLst>
                   <a:ext uri="{0D108BD9-81ED-4DB2-BD59-A6C34878D82A}">
-                    <a16:rowId xmlns:a16="http://schemas.microsoft.com/office/drawing/2014/main" xmlns="" val="10000"/>
+                    <a16:rowId xmlns:a16="http://schemas.microsoft.com/office/drawing/2014/main" val="10000"/>
                   </a:ext>
                 </a:extLst>
               </a:tr>
@@ -6377,7 +6378,7 @@
                 </a:tc>
                 <a:extLst>
                   <a:ext uri="{0D108BD9-81ED-4DB2-BD59-A6C34878D82A}">
-                    <a16:rowId xmlns:a16="http://schemas.microsoft.com/office/drawing/2014/main" xmlns="" val="10001"/>
+                    <a16:rowId xmlns:a16="http://schemas.microsoft.com/office/drawing/2014/main" val="10001"/>
                   </a:ext>
                 </a:extLst>
               </a:tr>
@@ -6558,7 +6559,7 @@
                 </a:tc>
                 <a:extLst>
                   <a:ext uri="{0D108BD9-81ED-4DB2-BD59-A6C34878D82A}">
-                    <a16:rowId xmlns:a16="http://schemas.microsoft.com/office/drawing/2014/main" xmlns="" val="10002"/>
+                    <a16:rowId xmlns:a16="http://schemas.microsoft.com/office/drawing/2014/main" val="10002"/>
                   </a:ext>
                 </a:extLst>
               </a:tr>
@@ -6594,7 +6595,7 @@
                 <a:gridCol w="2667000">
                   <a:extLst>
                     <a:ext uri="{9D8B030D-6E8A-4147-A177-3AD203B41FA5}">
-                      <a16:colId xmlns:a16="http://schemas.microsoft.com/office/drawing/2014/main" xmlns="" val="20000"/>
+                      <a16:colId xmlns:a16="http://schemas.microsoft.com/office/drawing/2014/main" val="20000"/>
                     </a:ext>
                   </a:extLst>
                 </a:gridCol>
@@ -6637,7 +6638,7 @@
                 </a:tc>
                 <a:extLst>
                   <a:ext uri="{0D108BD9-81ED-4DB2-BD59-A6C34878D82A}">
-                    <a16:rowId xmlns:a16="http://schemas.microsoft.com/office/drawing/2014/main" xmlns="" val="10000"/>
+                    <a16:rowId xmlns:a16="http://schemas.microsoft.com/office/drawing/2014/main" val="10000"/>
                   </a:ext>
                 </a:extLst>
               </a:tr>
@@ -6703,7 +6704,7 @@
                 </a:tc>
                 <a:extLst>
                   <a:ext uri="{0D108BD9-81ED-4DB2-BD59-A6C34878D82A}">
-                    <a16:rowId xmlns:a16="http://schemas.microsoft.com/office/drawing/2014/main" xmlns="" val="10001"/>
+                    <a16:rowId xmlns:a16="http://schemas.microsoft.com/office/drawing/2014/main" val="10001"/>
                   </a:ext>
                 </a:extLst>
               </a:tr>
@@ -6881,7 +6882,7 @@
                 </a:tc>
                 <a:extLst>
                   <a:ext uri="{0D108BD9-81ED-4DB2-BD59-A6C34878D82A}">
-                    <a16:rowId xmlns:a16="http://schemas.microsoft.com/office/drawing/2014/main" xmlns="" val="10002"/>
+                    <a16:rowId xmlns:a16="http://schemas.microsoft.com/office/drawing/2014/main" val="10002"/>
                   </a:ext>
                 </a:extLst>
               </a:tr>
@@ -6917,7 +6918,7 @@
                 <a:gridCol w="2032000">
                   <a:extLst>
                     <a:ext uri="{9D8B030D-6E8A-4147-A177-3AD203B41FA5}">
-                      <a16:colId xmlns:a16="http://schemas.microsoft.com/office/drawing/2014/main" xmlns="" val="20000"/>
+                      <a16:colId xmlns:a16="http://schemas.microsoft.com/office/drawing/2014/main" val="20000"/>
                     </a:ext>
                   </a:extLst>
                 </a:gridCol>
@@ -6948,7 +6949,7 @@
                 </a:tc>
                 <a:extLst>
                   <a:ext uri="{0D108BD9-81ED-4DB2-BD59-A6C34878D82A}">
-                    <a16:rowId xmlns:a16="http://schemas.microsoft.com/office/drawing/2014/main" xmlns="" val="10000"/>
+                    <a16:rowId xmlns:a16="http://schemas.microsoft.com/office/drawing/2014/main" val="10000"/>
                   </a:ext>
                 </a:extLst>
               </a:tr>
@@ -7004,7 +7005,7 @@
                 </a:tc>
                 <a:extLst>
                   <a:ext uri="{0D108BD9-81ED-4DB2-BD59-A6C34878D82A}">
-                    <a16:rowId xmlns:a16="http://schemas.microsoft.com/office/drawing/2014/main" xmlns="" val="10001"/>
+                    <a16:rowId xmlns:a16="http://schemas.microsoft.com/office/drawing/2014/main" val="10001"/>
                   </a:ext>
                 </a:extLst>
               </a:tr>
@@ -7156,7 +7157,7 @@
                 </a:tc>
                 <a:extLst>
                   <a:ext uri="{0D108BD9-81ED-4DB2-BD59-A6C34878D82A}">
-                    <a16:rowId xmlns:a16="http://schemas.microsoft.com/office/drawing/2014/main" xmlns="" val="10002"/>
+                    <a16:rowId xmlns:a16="http://schemas.microsoft.com/office/drawing/2014/main" val="10002"/>
                   </a:ext>
                 </a:extLst>
               </a:tr>
@@ -7369,7 +7370,7 @@
                 <a:gridCol w="3419140">
                   <a:extLst>
                     <a:ext uri="{9D8B030D-6E8A-4147-A177-3AD203B41FA5}">
-                      <a16:colId xmlns:a16="http://schemas.microsoft.com/office/drawing/2014/main" xmlns="" val="20000"/>
+                      <a16:colId xmlns:a16="http://schemas.microsoft.com/office/drawing/2014/main" val="20000"/>
                     </a:ext>
                   </a:extLst>
                 </a:gridCol>
@@ -7412,7 +7413,7 @@
                 </a:tc>
                 <a:extLst>
                   <a:ext uri="{0D108BD9-81ED-4DB2-BD59-A6C34878D82A}">
-                    <a16:rowId xmlns:a16="http://schemas.microsoft.com/office/drawing/2014/main" xmlns="" val="10000"/>
+                    <a16:rowId xmlns:a16="http://schemas.microsoft.com/office/drawing/2014/main" val="10000"/>
                   </a:ext>
                 </a:extLst>
               </a:tr>
@@ -7469,7 +7470,7 @@
                 </a:tc>
                 <a:extLst>
                   <a:ext uri="{0D108BD9-81ED-4DB2-BD59-A6C34878D82A}">
-                    <a16:rowId xmlns:a16="http://schemas.microsoft.com/office/drawing/2014/main" xmlns="" val="10001"/>
+                    <a16:rowId xmlns:a16="http://schemas.microsoft.com/office/drawing/2014/main" val="10001"/>
                   </a:ext>
                 </a:extLst>
               </a:tr>
@@ -7696,7 +7697,7 @@
                 </a:tc>
                 <a:extLst>
                   <a:ext uri="{0D108BD9-81ED-4DB2-BD59-A6C34878D82A}">
-                    <a16:rowId xmlns:a16="http://schemas.microsoft.com/office/drawing/2014/main" xmlns="" val="10002"/>
+                    <a16:rowId xmlns:a16="http://schemas.microsoft.com/office/drawing/2014/main" val="10002"/>
                   </a:ext>
                 </a:extLst>
               </a:tr>
@@ -7732,7 +7733,7 @@
                 <a:gridCol w="3368182">
                   <a:extLst>
                     <a:ext uri="{9D8B030D-6E8A-4147-A177-3AD203B41FA5}">
-                      <a16:colId xmlns:a16="http://schemas.microsoft.com/office/drawing/2014/main" xmlns="" val="20000"/>
+                      <a16:colId xmlns:a16="http://schemas.microsoft.com/office/drawing/2014/main" val="20000"/>
                     </a:ext>
                   </a:extLst>
                 </a:gridCol>
@@ -7775,7 +7776,7 @@
                 </a:tc>
                 <a:extLst>
                   <a:ext uri="{0D108BD9-81ED-4DB2-BD59-A6C34878D82A}">
-                    <a16:rowId xmlns:a16="http://schemas.microsoft.com/office/drawing/2014/main" xmlns="" val="10000"/>
+                    <a16:rowId xmlns:a16="http://schemas.microsoft.com/office/drawing/2014/main" val="10000"/>
                   </a:ext>
                 </a:extLst>
               </a:tr>
@@ -7824,7 +7825,7 @@
                 </a:tc>
                 <a:extLst>
                   <a:ext uri="{0D108BD9-81ED-4DB2-BD59-A6C34878D82A}">
-                    <a16:rowId xmlns:a16="http://schemas.microsoft.com/office/drawing/2014/main" xmlns="" val="10001"/>
+                    <a16:rowId xmlns:a16="http://schemas.microsoft.com/office/drawing/2014/main" val="10001"/>
                   </a:ext>
                 </a:extLst>
               </a:tr>
@@ -8092,7 +8093,7 @@
                 </a:tc>
                 <a:extLst>
                   <a:ext uri="{0D108BD9-81ED-4DB2-BD59-A6C34878D82A}">
-                    <a16:rowId xmlns:a16="http://schemas.microsoft.com/office/drawing/2014/main" xmlns="" val="10002"/>
+                    <a16:rowId xmlns:a16="http://schemas.microsoft.com/office/drawing/2014/main" val="10002"/>
                   </a:ext>
                 </a:extLst>
               </a:tr>
@@ -8128,7 +8129,7 @@
                 <a:gridCol w="4766521">
                   <a:extLst>
                     <a:ext uri="{9D8B030D-6E8A-4147-A177-3AD203B41FA5}">
-                      <a16:colId xmlns:a16="http://schemas.microsoft.com/office/drawing/2014/main" xmlns="" val="20000"/>
+                      <a16:colId xmlns:a16="http://schemas.microsoft.com/office/drawing/2014/main" val="20000"/>
                     </a:ext>
                   </a:extLst>
                 </a:gridCol>
@@ -8171,7 +8172,7 @@
                 </a:tc>
                 <a:extLst>
                   <a:ext uri="{0D108BD9-81ED-4DB2-BD59-A6C34878D82A}">
-                    <a16:rowId xmlns:a16="http://schemas.microsoft.com/office/drawing/2014/main" xmlns="" val="10000"/>
+                    <a16:rowId xmlns:a16="http://schemas.microsoft.com/office/drawing/2014/main" val="10000"/>
                   </a:ext>
                 </a:extLst>
               </a:tr>
@@ -8237,7 +8238,7 @@
                 </a:tc>
                 <a:extLst>
                   <a:ext uri="{0D108BD9-81ED-4DB2-BD59-A6C34878D82A}">
-                    <a16:rowId xmlns:a16="http://schemas.microsoft.com/office/drawing/2014/main" xmlns="" val="10001"/>
+                    <a16:rowId xmlns:a16="http://schemas.microsoft.com/office/drawing/2014/main" val="10001"/>
                   </a:ext>
                 </a:extLst>
               </a:tr>
@@ -8560,7 +8561,7 @@
                 </a:tc>
                 <a:extLst>
                   <a:ext uri="{0D108BD9-81ED-4DB2-BD59-A6C34878D82A}">
-                    <a16:rowId xmlns:a16="http://schemas.microsoft.com/office/drawing/2014/main" xmlns="" val="10002"/>
+                    <a16:rowId xmlns:a16="http://schemas.microsoft.com/office/drawing/2014/main" val="10002"/>
                   </a:ext>
                 </a:extLst>
               </a:tr>
@@ -8596,7 +8597,7 @@
                 <a:gridCol w="2534461">
                   <a:extLst>
                     <a:ext uri="{9D8B030D-6E8A-4147-A177-3AD203B41FA5}">
-                      <a16:colId xmlns:a16="http://schemas.microsoft.com/office/drawing/2014/main" xmlns="" val="20000"/>
+                      <a16:colId xmlns:a16="http://schemas.microsoft.com/office/drawing/2014/main" val="20000"/>
                     </a:ext>
                   </a:extLst>
                 </a:gridCol>
@@ -8614,11 +8615,7 @@
                       </a:r>
                       <a:r>
                         <a:rPr lang="en-US" altLang="ko-KR" sz="1200" dirty="0" smtClean="0"/>
-                        <a:t> </a:t>
-                      </a:r>
-                      <a:r>
-                        <a:rPr lang="en-US" altLang="ko-KR" sz="1200" dirty="0" smtClean="0"/>
-                        <a:t>– </a:t>
+                        <a:t> – </a:t>
                       </a:r>
                       <a:r>
                         <a:rPr lang="en-US" altLang="ko-KR" sz="1200" smtClean="0"/>
@@ -8635,7 +8632,7 @@
                 </a:tc>
                 <a:extLst>
                   <a:ext uri="{0D108BD9-81ED-4DB2-BD59-A6C34878D82A}">
-                    <a16:rowId xmlns:a16="http://schemas.microsoft.com/office/drawing/2014/main" xmlns="" val="10000"/>
+                    <a16:rowId xmlns:a16="http://schemas.microsoft.com/office/drawing/2014/main" val="10000"/>
                   </a:ext>
                 </a:extLst>
               </a:tr>
@@ -8691,7 +8688,7 @@
                 </a:tc>
                 <a:extLst>
                   <a:ext uri="{0D108BD9-81ED-4DB2-BD59-A6C34878D82A}">
-                    <a16:rowId xmlns:a16="http://schemas.microsoft.com/office/drawing/2014/main" xmlns="" val="10001"/>
+                    <a16:rowId xmlns:a16="http://schemas.microsoft.com/office/drawing/2014/main" val="10001"/>
                   </a:ext>
                 </a:extLst>
               </a:tr>
@@ -8863,7 +8860,7 @@
                 </a:tc>
                 <a:extLst>
                   <a:ext uri="{0D108BD9-81ED-4DB2-BD59-A6C34878D82A}">
-                    <a16:rowId xmlns:a16="http://schemas.microsoft.com/office/drawing/2014/main" xmlns="" val="10002"/>
+                    <a16:rowId xmlns:a16="http://schemas.microsoft.com/office/drawing/2014/main" val="10002"/>
                   </a:ext>
                 </a:extLst>
               </a:tr>
@@ -9030,6 +9027,3895 @@
     <p:extLst>
       <p:ext uri="{BB962C8B-B14F-4D97-AF65-F5344CB8AC3E}">
         <p14:creationId xmlns:p14="http://schemas.microsoft.com/office/powerpoint/2010/main" val="3083799012"/>
+      </p:ext>
+    </p:extLst>
+  </p:cSld>
+  <p:clrMapOvr>
+    <a:masterClrMapping/>
+  </p:clrMapOvr>
+</p:sld>
+</file>
+
+<file path=ppt/slides/slide5.xml><?xml version="1.0" encoding="utf-8"?>
+<p:sld xmlns:a="http://schemas.openxmlformats.org/drawingml/2006/main" xmlns:r="http://schemas.openxmlformats.org/officeDocument/2006/relationships" xmlns:p="http://schemas.openxmlformats.org/presentationml/2006/main">
+  <p:cSld>
+    <p:spTree>
+      <p:nvGrpSpPr>
+        <p:cNvPr id="1" name=""/>
+        <p:cNvGrpSpPr/>
+        <p:nvPr/>
+      </p:nvGrpSpPr>
+      <p:grpSpPr>
+        <a:xfrm>
+          <a:off x="0" y="0"/>
+          <a:ext cx="0" cy="0"/>
+          <a:chOff x="0" y="0"/>
+          <a:chExt cx="0" cy="0"/>
+        </a:xfrm>
+      </p:grpSpPr>
+      <p:graphicFrame>
+        <p:nvGraphicFramePr>
+          <p:cNvPr id="8" name="표 7"/>
+          <p:cNvGraphicFramePr>
+            <a:graphicFrameLocks noGrp="1"/>
+          </p:cNvGraphicFramePr>
+          <p:nvPr>
+            <p:extLst>
+              <p:ext uri="{D42A27DB-BD31-4B8C-83A1-F6EECF244321}">
+                <p14:modId xmlns:p14="http://schemas.microsoft.com/office/powerpoint/2010/main" val="4138867738"/>
+              </p:ext>
+            </p:extLst>
+          </p:nvPr>
+        </p:nvGraphicFramePr>
+        <p:xfrm>
+          <a:off x="3542319" y="4438522"/>
+          <a:ext cx="3419140" cy="2280859"/>
+        </p:xfrm>
+        <a:graphic>
+          <a:graphicData uri="http://schemas.openxmlformats.org/drawingml/2006/table">
+            <a:tbl>
+              <a:tblPr firstRow="1" bandRow="1">
+                <a:tableStyleId>{5C22544A-7EE6-4342-B048-85BDC9FD1C3A}</a:tableStyleId>
+              </a:tblPr>
+              <a:tblGrid>
+                <a:gridCol w="3419140">
+                  <a:extLst>
+                    <a:ext uri="{9D8B030D-6E8A-4147-A177-3AD203B41FA5}">
+                      <a16:colId xmlns:a16="http://schemas.microsoft.com/office/drawing/2014/main" val="20000"/>
+                    </a:ext>
+                  </a:extLst>
+                </a:gridCol>
+              </a:tblGrid>
+              <a:tr h="255247">
+                <a:tc>
+                  <a:txBody>
+                    <a:bodyPr/>
+                    <a:lstStyle/>
+                    <a:p>
+                      <a:pPr latinLnBrk="1"/>
+                      <a:r>
+                        <a:rPr lang="en-US" altLang="ko-KR" sz="1000" dirty="0" smtClean="0"/>
+                        <a:t>Snake</a:t>
+                      </a:r>
+                      <a:endParaRPr lang="ko-KR" altLang="en-US" sz="1000" dirty="0">
+                        <a:solidFill>
+                          <a:srgbClr val="FF0000"/>
+                        </a:solidFill>
+                      </a:endParaRPr>
+                    </a:p>
+                  </a:txBody>
+                  <a:tcPr/>
+                </a:tc>
+                <a:extLst>
+                  <a:ext uri="{0D108BD9-81ED-4DB2-BD59-A6C34878D82A}">
+                    <a16:rowId xmlns:a16="http://schemas.microsoft.com/office/drawing/2014/main" val="10000"/>
+                  </a:ext>
+                </a:extLst>
+              </a:tr>
+              <a:tr h="425412">
+                <a:tc>
+                  <a:txBody>
+                    <a:bodyPr/>
+                    <a:lstStyle/>
+                    <a:p>
+                      <a:pPr latinLnBrk="1"/>
+                      <a:r>
+                        <a:rPr lang="en-US" altLang="ko-KR" sz="1000" dirty="0" smtClean="0"/>
+                        <a:t>- Vector&lt;pair&lt;</a:t>
+                      </a:r>
+                      <a:r>
+                        <a:rPr lang="en-US" altLang="ko-KR" sz="1000" dirty="0" err="1" smtClean="0"/>
+                        <a:t>int,int</a:t>
+                      </a:r>
+                      <a:r>
+                        <a:rPr lang="en-US" altLang="ko-KR" sz="1000" dirty="0" smtClean="0"/>
+                        <a:t>&gt;&gt; </a:t>
+                      </a:r>
+                      <a:r>
+                        <a:rPr lang="en-US" altLang="ko-KR" sz="1000" dirty="0" err="1" smtClean="0"/>
+                        <a:t>vSnake</a:t>
+                      </a:r>
+                      <a:r>
+                        <a:rPr lang="en-US" altLang="ko-KR" sz="1000" dirty="0" smtClean="0"/>
+                        <a:t>;</a:t>
+                      </a:r>
+                    </a:p>
+                    <a:p>
+                      <a:pPr latinLnBrk="1"/>
+                      <a:r>
+                        <a:rPr lang="en-US" altLang="ko-KR" sz="1000" b="0" dirty="0" smtClean="0"/>
+                        <a:t>- Direction</a:t>
+                      </a:r>
+                      <a:r>
+                        <a:rPr lang="en-US" altLang="ko-KR" sz="1000" dirty="0" smtClean="0"/>
+                        <a:t> Dir;</a:t>
+                      </a:r>
+                      <a:endParaRPr lang="ko-KR" altLang="en-US" sz="1000" dirty="0"/>
+                    </a:p>
+                  </a:txBody>
+                  <a:tcPr/>
+                </a:tc>
+                <a:extLst>
+                  <a:ext uri="{0D108BD9-81ED-4DB2-BD59-A6C34878D82A}">
+                    <a16:rowId xmlns:a16="http://schemas.microsoft.com/office/drawing/2014/main" val="10001"/>
+                  </a:ext>
+                </a:extLst>
+              </a:tr>
+              <a:tr h="1465640">
+                <a:tc>
+                  <a:txBody>
+                    <a:bodyPr/>
+                    <a:lstStyle/>
+                    <a:p>
+                      <a:pPr latinLnBrk="1"/>
+                      <a:r>
+                        <a:rPr lang="en-US" altLang="ko-KR" sz="900" b="0" dirty="0" smtClean="0">
+                          <a:solidFill>
+                            <a:schemeClr val="tx1"/>
+                          </a:solidFill>
+                        </a:rPr>
+                        <a:t>+ Snake</a:t>
+                      </a:r>
+                      <a:r>
+                        <a:rPr lang="en-US" altLang="ko-KR" sz="900" b="0" dirty="0" smtClean="0">
+                          <a:solidFill>
+                            <a:schemeClr val="tx1"/>
+                          </a:solidFill>
+                        </a:rPr>
+                        <a:t>();</a:t>
+                      </a:r>
+                    </a:p>
+                    <a:p>
+                      <a:pPr latinLnBrk="1"/>
+                      <a:r>
+                        <a:rPr lang="en-US" altLang="ko-KR" sz="900" b="0" dirty="0" smtClean="0">
+                          <a:solidFill>
+                            <a:schemeClr val="tx1"/>
+                          </a:solidFill>
+                        </a:rPr>
+                        <a:t>+ ~</a:t>
+                      </a:r>
+                      <a:r>
+                        <a:rPr lang="en-US" altLang="ko-KR" sz="900" b="0" dirty="0" smtClean="0">
+                          <a:solidFill>
+                            <a:schemeClr val="tx1"/>
+                          </a:solidFill>
+                        </a:rPr>
+                        <a:t>Snake</a:t>
+                      </a:r>
+                      <a:r>
+                        <a:rPr lang="en-US" altLang="ko-KR" sz="900" b="0" dirty="0" smtClean="0">
+                          <a:solidFill>
+                            <a:schemeClr val="tx1"/>
+                          </a:solidFill>
+                        </a:rPr>
+                        <a:t>();</a:t>
+                      </a:r>
+                      <a:endParaRPr lang="en-US" altLang="ko-KR" sz="900" b="0" dirty="0" smtClean="0">
+                        <a:solidFill>
+                          <a:schemeClr val="tx1"/>
+                        </a:solidFill>
+                      </a:endParaRPr>
+                    </a:p>
+                    <a:p>
+                      <a:pPr marL="171450" indent="-171450" latinLnBrk="1">
+                        <a:buFontTx/>
+                        <a:buChar char="-"/>
+                      </a:pPr>
+                      <a:r>
+                        <a:rPr lang="en-US" altLang="ko-KR" sz="900" b="0" baseline="0" dirty="0" smtClean="0">
+                          <a:solidFill>
+                            <a:schemeClr val="tx1"/>
+                          </a:solidFill>
+                        </a:rPr>
+                        <a:t>void </a:t>
+                      </a:r>
+                      <a:r>
+                        <a:rPr lang="en-US" altLang="ko-KR" sz="900" b="0" baseline="0" dirty="0" err="1" smtClean="0">
+                          <a:solidFill>
+                            <a:schemeClr val="tx1"/>
+                          </a:solidFill>
+                        </a:rPr>
+                        <a:t>init</a:t>
+                      </a:r>
+                      <a:r>
+                        <a:rPr lang="en-US" altLang="ko-KR" sz="900" b="0" baseline="0" dirty="0" smtClean="0">
+                          <a:solidFill>
+                            <a:schemeClr val="tx1"/>
+                          </a:solidFill>
+                        </a:rPr>
+                        <a:t>();</a:t>
+                      </a:r>
+                    </a:p>
+                    <a:p>
+                      <a:pPr marL="0" indent="0" latinLnBrk="1">
+                        <a:buFontTx/>
+                        <a:buNone/>
+                      </a:pPr>
+                      <a:endParaRPr lang="en-US" altLang="ko-KR" sz="900" b="0" dirty="0" smtClean="0">
+                        <a:solidFill>
+                          <a:schemeClr val="tx1"/>
+                        </a:solidFill>
+                      </a:endParaRPr>
+                    </a:p>
+                    <a:p>
+                      <a:pPr latinLnBrk="1"/>
+                      <a:r>
+                        <a:rPr lang="en-US" altLang="ko-KR" sz="900" b="0" dirty="0" smtClean="0">
+                          <a:solidFill>
+                            <a:schemeClr val="tx1"/>
+                          </a:solidFill>
+                        </a:rPr>
+                        <a:t>+ </a:t>
+                      </a:r>
+                      <a:r>
+                        <a:rPr lang="en-US" altLang="ko-KR" sz="900" b="0" dirty="0" err="1" smtClean="0">
+                          <a:solidFill>
+                            <a:schemeClr val="tx1"/>
+                          </a:solidFill>
+                        </a:rPr>
+                        <a:t>int</a:t>
+                      </a:r>
+                      <a:r>
+                        <a:rPr lang="en-US" altLang="ko-KR" sz="900" b="0" baseline="0" dirty="0" smtClean="0">
+                          <a:solidFill>
+                            <a:schemeClr val="tx1"/>
+                          </a:solidFill>
+                        </a:rPr>
+                        <a:t> </a:t>
+                      </a:r>
+                      <a:r>
+                        <a:rPr lang="en-US" altLang="ko-KR" sz="900" b="0" baseline="0" dirty="0" err="1" smtClean="0">
+                          <a:solidFill>
+                            <a:schemeClr val="tx1"/>
+                          </a:solidFill>
+                        </a:rPr>
+                        <a:t>GetSize</a:t>
+                      </a:r>
+                      <a:r>
+                        <a:rPr lang="en-US" altLang="ko-KR" sz="900" b="0" baseline="0" dirty="0" smtClean="0">
+                          <a:solidFill>
+                            <a:schemeClr val="tx1"/>
+                          </a:solidFill>
+                        </a:rPr>
+                        <a:t>();</a:t>
+                      </a:r>
+                    </a:p>
+                    <a:p>
+                      <a:pPr latinLnBrk="1"/>
+                      <a:r>
+                        <a:rPr lang="en-US" altLang="ko-KR" sz="900" b="0" baseline="0" dirty="0" smtClean="0">
+                          <a:solidFill>
+                            <a:schemeClr val="tx1"/>
+                          </a:solidFill>
+                        </a:rPr>
+                        <a:t>+ </a:t>
+                      </a:r>
+                      <a:r>
+                        <a:rPr lang="en-US" altLang="ko-KR" sz="900" b="0" baseline="0" dirty="0" err="1" smtClean="0">
+                          <a:solidFill>
+                            <a:schemeClr val="tx1"/>
+                          </a:solidFill>
+                        </a:rPr>
+                        <a:t>const</a:t>
+                      </a:r>
+                      <a:r>
+                        <a:rPr lang="en-US" altLang="ko-KR" sz="900" b="0" baseline="0" dirty="0" smtClean="0">
+                          <a:solidFill>
+                            <a:schemeClr val="tx1"/>
+                          </a:solidFill>
+                        </a:rPr>
+                        <a:t> Direction </a:t>
+                      </a:r>
+                      <a:r>
+                        <a:rPr lang="en-US" altLang="ko-KR" sz="900" b="0" baseline="0" dirty="0" err="1" smtClean="0">
+                          <a:solidFill>
+                            <a:schemeClr val="tx1"/>
+                          </a:solidFill>
+                        </a:rPr>
+                        <a:t>GetDir</a:t>
+                      </a:r>
+                      <a:r>
+                        <a:rPr lang="en-US" altLang="ko-KR" sz="900" b="0" baseline="0" dirty="0" smtClean="0">
+                          <a:solidFill>
+                            <a:schemeClr val="tx1"/>
+                          </a:solidFill>
+                        </a:rPr>
+                        <a:t>() </a:t>
+                      </a:r>
+                      <a:r>
+                        <a:rPr lang="en-US" altLang="ko-KR" sz="900" b="0" baseline="0" dirty="0" err="1" smtClean="0">
+                          <a:solidFill>
+                            <a:schemeClr val="tx1"/>
+                          </a:solidFill>
+                        </a:rPr>
+                        <a:t>const</a:t>
+                      </a:r>
+                      <a:r>
+                        <a:rPr lang="en-US" altLang="ko-KR" sz="900" b="0" baseline="0" dirty="0" smtClean="0">
+                          <a:solidFill>
+                            <a:schemeClr val="tx1"/>
+                          </a:solidFill>
+                        </a:rPr>
+                        <a:t>;</a:t>
+                      </a:r>
+                      <a:endParaRPr lang="en-US" altLang="ko-KR" sz="900" b="0" baseline="0" dirty="0" smtClean="0">
+                        <a:solidFill>
+                          <a:schemeClr val="tx1"/>
+                        </a:solidFill>
+                      </a:endParaRPr>
+                    </a:p>
+                    <a:p>
+                      <a:pPr latinLnBrk="1"/>
+                      <a:r>
+                        <a:rPr lang="en-US" altLang="ko-KR" sz="900" b="0" baseline="0" dirty="0" smtClean="0">
+                          <a:solidFill>
+                            <a:schemeClr val="tx1"/>
+                          </a:solidFill>
+                        </a:rPr>
+                        <a:t>+ Direction </a:t>
+                      </a:r>
+                      <a:r>
+                        <a:rPr lang="en-US" altLang="ko-KR" sz="900" b="0" baseline="0" dirty="0" err="1" smtClean="0">
+                          <a:solidFill>
+                            <a:schemeClr val="tx1"/>
+                          </a:solidFill>
+                        </a:rPr>
+                        <a:t>SetDir</a:t>
+                      </a:r>
+                      <a:r>
+                        <a:rPr lang="en-US" altLang="ko-KR" sz="900" b="0" baseline="0" dirty="0" smtClean="0">
+                          <a:solidFill>
+                            <a:schemeClr val="tx1"/>
+                          </a:solidFill>
+                        </a:rPr>
+                        <a:t>(Direction </a:t>
+                      </a:r>
+                      <a:r>
+                        <a:rPr lang="en-US" altLang="ko-KR" sz="900" b="0" baseline="0" dirty="0" err="1" smtClean="0">
+                          <a:solidFill>
+                            <a:schemeClr val="tx1"/>
+                          </a:solidFill>
+                        </a:rPr>
+                        <a:t>NextDir</a:t>
+                      </a:r>
+                      <a:r>
+                        <a:rPr lang="en-US" altLang="ko-KR" sz="900" b="0" baseline="0" dirty="0" smtClean="0">
+                          <a:solidFill>
+                            <a:schemeClr val="tx1"/>
+                          </a:solidFill>
+                        </a:rPr>
+                        <a:t>);</a:t>
+                      </a:r>
+                    </a:p>
+                    <a:p>
+                      <a:pPr latinLnBrk="1"/>
+                      <a:r>
+                        <a:rPr lang="en-US" altLang="ko-KR" sz="900" b="0" baseline="0" dirty="0" smtClean="0">
+                          <a:solidFill>
+                            <a:schemeClr val="tx1"/>
+                          </a:solidFill>
+                        </a:rPr>
+                        <a:t>+ bool </a:t>
+                      </a:r>
+                      <a:r>
+                        <a:rPr lang="en-US" altLang="ko-KR" sz="900" b="0" baseline="0" dirty="0" err="1" smtClean="0">
+                          <a:solidFill>
+                            <a:schemeClr val="tx1"/>
+                          </a:solidFill>
+                        </a:rPr>
+                        <a:t>MoveSnake</a:t>
+                      </a:r>
+                      <a:r>
+                        <a:rPr lang="en-US" altLang="ko-KR" sz="900" b="0" baseline="0" dirty="0" smtClean="0">
+                          <a:solidFill>
+                            <a:schemeClr val="tx1"/>
+                          </a:solidFill>
+                        </a:rPr>
+                        <a:t>(</a:t>
+                      </a:r>
+                      <a:r>
+                        <a:rPr lang="en-US" altLang="ko-KR" sz="900" b="0" baseline="0" dirty="0" err="1" smtClean="0">
+                          <a:solidFill>
+                            <a:schemeClr val="tx1"/>
+                          </a:solidFill>
+                        </a:rPr>
+                        <a:t>int</a:t>
+                      </a:r>
+                      <a:r>
+                        <a:rPr lang="en-US" altLang="ko-KR" sz="900" b="0" baseline="0" dirty="0" smtClean="0">
+                          <a:solidFill>
+                            <a:schemeClr val="tx1"/>
+                          </a:solidFill>
+                        </a:rPr>
+                        <a:t> X, </a:t>
+                      </a:r>
+                      <a:r>
+                        <a:rPr lang="en-US" altLang="ko-KR" sz="900" b="0" baseline="0" dirty="0" err="1" smtClean="0">
+                          <a:solidFill>
+                            <a:schemeClr val="tx1"/>
+                          </a:solidFill>
+                        </a:rPr>
+                        <a:t>int</a:t>
+                      </a:r>
+                      <a:r>
+                        <a:rPr lang="en-US" altLang="ko-KR" sz="900" b="0" baseline="0" dirty="0" smtClean="0">
+                          <a:solidFill>
+                            <a:schemeClr val="tx1"/>
+                          </a:solidFill>
+                        </a:rPr>
+                        <a:t> Y, APPLE_CLR=NONECOLOR); </a:t>
+                      </a:r>
+                      <a:endParaRPr lang="en-US" altLang="ko-KR" sz="900" b="0" baseline="0" dirty="0" smtClean="0">
+                        <a:solidFill>
+                          <a:schemeClr val="tx1"/>
+                        </a:solidFill>
+                      </a:endParaRPr>
+                    </a:p>
+                    <a:p>
+                      <a:pPr latinLnBrk="1"/>
+                      <a:r>
+                        <a:rPr lang="en-US" altLang="ko-KR" sz="900" b="0" kern="1200" baseline="0" dirty="0" smtClean="0">
+                          <a:solidFill>
+                            <a:schemeClr val="tx1"/>
+                          </a:solidFill>
+                          <a:latin typeface="+mn-lt"/>
+                          <a:ea typeface="+mn-ea"/>
+                          <a:cs typeface="+mn-cs"/>
+                        </a:rPr>
+                        <a:t>+ </a:t>
+                      </a:r>
+                      <a:r>
+                        <a:rPr lang="en-US" altLang="ko-KR" sz="900" b="0" kern="1200" baseline="0" dirty="0" err="1" smtClean="0">
+                          <a:solidFill>
+                            <a:schemeClr val="tx1"/>
+                          </a:solidFill>
+                          <a:latin typeface="+mn-lt"/>
+                          <a:ea typeface="+mn-ea"/>
+                          <a:cs typeface="+mn-cs"/>
+                        </a:rPr>
+                        <a:t>const</a:t>
+                      </a:r>
+                      <a:r>
+                        <a:rPr lang="en-US" altLang="ko-KR" sz="900" b="0" kern="1200" baseline="0" dirty="0" smtClean="0">
+                          <a:solidFill>
+                            <a:schemeClr val="tx1"/>
+                          </a:solidFill>
+                          <a:latin typeface="+mn-lt"/>
+                          <a:ea typeface="+mn-ea"/>
+                          <a:cs typeface="+mn-cs"/>
+                        </a:rPr>
+                        <a:t> Point </a:t>
+                      </a:r>
+                      <a:r>
+                        <a:rPr lang="en-US" altLang="ko-KR" sz="900" b="0" kern="1200" baseline="0" dirty="0" err="1" smtClean="0">
+                          <a:solidFill>
+                            <a:schemeClr val="tx1"/>
+                          </a:solidFill>
+                          <a:latin typeface="+mn-lt"/>
+                          <a:ea typeface="+mn-ea"/>
+                          <a:cs typeface="+mn-cs"/>
+                        </a:rPr>
+                        <a:t>GetNextPosition</a:t>
+                      </a:r>
+                      <a:r>
+                        <a:rPr lang="en-US" altLang="ko-KR" sz="900" b="0" kern="1200" baseline="0" dirty="0" smtClean="0">
+                          <a:solidFill>
+                            <a:schemeClr val="tx1"/>
+                          </a:solidFill>
+                          <a:latin typeface="+mn-lt"/>
+                          <a:ea typeface="+mn-ea"/>
+                          <a:cs typeface="+mn-cs"/>
+                        </a:rPr>
+                        <a:t>();</a:t>
+                      </a:r>
+                    </a:p>
+                    <a:p>
+                      <a:pPr marL="0" algn="l" defTabSz="914400" rtl="0" eaLnBrk="1" latinLnBrk="1" hangingPunct="1"/>
+                      <a:r>
+                        <a:rPr lang="en-US" altLang="ko-KR" sz="900" b="0" kern="1200" baseline="0" dirty="0" smtClean="0">
+                          <a:solidFill>
+                            <a:schemeClr val="tx1"/>
+                          </a:solidFill>
+                          <a:latin typeface="+mn-lt"/>
+                          <a:ea typeface="+mn-ea"/>
+                          <a:cs typeface="+mn-cs"/>
+                        </a:rPr>
+                        <a:t>+ </a:t>
+                      </a:r>
+                      <a:r>
+                        <a:rPr lang="en-US" altLang="ko-KR" sz="900" b="0" kern="1200" baseline="0" dirty="0" err="1" smtClean="0">
+                          <a:solidFill>
+                            <a:schemeClr val="tx1"/>
+                          </a:solidFill>
+                          <a:latin typeface="+mn-lt"/>
+                          <a:ea typeface="+mn-ea"/>
+                          <a:cs typeface="+mn-cs"/>
+                        </a:rPr>
+                        <a:t>const</a:t>
+                      </a:r>
+                      <a:r>
+                        <a:rPr lang="en-US" altLang="ko-KR" sz="900" b="0" kern="1200" baseline="0" dirty="0" smtClean="0">
+                          <a:solidFill>
+                            <a:schemeClr val="tx1"/>
+                          </a:solidFill>
+                          <a:latin typeface="+mn-lt"/>
+                          <a:ea typeface="+mn-ea"/>
+                          <a:cs typeface="+mn-cs"/>
+                        </a:rPr>
+                        <a:t> vector&lt;pair&lt;</a:t>
+                      </a:r>
+                      <a:r>
+                        <a:rPr lang="en-US" altLang="ko-KR" sz="900" b="0" kern="1200" baseline="0" dirty="0" err="1" smtClean="0">
+                          <a:solidFill>
+                            <a:schemeClr val="tx1"/>
+                          </a:solidFill>
+                          <a:latin typeface="+mn-lt"/>
+                          <a:ea typeface="+mn-ea"/>
+                          <a:cs typeface="+mn-cs"/>
+                        </a:rPr>
+                        <a:t>int</a:t>
+                      </a:r>
+                      <a:r>
+                        <a:rPr lang="en-US" altLang="ko-KR" sz="900" b="0" kern="1200" baseline="0" dirty="0" smtClean="0">
+                          <a:solidFill>
+                            <a:schemeClr val="tx1"/>
+                          </a:solidFill>
+                          <a:latin typeface="+mn-lt"/>
+                          <a:ea typeface="+mn-ea"/>
+                          <a:cs typeface="+mn-cs"/>
+                        </a:rPr>
+                        <a:t>, </a:t>
+                      </a:r>
+                      <a:r>
+                        <a:rPr lang="en-US" altLang="ko-KR" sz="900" b="0" kern="1200" baseline="0" dirty="0" err="1" smtClean="0">
+                          <a:solidFill>
+                            <a:schemeClr val="tx1"/>
+                          </a:solidFill>
+                          <a:latin typeface="+mn-lt"/>
+                          <a:ea typeface="+mn-ea"/>
+                          <a:cs typeface="+mn-cs"/>
+                        </a:rPr>
+                        <a:t>int</a:t>
+                      </a:r>
+                      <a:r>
+                        <a:rPr lang="en-US" altLang="ko-KR" sz="900" b="0" kern="1200" baseline="0" dirty="0" smtClean="0">
+                          <a:solidFill>
+                            <a:schemeClr val="tx1"/>
+                          </a:solidFill>
+                          <a:latin typeface="+mn-lt"/>
+                          <a:ea typeface="+mn-ea"/>
+                          <a:cs typeface="+mn-cs"/>
+                        </a:rPr>
+                        <a:t>&gt;&gt;* </a:t>
+                      </a:r>
+                      <a:r>
+                        <a:rPr lang="en-US" altLang="ko-KR" sz="900" b="0" kern="1200" baseline="0" dirty="0" err="1" smtClean="0">
+                          <a:solidFill>
+                            <a:schemeClr val="tx1"/>
+                          </a:solidFill>
+                          <a:latin typeface="+mn-lt"/>
+                          <a:ea typeface="+mn-ea"/>
+                          <a:cs typeface="+mn-cs"/>
+                        </a:rPr>
+                        <a:t>GetSnakePosition</a:t>
+                      </a:r>
+                      <a:r>
+                        <a:rPr lang="en-US" altLang="ko-KR" sz="900" b="0" kern="1200" baseline="0" dirty="0" smtClean="0">
+                          <a:solidFill>
+                            <a:schemeClr val="tx1"/>
+                          </a:solidFill>
+                          <a:latin typeface="+mn-lt"/>
+                          <a:ea typeface="+mn-ea"/>
+                          <a:cs typeface="+mn-cs"/>
+                        </a:rPr>
+                        <a:t>() </a:t>
+                      </a:r>
+                      <a:r>
+                        <a:rPr lang="en-US" altLang="ko-KR" sz="900" b="0" kern="1200" baseline="0" dirty="0" err="1" smtClean="0">
+                          <a:solidFill>
+                            <a:schemeClr val="tx1"/>
+                          </a:solidFill>
+                          <a:latin typeface="+mn-lt"/>
+                          <a:ea typeface="+mn-ea"/>
+                          <a:cs typeface="+mn-cs"/>
+                        </a:rPr>
+                        <a:t>const</a:t>
+                      </a:r>
+                      <a:r>
+                        <a:rPr lang="en-US" altLang="ko-KR" sz="900" b="0" kern="1200" baseline="0" dirty="0" smtClean="0">
+                          <a:solidFill>
+                            <a:schemeClr val="tx1"/>
+                          </a:solidFill>
+                          <a:latin typeface="+mn-lt"/>
+                          <a:ea typeface="+mn-ea"/>
+                          <a:cs typeface="+mn-cs"/>
+                        </a:rPr>
+                        <a:t>;</a:t>
+                      </a:r>
+                      <a:endParaRPr lang="en-US" altLang="ko-KR" sz="900" b="0" kern="1200" baseline="0" dirty="0" smtClean="0">
+                        <a:solidFill>
+                          <a:schemeClr val="tx1"/>
+                        </a:solidFill>
+                        <a:latin typeface="+mn-lt"/>
+                        <a:ea typeface="+mn-ea"/>
+                        <a:cs typeface="+mn-cs"/>
+                      </a:endParaRPr>
+                    </a:p>
+                    <a:p>
+                      <a:pPr marL="0" algn="l" defTabSz="914400" rtl="0" eaLnBrk="1" latinLnBrk="1" hangingPunct="1"/>
+                      <a:r>
+                        <a:rPr lang="en-US" altLang="ko-KR" sz="900" b="0" kern="1200" baseline="0" dirty="0" smtClean="0">
+                          <a:solidFill>
+                            <a:schemeClr val="tx1"/>
+                          </a:solidFill>
+                          <a:latin typeface="+mn-lt"/>
+                          <a:ea typeface="+mn-ea"/>
+                          <a:cs typeface="+mn-cs"/>
+                        </a:rPr>
+                        <a:t>- bool </a:t>
+                      </a:r>
+                      <a:r>
+                        <a:rPr lang="en-US" altLang="ko-KR" sz="900" b="0" kern="1200" baseline="0" dirty="0" err="1" smtClean="0">
+                          <a:solidFill>
+                            <a:schemeClr val="tx1"/>
+                          </a:solidFill>
+                          <a:latin typeface="+mn-lt"/>
+                          <a:ea typeface="+mn-ea"/>
+                          <a:cs typeface="+mn-cs"/>
+                        </a:rPr>
+                        <a:t>SnakeSelfKill</a:t>
+                      </a:r>
+                      <a:r>
+                        <a:rPr lang="en-US" altLang="ko-KR" sz="900" b="0" kern="1200" baseline="0" dirty="0" smtClean="0">
+                          <a:solidFill>
+                            <a:schemeClr val="tx1"/>
+                          </a:solidFill>
+                          <a:latin typeface="+mn-lt"/>
+                          <a:ea typeface="+mn-ea"/>
+                          <a:cs typeface="+mn-cs"/>
+                        </a:rPr>
+                        <a:t>();</a:t>
+                      </a:r>
+                      <a:endParaRPr lang="ko-KR" altLang="en-US" sz="900" b="0" kern="1200" baseline="0" dirty="0">
+                        <a:solidFill>
+                          <a:schemeClr val="tx1"/>
+                        </a:solidFill>
+                        <a:latin typeface="+mn-lt"/>
+                        <a:ea typeface="+mn-ea"/>
+                        <a:cs typeface="+mn-cs"/>
+                      </a:endParaRPr>
+                    </a:p>
+                  </a:txBody>
+                  <a:tcPr/>
+                </a:tc>
+                <a:extLst>
+                  <a:ext uri="{0D108BD9-81ED-4DB2-BD59-A6C34878D82A}">
+                    <a16:rowId xmlns:a16="http://schemas.microsoft.com/office/drawing/2014/main" val="10002"/>
+                  </a:ext>
+                </a:extLst>
+              </a:tr>
+            </a:tbl>
+          </a:graphicData>
+        </a:graphic>
+      </p:graphicFrame>
+      <p:graphicFrame>
+        <p:nvGraphicFramePr>
+          <p:cNvPr id="9" name="표 8"/>
+          <p:cNvGraphicFramePr>
+            <a:graphicFrameLocks noGrp="1"/>
+          </p:cNvGraphicFramePr>
+          <p:nvPr>
+            <p:extLst>
+              <p:ext uri="{D42A27DB-BD31-4B8C-83A1-F6EECF244321}">
+                <p14:modId xmlns:p14="http://schemas.microsoft.com/office/powerpoint/2010/main" val="1895912771"/>
+              </p:ext>
+            </p:extLst>
+          </p:nvPr>
+        </p:nvGraphicFramePr>
+        <p:xfrm>
+          <a:off x="8695092" y="2376853"/>
+          <a:ext cx="3368182" cy="2197375"/>
+        </p:xfrm>
+        <a:graphic>
+          <a:graphicData uri="http://schemas.openxmlformats.org/drawingml/2006/table">
+            <a:tbl>
+              <a:tblPr firstRow="1" bandRow="1">
+                <a:tableStyleId>{5C22544A-7EE6-4342-B048-85BDC9FD1C3A}</a:tableStyleId>
+              </a:tblPr>
+              <a:tblGrid>
+                <a:gridCol w="3368182">
+                  <a:extLst>
+                    <a:ext uri="{9D8B030D-6E8A-4147-A177-3AD203B41FA5}">
+                      <a16:colId xmlns:a16="http://schemas.microsoft.com/office/drawing/2014/main" val="20000"/>
+                    </a:ext>
+                  </a:extLst>
+                </a:gridCol>
+              </a:tblGrid>
+              <a:tr h="203200">
+                <a:tc>
+                  <a:txBody>
+                    <a:bodyPr/>
+                    <a:lstStyle/>
+                    <a:p>
+                      <a:pPr latinLnBrk="1"/>
+                      <a:r>
+                        <a:rPr lang="en-US" altLang="ko-KR" sz="1000" dirty="0" smtClean="0"/>
+                        <a:t>Apple</a:t>
+                      </a:r>
+                      <a:endParaRPr lang="ko-KR" altLang="en-US" sz="1000" dirty="0">
+                        <a:solidFill>
+                          <a:srgbClr val="FF0000"/>
+                        </a:solidFill>
+                      </a:endParaRPr>
+                    </a:p>
+                  </a:txBody>
+                  <a:tcPr/>
+                </a:tc>
+                <a:extLst>
+                  <a:ext uri="{0D108BD9-81ED-4DB2-BD59-A6C34878D82A}">
+                    <a16:rowId xmlns:a16="http://schemas.microsoft.com/office/drawing/2014/main" val="10000"/>
+                  </a:ext>
+                </a:extLst>
+              </a:tr>
+              <a:tr h="297180">
+                <a:tc>
+                  <a:txBody>
+                    <a:bodyPr/>
+                    <a:lstStyle/>
+                    <a:p>
+                      <a:pPr latinLnBrk="1"/>
+                      <a:r>
+                        <a:rPr lang="en-US" altLang="ko-KR" sz="1000" dirty="0" smtClean="0"/>
+                        <a:t>- APPLE_COLOR </a:t>
+                      </a:r>
+                      <a:r>
+                        <a:rPr lang="en-US" altLang="ko-KR" sz="1000" dirty="0" err="1" smtClean="0"/>
+                        <a:t>eColor</a:t>
+                      </a:r>
+                      <a:r>
+                        <a:rPr lang="en-US" altLang="ko-KR" sz="1000" dirty="0" smtClean="0"/>
+                        <a:t>;</a:t>
+                      </a:r>
+                    </a:p>
+                    <a:p>
+                      <a:pPr latinLnBrk="1"/>
+                      <a:r>
+                        <a:rPr lang="en-US" altLang="ko-KR" sz="1000" dirty="0" smtClean="0"/>
+                        <a:t>- Point</a:t>
+                      </a:r>
+                      <a:r>
+                        <a:rPr lang="en-US" altLang="ko-KR" sz="1000" baseline="0" dirty="0" smtClean="0"/>
+                        <a:t> </a:t>
+                      </a:r>
+                      <a:r>
+                        <a:rPr lang="en-US" altLang="ko-KR" sz="1000" baseline="0" dirty="0" err="1" smtClean="0"/>
+                        <a:t>sApplePosition</a:t>
+                      </a:r>
+                      <a:r>
+                        <a:rPr lang="en-US" altLang="ko-KR" sz="1000" baseline="0" dirty="0" smtClean="0"/>
+                        <a:t>;</a:t>
+                      </a:r>
+                      <a:endParaRPr lang="en-US" altLang="ko-KR" sz="1000" dirty="0" smtClean="0"/>
+                    </a:p>
+                  </a:txBody>
+                  <a:tcPr/>
+                </a:tc>
+                <a:extLst>
+                  <a:ext uri="{0D108BD9-81ED-4DB2-BD59-A6C34878D82A}">
+                    <a16:rowId xmlns:a16="http://schemas.microsoft.com/office/drawing/2014/main" val="10001"/>
+                  </a:ext>
+                </a:extLst>
+              </a:tr>
+              <a:tr h="1557295">
+                <a:tc>
+                  <a:txBody>
+                    <a:bodyPr/>
+                    <a:lstStyle/>
+                    <a:p>
+                      <a:pPr latinLnBrk="1"/>
+                      <a:r>
+                        <a:rPr lang="en-US" altLang="ko-KR" sz="900" dirty="0" smtClean="0"/>
+                        <a:t>+ Ap</a:t>
+                      </a:r>
+                      <a:r>
+                        <a:rPr lang="en-US" altLang="ko-KR" sz="900" b="0" dirty="0" smtClean="0">
+                          <a:solidFill>
+                            <a:schemeClr val="tx1"/>
+                          </a:solidFill>
+                        </a:rPr>
+                        <a:t>ple</a:t>
+                      </a:r>
+                      <a:r>
+                        <a:rPr lang="en-US" altLang="ko-KR" sz="900" b="0" dirty="0" smtClean="0">
+                          <a:solidFill>
+                            <a:schemeClr val="tx1"/>
+                          </a:solidFill>
+                        </a:rPr>
+                        <a:t>();</a:t>
+                      </a:r>
+                    </a:p>
+                    <a:p>
+                      <a:pPr latinLnBrk="1"/>
+                      <a:r>
+                        <a:rPr lang="en-US" altLang="ko-KR" sz="900" b="0" dirty="0" smtClean="0">
+                          <a:solidFill>
+                            <a:schemeClr val="tx1"/>
+                          </a:solidFill>
+                        </a:rPr>
+                        <a:t>+ ~</a:t>
+                      </a:r>
+                      <a:r>
+                        <a:rPr lang="en-US" altLang="ko-KR" sz="900" b="0" dirty="0" smtClean="0">
+                          <a:solidFill>
+                            <a:schemeClr val="tx1"/>
+                          </a:solidFill>
+                        </a:rPr>
+                        <a:t>Apple();</a:t>
+                      </a:r>
+                    </a:p>
+                    <a:p>
+                      <a:pPr latinLnBrk="1"/>
+                      <a:endParaRPr lang="en-US" altLang="ko-KR" sz="900" b="0" dirty="0" smtClean="0">
+                        <a:solidFill>
+                          <a:schemeClr val="tx1"/>
+                        </a:solidFill>
+                      </a:endParaRPr>
+                    </a:p>
+                    <a:p>
+                      <a:pPr latinLnBrk="1"/>
+                      <a:r>
+                        <a:rPr lang="en-US" altLang="ko-KR" sz="900" b="0" dirty="0" smtClean="0">
+                          <a:solidFill>
+                            <a:schemeClr val="tx1"/>
+                          </a:solidFill>
+                        </a:rPr>
+                        <a:t>+ void</a:t>
+                      </a:r>
+                      <a:r>
+                        <a:rPr lang="en-US" altLang="ko-KR" sz="900" b="0" baseline="0" dirty="0" smtClean="0">
+                          <a:solidFill>
+                            <a:schemeClr val="tx1"/>
+                          </a:solidFill>
+                        </a:rPr>
+                        <a:t> </a:t>
+                      </a:r>
+                      <a:r>
+                        <a:rPr lang="en-US" altLang="ko-KR" sz="900" b="0" baseline="0" dirty="0" err="1" smtClean="0">
+                          <a:solidFill>
+                            <a:schemeClr val="tx1"/>
+                          </a:solidFill>
+                        </a:rPr>
+                        <a:t>createApple</a:t>
+                      </a:r>
+                      <a:r>
+                        <a:rPr lang="en-US" altLang="ko-KR" sz="900" b="0" baseline="0" dirty="0" smtClean="0">
+                          <a:solidFill>
+                            <a:schemeClr val="tx1"/>
+                          </a:solidFill>
+                        </a:rPr>
+                        <a:t>(</a:t>
+                      </a:r>
+                      <a:r>
+                        <a:rPr lang="en-US" altLang="ko-KR" sz="900" b="0" baseline="0" dirty="0" err="1" smtClean="0">
+                          <a:solidFill>
+                            <a:schemeClr val="tx1"/>
+                          </a:solidFill>
+                        </a:rPr>
+                        <a:t>int</a:t>
+                      </a:r>
+                      <a:r>
+                        <a:rPr lang="en-US" altLang="ko-KR" sz="900" b="0" baseline="0" dirty="0" smtClean="0">
+                          <a:solidFill>
+                            <a:schemeClr val="tx1"/>
+                          </a:solidFill>
+                        </a:rPr>
+                        <a:t> </a:t>
+                      </a:r>
+                      <a:r>
+                        <a:rPr lang="en-US" altLang="ko-KR" sz="900" b="0" baseline="0" dirty="0" err="1" smtClean="0">
+                          <a:solidFill>
+                            <a:schemeClr val="tx1"/>
+                          </a:solidFill>
+                        </a:rPr>
+                        <a:t>nMapSizex</a:t>
+                      </a:r>
+                      <a:r>
+                        <a:rPr lang="en-US" altLang="ko-KR" sz="900" b="0" baseline="0" dirty="0" smtClean="0">
+                          <a:solidFill>
+                            <a:schemeClr val="tx1"/>
+                          </a:solidFill>
+                        </a:rPr>
+                        <a:t>, y, color);</a:t>
+                      </a:r>
+                    </a:p>
+                    <a:p>
+                      <a:pPr latinLnBrk="1"/>
+                      <a:r>
+                        <a:rPr lang="en-US" altLang="ko-KR" sz="900" b="0" baseline="0" dirty="0" smtClean="0">
+                          <a:solidFill>
+                            <a:schemeClr val="tx1"/>
+                          </a:solidFill>
+                        </a:rPr>
+                        <a:t>+ </a:t>
+                      </a:r>
+                      <a:r>
+                        <a:rPr lang="en-US" altLang="ko-KR" sz="900" b="0" baseline="0" dirty="0" err="1" smtClean="0">
+                          <a:solidFill>
+                            <a:schemeClr val="tx1"/>
+                          </a:solidFill>
+                        </a:rPr>
+                        <a:t>const</a:t>
+                      </a:r>
+                      <a:r>
+                        <a:rPr lang="en-US" altLang="ko-KR" sz="900" b="0" baseline="0" dirty="0" smtClean="0">
+                          <a:solidFill>
+                            <a:schemeClr val="tx1"/>
+                          </a:solidFill>
+                        </a:rPr>
+                        <a:t> </a:t>
+                      </a:r>
+                      <a:r>
+                        <a:rPr lang="en-US" altLang="ko-KR" sz="900" b="0" baseline="0" dirty="0" err="1" smtClean="0">
+                          <a:solidFill>
+                            <a:schemeClr val="tx1"/>
+                          </a:solidFill>
+                        </a:rPr>
+                        <a:t>int</a:t>
+                      </a:r>
+                      <a:r>
+                        <a:rPr lang="en-US" altLang="ko-KR" sz="900" b="0" baseline="0" dirty="0" smtClean="0">
+                          <a:solidFill>
+                            <a:schemeClr val="tx1"/>
+                          </a:solidFill>
+                        </a:rPr>
+                        <a:t> </a:t>
+                      </a:r>
+                      <a:r>
+                        <a:rPr lang="en-US" altLang="ko-KR" sz="900" b="0" baseline="0" dirty="0" err="1" smtClean="0">
+                          <a:solidFill>
+                            <a:schemeClr val="tx1"/>
+                          </a:solidFill>
+                        </a:rPr>
+                        <a:t>GetAppleX</a:t>
+                      </a:r>
+                      <a:r>
+                        <a:rPr lang="en-US" altLang="ko-KR" sz="900" b="0" baseline="0" dirty="0" smtClean="0">
+                          <a:solidFill>
+                            <a:schemeClr val="tx1"/>
+                          </a:solidFill>
+                        </a:rPr>
+                        <a:t>() </a:t>
+                      </a:r>
+                      <a:r>
+                        <a:rPr lang="en-US" altLang="ko-KR" sz="900" b="0" baseline="0" dirty="0" err="1" smtClean="0">
+                          <a:solidFill>
+                            <a:schemeClr val="tx1"/>
+                          </a:solidFill>
+                        </a:rPr>
+                        <a:t>const</a:t>
+                      </a:r>
+                      <a:r>
+                        <a:rPr lang="en-US" altLang="ko-KR" sz="900" b="0" baseline="0" dirty="0" smtClean="0">
+                          <a:solidFill>
+                            <a:schemeClr val="tx1"/>
+                          </a:solidFill>
+                        </a:rPr>
+                        <a:t>;</a:t>
+                      </a:r>
+                      <a:endParaRPr lang="en-US" altLang="ko-KR" sz="900" b="0" baseline="0" dirty="0" smtClean="0">
+                        <a:solidFill>
+                          <a:schemeClr val="tx1"/>
+                        </a:solidFill>
+                      </a:endParaRPr>
+                    </a:p>
+                    <a:p>
+                      <a:pPr latinLnBrk="1"/>
+                      <a:r>
+                        <a:rPr lang="en-US" altLang="ko-KR" sz="900" b="0" baseline="0" dirty="0" smtClean="0">
+                          <a:solidFill>
+                            <a:schemeClr val="tx1"/>
+                          </a:solidFill>
+                        </a:rPr>
+                        <a:t>+ </a:t>
+                      </a:r>
+                      <a:r>
+                        <a:rPr lang="en-US" altLang="ko-KR" sz="900" b="0" baseline="0" dirty="0" err="1" smtClean="0">
+                          <a:solidFill>
+                            <a:schemeClr val="tx1"/>
+                          </a:solidFill>
+                        </a:rPr>
+                        <a:t>const</a:t>
+                      </a:r>
+                      <a:r>
+                        <a:rPr lang="en-US" altLang="ko-KR" sz="900" b="0" baseline="0" dirty="0" smtClean="0">
+                          <a:solidFill>
+                            <a:schemeClr val="tx1"/>
+                          </a:solidFill>
+                        </a:rPr>
+                        <a:t> </a:t>
+                      </a:r>
+                      <a:r>
+                        <a:rPr lang="en-US" altLang="ko-KR" sz="900" b="0" baseline="0" dirty="0" err="1" smtClean="0">
+                          <a:solidFill>
+                            <a:schemeClr val="tx1"/>
+                          </a:solidFill>
+                        </a:rPr>
+                        <a:t>int</a:t>
+                      </a:r>
+                      <a:r>
+                        <a:rPr lang="en-US" altLang="ko-KR" sz="900" b="0" baseline="0" dirty="0" smtClean="0">
+                          <a:solidFill>
+                            <a:schemeClr val="tx1"/>
+                          </a:solidFill>
+                        </a:rPr>
+                        <a:t> </a:t>
+                      </a:r>
+                      <a:r>
+                        <a:rPr lang="en-US" altLang="ko-KR" sz="900" b="0" baseline="0" dirty="0" err="1" smtClean="0">
+                          <a:solidFill>
+                            <a:schemeClr val="tx1"/>
+                          </a:solidFill>
+                        </a:rPr>
+                        <a:t>GetAppleY</a:t>
+                      </a:r>
+                      <a:r>
+                        <a:rPr lang="en-US" altLang="ko-KR" sz="900" b="0" baseline="0" dirty="0" smtClean="0">
+                          <a:solidFill>
+                            <a:schemeClr val="tx1"/>
+                          </a:solidFill>
+                        </a:rPr>
+                        <a:t>() </a:t>
+                      </a:r>
+                      <a:r>
+                        <a:rPr lang="en-US" altLang="ko-KR" sz="900" b="0" baseline="0" dirty="0" err="1" smtClean="0">
+                          <a:solidFill>
+                            <a:schemeClr val="tx1"/>
+                          </a:solidFill>
+                        </a:rPr>
+                        <a:t>const</a:t>
+                      </a:r>
+                      <a:r>
+                        <a:rPr lang="en-US" altLang="ko-KR" sz="900" b="0" baseline="0" dirty="0" smtClean="0">
+                          <a:solidFill>
+                            <a:schemeClr val="tx1"/>
+                          </a:solidFill>
+                        </a:rPr>
+                        <a:t>;</a:t>
+                      </a:r>
+                      <a:endParaRPr lang="en-US" altLang="ko-KR" sz="900" b="0" baseline="0" dirty="0" smtClean="0">
+                        <a:solidFill>
+                          <a:schemeClr val="tx1"/>
+                        </a:solidFill>
+                      </a:endParaRPr>
+                    </a:p>
+                    <a:p>
+                      <a:pPr latinLnBrk="1"/>
+                      <a:r>
+                        <a:rPr lang="en-US" altLang="ko-KR" sz="900" b="0" baseline="0" dirty="0" smtClean="0">
+                          <a:solidFill>
+                            <a:schemeClr val="tx1"/>
+                          </a:solidFill>
+                        </a:rPr>
+                        <a:t>+ </a:t>
+                      </a:r>
+                      <a:r>
+                        <a:rPr lang="en-US" altLang="ko-KR" sz="900" b="0" baseline="0" dirty="0" err="1" smtClean="0">
+                          <a:solidFill>
+                            <a:schemeClr val="tx1"/>
+                          </a:solidFill>
+                        </a:rPr>
+                        <a:t>const</a:t>
+                      </a:r>
+                      <a:r>
+                        <a:rPr lang="en-US" altLang="ko-KR" sz="900" b="0" baseline="0" dirty="0" smtClean="0">
+                          <a:solidFill>
+                            <a:schemeClr val="tx1"/>
+                          </a:solidFill>
+                        </a:rPr>
+                        <a:t> APPLE_COLOR </a:t>
+                      </a:r>
+                      <a:r>
+                        <a:rPr lang="en-US" altLang="ko-KR" sz="900" b="0" baseline="0" dirty="0" err="1" smtClean="0">
+                          <a:solidFill>
+                            <a:schemeClr val="tx1"/>
+                          </a:solidFill>
+                        </a:rPr>
+                        <a:t>GetAppleColor</a:t>
+                      </a:r>
+                      <a:r>
+                        <a:rPr lang="en-US" altLang="ko-KR" sz="900" b="0" baseline="0" dirty="0" smtClean="0">
+                          <a:solidFill>
+                            <a:schemeClr val="tx1"/>
+                          </a:solidFill>
+                        </a:rPr>
+                        <a:t>() </a:t>
+                      </a:r>
+                      <a:r>
+                        <a:rPr lang="en-US" altLang="ko-KR" sz="900" b="0" baseline="0" dirty="0" err="1" smtClean="0">
+                          <a:solidFill>
+                            <a:schemeClr val="tx1"/>
+                          </a:solidFill>
+                        </a:rPr>
+                        <a:t>const</a:t>
+                      </a:r>
+                      <a:r>
+                        <a:rPr lang="en-US" altLang="ko-KR" sz="900" b="0" baseline="0" dirty="0" smtClean="0">
+                          <a:solidFill>
+                            <a:schemeClr val="tx1"/>
+                          </a:solidFill>
+                        </a:rPr>
+                        <a:t>;</a:t>
+                      </a:r>
+                      <a:endParaRPr lang="en-US" altLang="ko-KR" sz="900" b="0" baseline="0" dirty="0" smtClean="0">
+                        <a:solidFill>
+                          <a:schemeClr val="tx1"/>
+                        </a:solidFill>
+                      </a:endParaRPr>
+                    </a:p>
+                    <a:p>
+                      <a:pPr latinLnBrk="1"/>
+                      <a:endParaRPr lang="en-US" altLang="ko-KR" sz="900" b="0" baseline="0" dirty="0" smtClean="0">
+                        <a:solidFill>
+                          <a:schemeClr val="tx1"/>
+                        </a:solidFill>
+                      </a:endParaRPr>
+                    </a:p>
+                    <a:p>
+                      <a:pPr marL="171450" indent="-171450" latinLnBrk="1">
+                        <a:buFontTx/>
+                        <a:buChar char="-"/>
+                      </a:pPr>
+                      <a:r>
+                        <a:rPr lang="en-US" altLang="ko-KR" sz="900" b="0" baseline="0" dirty="0" smtClean="0">
+                          <a:solidFill>
+                            <a:schemeClr val="tx1"/>
+                          </a:solidFill>
+                        </a:rPr>
+                        <a:t>Point </a:t>
+                      </a:r>
+                      <a:r>
+                        <a:rPr lang="en-US" altLang="ko-KR" sz="900" b="0" baseline="0" dirty="0" err="1" smtClean="0">
+                          <a:solidFill>
+                            <a:schemeClr val="tx1"/>
+                          </a:solidFill>
+                        </a:rPr>
+                        <a:t>RandomXY</a:t>
+                      </a:r>
+                      <a:r>
+                        <a:rPr lang="en-US" altLang="ko-KR" sz="900" b="0" baseline="0" dirty="0" smtClean="0">
+                          <a:solidFill>
+                            <a:schemeClr val="tx1"/>
+                          </a:solidFill>
+                        </a:rPr>
+                        <a:t>(</a:t>
+                      </a:r>
+                      <a:r>
+                        <a:rPr lang="en-US" altLang="ko-KR" sz="900" b="0" baseline="0" dirty="0" err="1" smtClean="0">
+                          <a:solidFill>
+                            <a:schemeClr val="tx1"/>
+                          </a:solidFill>
+                        </a:rPr>
+                        <a:t>int</a:t>
+                      </a:r>
+                      <a:r>
+                        <a:rPr lang="en-US" altLang="ko-KR" sz="900" b="0" baseline="0" dirty="0" smtClean="0">
+                          <a:solidFill>
+                            <a:schemeClr val="tx1"/>
+                          </a:solidFill>
+                        </a:rPr>
+                        <a:t> </a:t>
+                      </a:r>
+                      <a:r>
+                        <a:rPr lang="en-US" altLang="ko-KR" sz="900" b="0" baseline="0" dirty="0" err="1" smtClean="0">
+                          <a:solidFill>
+                            <a:schemeClr val="tx1"/>
+                          </a:solidFill>
+                        </a:rPr>
+                        <a:t>nMax_X</a:t>
+                      </a:r>
+                      <a:r>
+                        <a:rPr lang="en-US" altLang="ko-KR" sz="900" b="0" baseline="0" dirty="0" smtClean="0">
+                          <a:solidFill>
+                            <a:schemeClr val="tx1"/>
+                          </a:solidFill>
+                        </a:rPr>
+                        <a:t>, </a:t>
+                      </a:r>
+                      <a:r>
+                        <a:rPr lang="en-US" altLang="ko-KR" sz="900" b="0" baseline="0" dirty="0" err="1" smtClean="0">
+                          <a:solidFill>
+                            <a:schemeClr val="tx1"/>
+                          </a:solidFill>
+                        </a:rPr>
+                        <a:t>int</a:t>
+                      </a:r>
+                      <a:r>
+                        <a:rPr lang="en-US" altLang="ko-KR" sz="900" b="0" baseline="0" dirty="0" smtClean="0">
+                          <a:solidFill>
+                            <a:schemeClr val="tx1"/>
+                          </a:solidFill>
+                        </a:rPr>
+                        <a:t> </a:t>
+                      </a:r>
+                      <a:r>
+                        <a:rPr lang="en-US" altLang="ko-KR" sz="900" b="0" baseline="0" dirty="0" err="1" smtClean="0">
+                          <a:solidFill>
+                            <a:schemeClr val="tx1"/>
+                          </a:solidFill>
+                        </a:rPr>
+                        <a:t>nMax_Y</a:t>
+                      </a:r>
+                      <a:r>
+                        <a:rPr lang="en-US" altLang="ko-KR" sz="900" b="0" baseline="0" dirty="0" smtClean="0">
+                          <a:solidFill>
+                            <a:schemeClr val="tx1"/>
+                          </a:solidFill>
+                        </a:rPr>
+                        <a:t>);</a:t>
+                      </a:r>
+                    </a:p>
+                    <a:p>
+                      <a:pPr marL="171450" indent="-171450" latinLnBrk="1">
+                        <a:buFontTx/>
+                        <a:buChar char="-"/>
+                      </a:pPr>
+                      <a:r>
+                        <a:rPr lang="en-US" altLang="ko-KR" sz="900" b="0" baseline="0" dirty="0" smtClean="0">
+                          <a:solidFill>
+                            <a:schemeClr val="tx1"/>
+                          </a:solidFill>
+                        </a:rPr>
+                        <a:t>APPLE_CLR </a:t>
+                      </a:r>
+                      <a:r>
+                        <a:rPr lang="en-US" altLang="ko-KR" sz="900" b="0" baseline="0" dirty="0" err="1" smtClean="0">
+                          <a:solidFill>
+                            <a:schemeClr val="tx1"/>
+                          </a:solidFill>
+                        </a:rPr>
+                        <a:t>RandomColor</a:t>
+                      </a:r>
+                      <a:r>
+                        <a:rPr lang="en-US" altLang="ko-KR" sz="900" b="0" baseline="0" dirty="0" smtClean="0">
+                          <a:solidFill>
+                            <a:schemeClr val="tx1"/>
+                          </a:solidFill>
+                        </a:rPr>
+                        <a:t>();</a:t>
+                      </a:r>
+                    </a:p>
+                  </a:txBody>
+                  <a:tcPr/>
+                </a:tc>
+                <a:extLst>
+                  <a:ext uri="{0D108BD9-81ED-4DB2-BD59-A6C34878D82A}">
+                    <a16:rowId xmlns:a16="http://schemas.microsoft.com/office/drawing/2014/main" val="10002"/>
+                  </a:ext>
+                </a:extLst>
+              </a:tr>
+            </a:tbl>
+          </a:graphicData>
+        </a:graphic>
+      </p:graphicFrame>
+      <p:graphicFrame>
+        <p:nvGraphicFramePr>
+          <p:cNvPr id="10" name="표 9"/>
+          <p:cNvGraphicFramePr>
+            <a:graphicFrameLocks noGrp="1"/>
+          </p:cNvGraphicFramePr>
+          <p:nvPr>
+            <p:extLst>
+              <p:ext uri="{D42A27DB-BD31-4B8C-83A1-F6EECF244321}">
+                <p14:modId xmlns:p14="http://schemas.microsoft.com/office/powerpoint/2010/main" val="1931348094"/>
+              </p:ext>
+            </p:extLst>
+          </p:nvPr>
+        </p:nvGraphicFramePr>
+        <p:xfrm>
+          <a:off x="3578605" y="2008099"/>
+          <a:ext cx="4766521" cy="2255520"/>
+        </p:xfrm>
+        <a:graphic>
+          <a:graphicData uri="http://schemas.openxmlformats.org/drawingml/2006/table">
+            <a:tbl>
+              <a:tblPr firstRow="1" bandRow="1">
+                <a:tableStyleId>{5C22544A-7EE6-4342-B048-85BDC9FD1C3A}</a:tableStyleId>
+              </a:tblPr>
+              <a:tblGrid>
+                <a:gridCol w="4766521">
+                  <a:extLst>
+                    <a:ext uri="{9D8B030D-6E8A-4147-A177-3AD203B41FA5}">
+                      <a16:colId xmlns:a16="http://schemas.microsoft.com/office/drawing/2014/main" val="20000"/>
+                    </a:ext>
+                  </a:extLst>
+                </a:gridCol>
+              </a:tblGrid>
+              <a:tr h="0">
+                <a:tc>
+                  <a:txBody>
+                    <a:bodyPr/>
+                    <a:lstStyle/>
+                    <a:p>
+                      <a:pPr latinLnBrk="1"/>
+                      <a:r>
+                        <a:rPr lang="en-US" altLang="ko-KR" sz="1000" dirty="0" smtClean="0"/>
+                        <a:t>MAP</a:t>
+                      </a:r>
+                      <a:endParaRPr lang="ko-KR" altLang="en-US" sz="1000" dirty="0">
+                        <a:solidFill>
+                          <a:srgbClr val="FF0000"/>
+                        </a:solidFill>
+                      </a:endParaRPr>
+                    </a:p>
+                  </a:txBody>
+                  <a:tcPr/>
+                </a:tc>
+                <a:extLst>
+                  <a:ext uri="{0D108BD9-81ED-4DB2-BD59-A6C34878D82A}">
+                    <a16:rowId xmlns:a16="http://schemas.microsoft.com/office/drawing/2014/main" val="10000"/>
+                  </a:ext>
+                </a:extLst>
+              </a:tr>
+              <a:tr h="492150">
+                <a:tc>
+                  <a:txBody>
+                    <a:bodyPr/>
+                    <a:lstStyle/>
+                    <a:p>
+                      <a:pPr latinLnBrk="1"/>
+                      <a:r>
+                        <a:rPr lang="en-US" altLang="ko-KR" sz="1000" dirty="0" smtClean="0"/>
+                        <a:t>- Size </a:t>
+                      </a:r>
+                      <a:r>
+                        <a:rPr lang="en-US" altLang="ko-KR" sz="1000" dirty="0" err="1" smtClean="0"/>
+                        <a:t>sMapSize</a:t>
+                      </a:r>
+                      <a:r>
+                        <a:rPr lang="en-US" altLang="ko-KR" sz="1000" dirty="0" smtClean="0"/>
+                        <a:t>;</a:t>
+                      </a:r>
+                      <a:endParaRPr lang="en-US" altLang="ko-KR" sz="1000" baseline="0" dirty="0" smtClean="0"/>
+                    </a:p>
+                    <a:p>
+                      <a:pPr latinLnBrk="1"/>
+                      <a:r>
+                        <a:rPr lang="en-US" altLang="ko-KR" sz="1000" baseline="0" dirty="0" smtClean="0"/>
+                        <a:t>- Vector&lt;Apple</a:t>
+                      </a:r>
+                      <a:r>
+                        <a:rPr lang="en-US" altLang="ko-KR" sz="1000" baseline="0" dirty="0" smtClean="0"/>
+                        <a:t>&gt; </a:t>
+                      </a:r>
+                      <a:r>
+                        <a:rPr lang="en-US" altLang="ko-KR" sz="1000" baseline="0" dirty="0" err="1" smtClean="0"/>
+                        <a:t>vApple</a:t>
+                      </a:r>
+                      <a:endParaRPr lang="en-US" altLang="ko-KR" sz="1000" baseline="0" dirty="0" smtClean="0"/>
+                    </a:p>
+                    <a:p>
+                      <a:pPr latinLnBrk="1"/>
+                      <a:r>
+                        <a:rPr lang="en-US" altLang="ko-KR" sz="1000" baseline="0" dirty="0" smtClean="0"/>
+                        <a:t>- Vector&lt;vector&lt;</a:t>
+                      </a:r>
+                      <a:r>
+                        <a:rPr lang="en-US" altLang="ko-KR" sz="1000" baseline="0" dirty="0" err="1" smtClean="0"/>
+                        <a:t>int</a:t>
+                      </a:r>
+                      <a:r>
+                        <a:rPr lang="en-US" altLang="ko-KR" sz="1000" baseline="0" dirty="0" smtClean="0"/>
+                        <a:t>&gt;&gt; </a:t>
+                      </a:r>
+                      <a:r>
+                        <a:rPr lang="en-US" altLang="ko-KR" sz="1000" baseline="0" dirty="0" err="1" smtClean="0"/>
+                        <a:t>vMap</a:t>
+                      </a:r>
+                      <a:r>
+                        <a:rPr lang="en-US" altLang="ko-KR" sz="1000" baseline="0" dirty="0" smtClean="0"/>
+                        <a:t>;</a:t>
+                      </a:r>
+                      <a:endParaRPr lang="ko-KR" altLang="en-US" sz="1000" dirty="0"/>
+                    </a:p>
+                  </a:txBody>
+                  <a:tcPr/>
+                </a:tc>
+                <a:extLst>
+                  <a:ext uri="{0D108BD9-81ED-4DB2-BD59-A6C34878D82A}">
+                    <a16:rowId xmlns:a16="http://schemas.microsoft.com/office/drawing/2014/main" val="10001"/>
+                  </a:ext>
+                </a:extLst>
+              </a:tr>
+              <a:tr h="931300">
+                <a:tc>
+                  <a:txBody>
+                    <a:bodyPr/>
+                    <a:lstStyle/>
+                    <a:p>
+                      <a:pPr latinLnBrk="1"/>
+                      <a:r>
+                        <a:rPr lang="en-US" altLang="ko-KR" sz="900" baseline="0" dirty="0" smtClean="0"/>
+                        <a:t>+ MAP</a:t>
+                      </a:r>
+                      <a:r>
+                        <a:rPr lang="en-US" altLang="ko-KR" sz="900" baseline="0" dirty="0" smtClean="0"/>
+                        <a:t>();</a:t>
+                      </a:r>
+                    </a:p>
+                    <a:p>
+                      <a:pPr latinLnBrk="1"/>
+                      <a:r>
+                        <a:rPr lang="en-US" altLang="ko-KR" sz="900" baseline="0" dirty="0" smtClean="0"/>
+                        <a:t>+ M</a:t>
+                      </a:r>
+                      <a:r>
+                        <a:rPr lang="en-US" altLang="ko-KR" sz="900" b="0" baseline="0" dirty="0" smtClean="0"/>
+                        <a:t>ap</a:t>
+                      </a:r>
+                      <a:r>
+                        <a:rPr lang="en-US" altLang="ko-KR" sz="900" b="0" baseline="0" dirty="0" smtClean="0">
+                          <a:solidFill>
+                            <a:schemeClr val="tx1"/>
+                          </a:solidFill>
+                        </a:rPr>
+                        <a:t>(</a:t>
+                      </a:r>
+                      <a:r>
+                        <a:rPr lang="en-US" altLang="ko-KR" sz="900" b="0" baseline="0" dirty="0" err="1" smtClean="0">
+                          <a:solidFill>
+                            <a:schemeClr val="tx1"/>
+                          </a:solidFill>
+                        </a:rPr>
+                        <a:t>const</a:t>
+                      </a:r>
+                      <a:r>
+                        <a:rPr lang="en-US" altLang="ko-KR" sz="900" b="0" baseline="0" dirty="0" smtClean="0">
+                          <a:solidFill>
+                            <a:schemeClr val="tx1"/>
+                          </a:solidFill>
+                        </a:rPr>
+                        <a:t> </a:t>
+                      </a:r>
+                      <a:r>
+                        <a:rPr lang="en-US" altLang="ko-KR" sz="900" b="0" baseline="0" dirty="0" smtClean="0">
+                          <a:solidFill>
+                            <a:schemeClr val="tx1"/>
+                          </a:solidFill>
+                        </a:rPr>
+                        <a:t>x, </a:t>
+                      </a:r>
+                      <a:r>
+                        <a:rPr lang="en-US" altLang="ko-KR" sz="900" b="0" baseline="0" dirty="0" err="1" smtClean="0">
+                          <a:solidFill>
+                            <a:schemeClr val="tx1"/>
+                          </a:solidFill>
+                        </a:rPr>
+                        <a:t>const</a:t>
+                      </a:r>
+                      <a:r>
+                        <a:rPr lang="en-US" altLang="ko-KR" sz="900" b="0" baseline="0" dirty="0" smtClean="0">
+                          <a:solidFill>
+                            <a:schemeClr val="tx1"/>
+                          </a:solidFill>
+                        </a:rPr>
+                        <a:t> y);</a:t>
+                      </a:r>
+                    </a:p>
+                    <a:p>
+                      <a:pPr latinLnBrk="1"/>
+                      <a:r>
+                        <a:rPr lang="en-US" altLang="ko-KR" sz="900" b="0" baseline="0" dirty="0" smtClean="0">
+                          <a:solidFill>
+                            <a:schemeClr val="tx1"/>
+                          </a:solidFill>
+                        </a:rPr>
+                        <a:t>+ ~</a:t>
+                      </a:r>
+                      <a:r>
+                        <a:rPr lang="en-US" altLang="ko-KR" sz="900" b="0" baseline="0" dirty="0" smtClean="0">
+                          <a:solidFill>
+                            <a:schemeClr val="tx1"/>
+                          </a:solidFill>
+                        </a:rPr>
+                        <a:t>MAP();</a:t>
+                      </a:r>
+                    </a:p>
+                    <a:p>
+                      <a:pPr latinLnBrk="1"/>
+                      <a:endParaRPr lang="en-US" altLang="ko-KR" sz="900" b="0" baseline="0" dirty="0" smtClean="0">
+                        <a:solidFill>
+                          <a:schemeClr val="tx1"/>
+                        </a:solidFill>
+                      </a:endParaRPr>
+                    </a:p>
+                    <a:p>
+                      <a:pPr latinLnBrk="1"/>
+                      <a:r>
+                        <a:rPr lang="en-US" altLang="ko-KR" sz="900" b="0" baseline="0" dirty="0" smtClean="0">
+                          <a:solidFill>
+                            <a:schemeClr val="tx1"/>
+                          </a:solidFill>
+                        </a:rPr>
+                        <a:t>+ SIZE </a:t>
+                      </a:r>
+                      <a:r>
+                        <a:rPr lang="en-US" altLang="ko-KR" sz="900" b="0" baseline="0" dirty="0" err="1" smtClean="0">
+                          <a:solidFill>
+                            <a:schemeClr val="tx1"/>
+                          </a:solidFill>
+                        </a:rPr>
+                        <a:t>GetMapSize</a:t>
+                      </a:r>
+                      <a:r>
+                        <a:rPr lang="en-US" altLang="ko-KR" sz="900" b="0" baseline="0" dirty="0" smtClean="0">
+                          <a:solidFill>
+                            <a:schemeClr val="tx1"/>
+                          </a:solidFill>
+                        </a:rPr>
+                        <a:t>();</a:t>
+                      </a:r>
+                    </a:p>
+                    <a:p>
+                      <a:pPr latinLnBrk="1"/>
+                      <a:r>
+                        <a:rPr lang="en-US" altLang="ko-KR" sz="900" b="0" baseline="0" dirty="0" smtClean="0">
+                          <a:solidFill>
+                            <a:schemeClr val="tx1"/>
+                          </a:solidFill>
+                        </a:rPr>
+                        <a:t>+ Void </a:t>
+                      </a:r>
+                      <a:r>
+                        <a:rPr lang="en-US" altLang="ko-KR" sz="900" b="0" baseline="0" dirty="0" err="1" smtClean="0">
+                          <a:solidFill>
+                            <a:schemeClr val="tx1"/>
+                          </a:solidFill>
+                        </a:rPr>
+                        <a:t>MakeApple</a:t>
+                      </a:r>
+                      <a:r>
+                        <a:rPr lang="en-US" altLang="ko-KR" sz="900" b="0" baseline="0" dirty="0" smtClean="0">
+                          <a:solidFill>
+                            <a:schemeClr val="tx1"/>
+                          </a:solidFill>
+                        </a:rPr>
+                        <a:t>();</a:t>
+                      </a:r>
+                    </a:p>
+                    <a:p>
+                      <a:pPr latinLnBrk="1"/>
+                      <a:r>
+                        <a:rPr lang="en-US" altLang="ko-KR" sz="900" b="0" baseline="0" dirty="0" smtClean="0">
+                          <a:solidFill>
+                            <a:schemeClr val="tx1"/>
+                          </a:solidFill>
+                        </a:rPr>
+                        <a:t>+ bool </a:t>
+                      </a:r>
+                      <a:r>
+                        <a:rPr lang="en-US" altLang="ko-KR" sz="900" b="0" baseline="0" dirty="0" err="1" smtClean="0">
+                          <a:solidFill>
+                            <a:schemeClr val="tx1"/>
+                          </a:solidFill>
+                        </a:rPr>
+                        <a:t>ExistApple</a:t>
+                      </a:r>
+                      <a:r>
+                        <a:rPr lang="en-US" altLang="ko-KR" sz="900" b="0" baseline="0" dirty="0" smtClean="0">
+                          <a:solidFill>
+                            <a:schemeClr val="tx1"/>
+                          </a:solidFill>
+                        </a:rPr>
+                        <a:t>(</a:t>
+                      </a:r>
+                      <a:r>
+                        <a:rPr lang="en-US" altLang="ko-KR" sz="900" b="0" baseline="0" dirty="0" err="1" smtClean="0">
+                          <a:solidFill>
+                            <a:schemeClr val="tx1"/>
+                          </a:solidFill>
+                        </a:rPr>
+                        <a:t>const</a:t>
+                      </a:r>
+                      <a:r>
+                        <a:rPr lang="en-US" altLang="ko-KR" sz="900" b="0" baseline="0" dirty="0" smtClean="0">
+                          <a:solidFill>
+                            <a:schemeClr val="tx1"/>
+                          </a:solidFill>
+                        </a:rPr>
+                        <a:t> </a:t>
+                      </a:r>
+                      <a:r>
+                        <a:rPr lang="en-US" altLang="ko-KR" sz="900" b="0" baseline="0" dirty="0" err="1" smtClean="0">
+                          <a:solidFill>
+                            <a:schemeClr val="tx1"/>
+                          </a:solidFill>
+                        </a:rPr>
+                        <a:t>int</a:t>
+                      </a:r>
+                      <a:r>
+                        <a:rPr lang="en-US" altLang="ko-KR" sz="900" b="0" baseline="0" dirty="0" smtClean="0">
+                          <a:solidFill>
+                            <a:schemeClr val="tx1"/>
+                          </a:solidFill>
+                        </a:rPr>
+                        <a:t> x, </a:t>
+                      </a:r>
+                      <a:r>
+                        <a:rPr lang="en-US" altLang="ko-KR" sz="900" b="0" baseline="0" dirty="0" err="1" smtClean="0">
+                          <a:solidFill>
+                            <a:schemeClr val="tx1"/>
+                          </a:solidFill>
+                        </a:rPr>
+                        <a:t>const</a:t>
+                      </a:r>
+                      <a:r>
+                        <a:rPr lang="en-US" altLang="ko-KR" sz="900" b="0" baseline="0" dirty="0" smtClean="0">
+                          <a:solidFill>
+                            <a:schemeClr val="tx1"/>
+                          </a:solidFill>
+                        </a:rPr>
+                        <a:t> </a:t>
+                      </a:r>
+                      <a:r>
+                        <a:rPr lang="en-US" altLang="ko-KR" sz="900" b="0" baseline="0" dirty="0" err="1" smtClean="0">
+                          <a:solidFill>
+                            <a:schemeClr val="tx1"/>
+                          </a:solidFill>
+                        </a:rPr>
+                        <a:t>int</a:t>
+                      </a:r>
+                      <a:r>
+                        <a:rPr lang="en-US" altLang="ko-KR" sz="900" b="0" baseline="0" dirty="0" smtClean="0">
+                          <a:solidFill>
+                            <a:schemeClr val="tx1"/>
+                          </a:solidFill>
+                        </a:rPr>
+                        <a:t> y, Apple** </a:t>
+                      </a:r>
+                      <a:r>
+                        <a:rPr lang="en-US" altLang="ko-KR" sz="900" b="0" baseline="0" dirty="0" err="1" smtClean="0">
+                          <a:solidFill>
+                            <a:schemeClr val="tx1"/>
+                          </a:solidFill>
+                        </a:rPr>
+                        <a:t>sGetApple</a:t>
+                      </a:r>
+                      <a:r>
+                        <a:rPr lang="en-US" altLang="ko-KR" sz="900" b="0" baseline="0" dirty="0" smtClean="0">
+                          <a:solidFill>
+                            <a:schemeClr val="tx1"/>
+                          </a:solidFill>
+                        </a:rPr>
+                        <a:t>=NULL);</a:t>
+                      </a:r>
+                    </a:p>
+                    <a:p>
+                      <a:pPr latinLnBrk="1"/>
+                      <a:r>
+                        <a:rPr lang="en-US" altLang="ko-KR" sz="900" b="0" baseline="0" dirty="0" smtClean="0">
+                          <a:solidFill>
+                            <a:schemeClr val="tx1"/>
+                          </a:solidFill>
+                        </a:rPr>
+                        <a:t>+ bool </a:t>
+                      </a:r>
+                      <a:r>
+                        <a:rPr lang="en-US" altLang="ko-KR" sz="900" b="0" baseline="0" dirty="0" err="1" smtClean="0">
+                          <a:solidFill>
+                            <a:schemeClr val="tx1"/>
+                          </a:solidFill>
+                        </a:rPr>
+                        <a:t>DeleteApple</a:t>
+                      </a:r>
+                      <a:r>
+                        <a:rPr lang="en-US" altLang="ko-KR" sz="900" b="0" baseline="0" dirty="0" smtClean="0">
+                          <a:solidFill>
+                            <a:schemeClr val="tx1"/>
+                          </a:solidFill>
+                        </a:rPr>
+                        <a:t>(</a:t>
+                      </a:r>
+                      <a:r>
+                        <a:rPr lang="en-US" altLang="ko-KR" sz="900" b="0" baseline="0" dirty="0" err="1" smtClean="0">
+                          <a:solidFill>
+                            <a:schemeClr val="tx1"/>
+                          </a:solidFill>
+                        </a:rPr>
+                        <a:t>const</a:t>
+                      </a:r>
+                      <a:r>
+                        <a:rPr lang="en-US" altLang="ko-KR" sz="900" b="0" baseline="0" dirty="0" smtClean="0">
+                          <a:solidFill>
+                            <a:schemeClr val="tx1"/>
+                          </a:solidFill>
+                        </a:rPr>
+                        <a:t> </a:t>
+                      </a:r>
+                      <a:r>
+                        <a:rPr lang="en-US" altLang="ko-KR" sz="900" b="0" baseline="0" dirty="0" err="1" smtClean="0">
+                          <a:solidFill>
+                            <a:schemeClr val="tx1"/>
+                          </a:solidFill>
+                        </a:rPr>
+                        <a:t>int</a:t>
+                      </a:r>
+                      <a:r>
+                        <a:rPr lang="en-US" altLang="ko-KR" sz="900" b="0" baseline="0" dirty="0" smtClean="0">
+                          <a:solidFill>
+                            <a:schemeClr val="tx1"/>
+                          </a:solidFill>
+                        </a:rPr>
+                        <a:t> x, </a:t>
+                      </a:r>
+                      <a:r>
+                        <a:rPr lang="en-US" altLang="ko-KR" sz="900" b="0" baseline="0" dirty="0" err="1" smtClean="0">
+                          <a:solidFill>
+                            <a:schemeClr val="tx1"/>
+                          </a:solidFill>
+                        </a:rPr>
+                        <a:t>const</a:t>
+                      </a:r>
+                      <a:r>
+                        <a:rPr lang="en-US" altLang="ko-KR" sz="900" b="0" baseline="0" dirty="0" smtClean="0">
+                          <a:solidFill>
+                            <a:schemeClr val="tx1"/>
+                          </a:solidFill>
+                        </a:rPr>
+                        <a:t> </a:t>
+                      </a:r>
+                      <a:r>
+                        <a:rPr lang="en-US" altLang="ko-KR" sz="900" b="0" baseline="0" dirty="0" err="1" smtClean="0">
+                          <a:solidFill>
+                            <a:schemeClr val="tx1"/>
+                          </a:solidFill>
+                        </a:rPr>
+                        <a:t>int</a:t>
+                      </a:r>
+                      <a:r>
+                        <a:rPr lang="en-US" altLang="ko-KR" sz="900" b="0" baseline="0" dirty="0" smtClean="0">
+                          <a:solidFill>
+                            <a:schemeClr val="tx1"/>
+                          </a:solidFill>
+                        </a:rPr>
+                        <a:t> y);</a:t>
+                      </a:r>
+                    </a:p>
+                    <a:p>
+                      <a:pPr latinLnBrk="1"/>
+                      <a:r>
+                        <a:rPr lang="en-US" altLang="ko-KR" sz="900" b="0" baseline="0" dirty="0" smtClean="0">
+                          <a:solidFill>
+                            <a:schemeClr val="tx1"/>
+                          </a:solidFill>
+                        </a:rPr>
+                        <a:t>+ bool </a:t>
+                      </a:r>
+                      <a:r>
+                        <a:rPr lang="en-US" altLang="ko-KR" sz="900" b="0" baseline="0" dirty="0" err="1" smtClean="0">
+                          <a:solidFill>
+                            <a:schemeClr val="tx1"/>
+                          </a:solidFill>
+                        </a:rPr>
+                        <a:t>DestroyWall</a:t>
+                      </a:r>
+                      <a:r>
+                        <a:rPr lang="en-US" altLang="ko-KR" sz="900" b="0" baseline="0" dirty="0" smtClean="0">
+                          <a:solidFill>
+                            <a:schemeClr val="tx1"/>
+                          </a:solidFill>
+                        </a:rPr>
+                        <a:t>(</a:t>
+                      </a:r>
+                      <a:r>
+                        <a:rPr lang="en-US" altLang="ko-KR" sz="900" b="0" baseline="0" dirty="0" err="1" smtClean="0">
+                          <a:solidFill>
+                            <a:schemeClr val="tx1"/>
+                          </a:solidFill>
+                        </a:rPr>
+                        <a:t>const</a:t>
+                      </a:r>
+                      <a:r>
+                        <a:rPr lang="en-US" altLang="ko-KR" sz="900" b="0" baseline="0" dirty="0" smtClean="0">
+                          <a:solidFill>
+                            <a:schemeClr val="tx1"/>
+                          </a:solidFill>
+                        </a:rPr>
+                        <a:t> </a:t>
+                      </a:r>
+                      <a:r>
+                        <a:rPr lang="en-US" altLang="ko-KR" sz="900" b="0" baseline="0" dirty="0" err="1" smtClean="0">
+                          <a:solidFill>
+                            <a:schemeClr val="tx1"/>
+                          </a:solidFill>
+                        </a:rPr>
+                        <a:t>int</a:t>
+                      </a:r>
+                      <a:r>
+                        <a:rPr lang="en-US" altLang="ko-KR" sz="900" b="0" baseline="0" dirty="0" smtClean="0">
+                          <a:solidFill>
+                            <a:schemeClr val="tx1"/>
+                          </a:solidFill>
+                        </a:rPr>
+                        <a:t> x, </a:t>
+                      </a:r>
+                      <a:r>
+                        <a:rPr lang="en-US" altLang="ko-KR" sz="900" b="0" baseline="0" dirty="0" err="1" smtClean="0">
+                          <a:solidFill>
+                            <a:schemeClr val="tx1"/>
+                          </a:solidFill>
+                        </a:rPr>
+                        <a:t>const</a:t>
+                      </a:r>
+                      <a:r>
+                        <a:rPr lang="en-US" altLang="ko-KR" sz="900" b="0" baseline="0" dirty="0" smtClean="0">
+                          <a:solidFill>
+                            <a:schemeClr val="tx1"/>
+                          </a:solidFill>
+                        </a:rPr>
+                        <a:t> </a:t>
+                      </a:r>
+                      <a:r>
+                        <a:rPr lang="en-US" altLang="ko-KR" sz="900" b="0" baseline="0" dirty="0" err="1" smtClean="0">
+                          <a:solidFill>
+                            <a:schemeClr val="tx1"/>
+                          </a:solidFill>
+                        </a:rPr>
+                        <a:t>int</a:t>
+                      </a:r>
+                      <a:r>
+                        <a:rPr lang="en-US" altLang="ko-KR" sz="900" b="0" baseline="0" dirty="0" smtClean="0">
+                          <a:solidFill>
+                            <a:schemeClr val="tx1"/>
+                          </a:solidFill>
+                        </a:rPr>
+                        <a:t> y) </a:t>
+                      </a:r>
+                      <a:r>
+                        <a:rPr lang="en-US" altLang="ko-KR" sz="900" b="0" baseline="0" dirty="0" err="1" smtClean="0">
+                          <a:solidFill>
+                            <a:schemeClr val="tx1"/>
+                          </a:solidFill>
+                        </a:rPr>
+                        <a:t>const</a:t>
+                      </a:r>
+                      <a:r>
+                        <a:rPr lang="en-US" altLang="ko-KR" sz="900" b="0" baseline="0" dirty="0" smtClean="0">
+                          <a:solidFill>
+                            <a:schemeClr val="tx1"/>
+                          </a:solidFill>
+                        </a:rPr>
+                        <a:t>;</a:t>
+                      </a:r>
+                    </a:p>
+                    <a:p>
+                      <a:pPr marL="0" algn="l" defTabSz="914400" rtl="0" eaLnBrk="1" latinLnBrk="1" hangingPunct="1"/>
+                      <a:r>
+                        <a:rPr lang="en-US" altLang="ko-KR" sz="900" b="0" kern="1200" baseline="0" dirty="0" smtClean="0">
+                          <a:solidFill>
+                            <a:schemeClr val="tx1"/>
+                          </a:solidFill>
+                          <a:latin typeface="+mn-lt"/>
+                          <a:ea typeface="+mn-ea"/>
+                          <a:cs typeface="+mn-cs"/>
+                        </a:rPr>
+                        <a:t>+ </a:t>
+                      </a:r>
+                      <a:r>
+                        <a:rPr lang="en-US" altLang="ko-KR" sz="900" b="0" kern="1200" baseline="0" dirty="0" err="1" smtClean="0">
+                          <a:solidFill>
+                            <a:schemeClr val="tx1"/>
+                          </a:solidFill>
+                          <a:latin typeface="+mn-lt"/>
+                          <a:ea typeface="+mn-ea"/>
+                          <a:cs typeface="+mn-cs"/>
+                        </a:rPr>
+                        <a:t>const</a:t>
+                      </a:r>
+                      <a:r>
+                        <a:rPr lang="en-US" altLang="ko-KR" sz="900" b="0" kern="1200" baseline="0" dirty="0" smtClean="0">
+                          <a:solidFill>
+                            <a:schemeClr val="tx1"/>
+                          </a:solidFill>
+                          <a:latin typeface="+mn-lt"/>
+                          <a:ea typeface="+mn-ea"/>
+                          <a:cs typeface="+mn-cs"/>
+                        </a:rPr>
+                        <a:t> vector&lt;Apple&gt;* </a:t>
+                      </a:r>
+                      <a:r>
+                        <a:rPr lang="en-US" altLang="ko-KR" sz="900" b="0" kern="1200" baseline="0" dirty="0" err="1" smtClean="0">
+                          <a:solidFill>
+                            <a:schemeClr val="tx1"/>
+                          </a:solidFill>
+                          <a:latin typeface="+mn-lt"/>
+                          <a:ea typeface="+mn-ea"/>
+                          <a:cs typeface="+mn-cs"/>
+                        </a:rPr>
+                        <a:t>GetApplePosition</a:t>
+                      </a:r>
+                      <a:r>
+                        <a:rPr lang="en-US" altLang="ko-KR" sz="900" b="0" kern="1200" baseline="0" dirty="0" smtClean="0">
+                          <a:solidFill>
+                            <a:schemeClr val="tx1"/>
+                          </a:solidFill>
+                          <a:latin typeface="+mn-lt"/>
+                          <a:ea typeface="+mn-ea"/>
+                          <a:cs typeface="+mn-cs"/>
+                        </a:rPr>
+                        <a:t>() </a:t>
+                      </a:r>
+                      <a:r>
+                        <a:rPr lang="en-US" altLang="ko-KR" sz="900" b="0" kern="1200" baseline="0" dirty="0" err="1" smtClean="0">
+                          <a:solidFill>
+                            <a:schemeClr val="tx1"/>
+                          </a:solidFill>
+                          <a:latin typeface="+mn-lt"/>
+                          <a:ea typeface="+mn-ea"/>
+                          <a:cs typeface="+mn-cs"/>
+                        </a:rPr>
+                        <a:t>const</a:t>
+                      </a:r>
+                      <a:r>
+                        <a:rPr lang="en-US" altLang="ko-KR" sz="900" b="0" kern="1200" baseline="0" dirty="0" smtClean="0">
+                          <a:solidFill>
+                            <a:schemeClr val="tx1"/>
+                          </a:solidFill>
+                          <a:latin typeface="+mn-lt"/>
+                          <a:ea typeface="+mn-ea"/>
+                          <a:cs typeface="+mn-cs"/>
+                        </a:rPr>
+                        <a:t>;</a:t>
+                      </a:r>
+                      <a:endParaRPr lang="en-US" altLang="ko-KR" sz="900" b="0" kern="1200" baseline="0" dirty="0" smtClean="0">
+                        <a:solidFill>
+                          <a:schemeClr val="tx1"/>
+                        </a:solidFill>
+                        <a:latin typeface="+mn-lt"/>
+                        <a:ea typeface="+mn-ea"/>
+                        <a:cs typeface="+mn-cs"/>
+                      </a:endParaRPr>
+                    </a:p>
+                  </a:txBody>
+                  <a:tcPr/>
+                </a:tc>
+                <a:extLst>
+                  <a:ext uri="{0D108BD9-81ED-4DB2-BD59-A6C34878D82A}">
+                    <a16:rowId xmlns:a16="http://schemas.microsoft.com/office/drawing/2014/main" val="10002"/>
+                  </a:ext>
+                </a:extLst>
+              </a:tr>
+            </a:tbl>
+          </a:graphicData>
+        </a:graphic>
+      </p:graphicFrame>
+      <p:graphicFrame>
+        <p:nvGraphicFramePr>
+          <p:cNvPr id="13" name="표 12"/>
+          <p:cNvGraphicFramePr>
+            <a:graphicFrameLocks noGrp="1"/>
+          </p:cNvGraphicFramePr>
+          <p:nvPr>
+            <p:extLst>
+              <p:ext uri="{D42A27DB-BD31-4B8C-83A1-F6EECF244321}">
+                <p14:modId xmlns:p14="http://schemas.microsoft.com/office/powerpoint/2010/main" val="3693916989"/>
+              </p:ext>
+            </p:extLst>
+          </p:nvPr>
+        </p:nvGraphicFramePr>
+        <p:xfrm>
+          <a:off x="469600" y="2529677"/>
+          <a:ext cx="2647673" cy="2682240"/>
+        </p:xfrm>
+        <a:graphic>
+          <a:graphicData uri="http://schemas.openxmlformats.org/drawingml/2006/table">
+            <a:tbl>
+              <a:tblPr firstRow="1" bandRow="1">
+                <a:tableStyleId>{5C22544A-7EE6-4342-B048-85BDC9FD1C3A}</a:tableStyleId>
+              </a:tblPr>
+              <a:tblGrid>
+                <a:gridCol w="2647673">
+                  <a:extLst>
+                    <a:ext uri="{9D8B030D-6E8A-4147-A177-3AD203B41FA5}">
+                      <a16:colId xmlns:a16="http://schemas.microsoft.com/office/drawing/2014/main" val="20000"/>
+                    </a:ext>
+                  </a:extLst>
+                </a:gridCol>
+              </a:tblGrid>
+              <a:tr h="210821">
+                <a:tc>
+                  <a:txBody>
+                    <a:bodyPr/>
+                    <a:lstStyle/>
+                    <a:p>
+                      <a:pPr latinLnBrk="1"/>
+                      <a:r>
+                        <a:rPr lang="en-US" altLang="ko-KR" sz="1000" dirty="0" err="1" smtClean="0"/>
+                        <a:t>SnakeGame</a:t>
+                      </a:r>
+                      <a:endParaRPr lang="ko-KR" altLang="en-US" sz="1000" dirty="0"/>
+                    </a:p>
+                  </a:txBody>
+                  <a:tcPr/>
+                </a:tc>
+                <a:extLst>
+                  <a:ext uri="{0D108BD9-81ED-4DB2-BD59-A6C34878D82A}">
+                    <a16:rowId xmlns:a16="http://schemas.microsoft.com/office/drawing/2014/main" val="10000"/>
+                  </a:ext>
+                </a:extLst>
+              </a:tr>
+              <a:tr h="326814">
+                <a:tc>
+                  <a:txBody>
+                    <a:bodyPr/>
+                    <a:lstStyle/>
+                    <a:p>
+                      <a:pPr latinLnBrk="1"/>
+                      <a:r>
+                        <a:rPr lang="en-US" altLang="ko-KR" sz="1000" dirty="0" smtClean="0"/>
+                        <a:t># MAP*</a:t>
+                      </a:r>
+                      <a:r>
+                        <a:rPr lang="en-US" altLang="ko-KR" sz="1000" baseline="0" dirty="0" smtClean="0"/>
+                        <a:t> </a:t>
+                      </a:r>
+                      <a:r>
+                        <a:rPr lang="en-US" altLang="ko-KR" sz="1000" baseline="0" dirty="0" err="1" smtClean="0"/>
+                        <a:t>pMAP</a:t>
+                      </a:r>
+                      <a:r>
+                        <a:rPr lang="en-US" altLang="ko-KR" sz="1000" baseline="0" dirty="0" smtClean="0"/>
+                        <a:t>;</a:t>
+                      </a:r>
+                    </a:p>
+                    <a:p>
+                      <a:pPr latinLnBrk="1"/>
+                      <a:r>
+                        <a:rPr lang="en-US" altLang="ko-KR" sz="1000" baseline="0" dirty="0" smtClean="0"/>
+                        <a:t># Snake* </a:t>
+                      </a:r>
+                      <a:r>
+                        <a:rPr lang="en-US" altLang="ko-KR" sz="1000" baseline="0" dirty="0" err="1" smtClean="0"/>
+                        <a:t>pSnake</a:t>
+                      </a:r>
+                      <a:r>
+                        <a:rPr lang="en-US" altLang="ko-KR" sz="1000" baseline="0" dirty="0" smtClean="0"/>
+                        <a:t>;</a:t>
+                      </a:r>
+                    </a:p>
+                    <a:p>
+                      <a:pPr latinLnBrk="1"/>
+                      <a:r>
+                        <a:rPr lang="en-US" altLang="ko-KR" sz="1000" baseline="0" dirty="0" smtClean="0"/>
+                        <a:t># </a:t>
+                      </a:r>
+                      <a:r>
+                        <a:rPr lang="en-US" altLang="ko-KR" sz="1000" baseline="0" dirty="0" err="1" smtClean="0"/>
+                        <a:t>int</a:t>
+                      </a:r>
+                      <a:r>
+                        <a:rPr lang="en-US" altLang="ko-KR" sz="1000" baseline="0" dirty="0" smtClean="0"/>
+                        <a:t> </a:t>
+                      </a:r>
+                      <a:r>
+                        <a:rPr lang="en-US" altLang="ko-KR" sz="1000" baseline="0" dirty="0" err="1" smtClean="0"/>
+                        <a:t>nScore</a:t>
+                      </a:r>
+                      <a:r>
+                        <a:rPr lang="en-US" altLang="ko-KR" sz="1000" baseline="0" dirty="0" smtClean="0"/>
+                        <a:t>;</a:t>
+                      </a:r>
+                      <a:endParaRPr lang="ko-KR" altLang="en-US" sz="1000" dirty="0"/>
+                    </a:p>
+                  </a:txBody>
+                  <a:tcPr/>
+                </a:tc>
+                <a:extLst>
+                  <a:ext uri="{0D108BD9-81ED-4DB2-BD59-A6C34878D82A}">
+                    <a16:rowId xmlns:a16="http://schemas.microsoft.com/office/drawing/2014/main" val="10001"/>
+                  </a:ext>
+                </a:extLst>
+              </a:tr>
+              <a:tr h="618433">
+                <a:tc>
+                  <a:txBody>
+                    <a:bodyPr/>
+                    <a:lstStyle/>
+                    <a:p>
+                      <a:pPr marL="0" marR="0" indent="0" algn="l" defTabSz="914400" rtl="0" eaLnBrk="1" fontAlgn="auto" latinLnBrk="1" hangingPunct="1">
+                        <a:lnSpc>
+                          <a:spcPct val="100000"/>
+                        </a:lnSpc>
+                        <a:spcBef>
+                          <a:spcPts val="0"/>
+                        </a:spcBef>
+                        <a:spcAft>
+                          <a:spcPts val="0"/>
+                        </a:spcAft>
+                        <a:buClrTx/>
+                        <a:buSzTx/>
+                        <a:buFontTx/>
+                        <a:buNone/>
+                        <a:tabLst/>
+                        <a:defRPr/>
+                      </a:pPr>
+                      <a:r>
+                        <a:rPr lang="en-US" altLang="ko-KR" sz="900" i="1" baseline="0" dirty="0" smtClean="0"/>
+                        <a:t># </a:t>
+                      </a:r>
+                      <a:r>
+                        <a:rPr lang="en-US" altLang="ko-KR" sz="900" i="1" kern="1200" baseline="0" dirty="0" smtClean="0">
+                          <a:solidFill>
+                            <a:schemeClr val="dk1"/>
+                          </a:solidFill>
+                          <a:latin typeface="+mn-lt"/>
+                          <a:ea typeface="+mn-ea"/>
+                          <a:cs typeface="+mn-cs"/>
+                        </a:rPr>
+                        <a:t>void </a:t>
+                      </a:r>
+                      <a:r>
+                        <a:rPr lang="en-US" altLang="ko-KR" sz="900" i="1" kern="1200" baseline="0" dirty="0" err="1" smtClean="0">
+                          <a:solidFill>
+                            <a:schemeClr val="dk1"/>
+                          </a:solidFill>
+                          <a:latin typeface="+mn-lt"/>
+                          <a:ea typeface="+mn-ea"/>
+                          <a:cs typeface="+mn-cs"/>
+                        </a:rPr>
+                        <a:t>SetObserver</a:t>
+                      </a:r>
+                      <a:r>
+                        <a:rPr lang="en-US" altLang="ko-KR" sz="900" i="1" kern="1200" baseline="0" dirty="0" smtClean="0">
+                          <a:solidFill>
+                            <a:schemeClr val="dk1"/>
+                          </a:solidFill>
+                          <a:latin typeface="+mn-lt"/>
+                          <a:ea typeface="+mn-ea"/>
+                          <a:cs typeface="+mn-cs"/>
+                        </a:rPr>
+                        <a:t>(</a:t>
+                      </a:r>
+                      <a:r>
+                        <a:rPr lang="en-US" altLang="ko-KR" sz="900" i="1" kern="1200" baseline="0" dirty="0" err="1" smtClean="0">
+                          <a:solidFill>
+                            <a:schemeClr val="dk1"/>
+                          </a:solidFill>
+                          <a:latin typeface="+mn-lt"/>
+                          <a:ea typeface="+mn-ea"/>
+                          <a:cs typeface="+mn-cs"/>
+                        </a:rPr>
+                        <a:t>CObserver</a:t>
+                      </a:r>
+                      <a:r>
+                        <a:rPr lang="en-US" altLang="ko-KR" sz="900" i="1" kern="1200" baseline="0" dirty="0" smtClean="0">
+                          <a:solidFill>
+                            <a:schemeClr val="dk1"/>
+                          </a:solidFill>
+                          <a:latin typeface="+mn-lt"/>
+                          <a:ea typeface="+mn-ea"/>
+                          <a:cs typeface="+mn-cs"/>
+                        </a:rPr>
+                        <a:t>* </a:t>
+                      </a:r>
+                      <a:r>
+                        <a:rPr lang="en-US" altLang="ko-KR" sz="900" i="1" kern="1200" baseline="0" dirty="0" err="1" smtClean="0">
+                          <a:solidFill>
+                            <a:schemeClr val="dk1"/>
+                          </a:solidFill>
+                          <a:latin typeface="+mn-lt"/>
+                          <a:ea typeface="+mn-ea"/>
+                          <a:cs typeface="+mn-cs"/>
+                        </a:rPr>
+                        <a:t>a_observer</a:t>
+                      </a:r>
+                      <a:r>
+                        <a:rPr lang="en-US" altLang="ko-KR" sz="900" i="1" kern="1200" baseline="0" dirty="0" smtClean="0">
+                          <a:solidFill>
+                            <a:schemeClr val="dk1"/>
+                          </a:solidFill>
+                          <a:latin typeface="+mn-lt"/>
+                          <a:ea typeface="+mn-ea"/>
+                          <a:cs typeface="+mn-cs"/>
+                        </a:rPr>
+                        <a:t>);</a:t>
+                      </a:r>
+                    </a:p>
+                    <a:p>
+                      <a:pPr marL="0" marR="0" indent="0" algn="l" defTabSz="914400" rtl="0" eaLnBrk="1" fontAlgn="auto" latinLnBrk="1" hangingPunct="1">
+                        <a:lnSpc>
+                          <a:spcPct val="100000"/>
+                        </a:lnSpc>
+                        <a:spcBef>
+                          <a:spcPts val="0"/>
+                        </a:spcBef>
+                        <a:spcAft>
+                          <a:spcPts val="0"/>
+                        </a:spcAft>
+                        <a:buClrTx/>
+                        <a:buSzTx/>
+                        <a:buFontTx/>
+                        <a:buNone/>
+                        <a:tabLst/>
+                        <a:defRPr/>
+                      </a:pPr>
+                      <a:r>
+                        <a:rPr lang="en-US" altLang="ko-KR" sz="900" kern="1200" baseline="0" dirty="0" smtClean="0">
+                          <a:solidFill>
+                            <a:schemeClr val="dk1"/>
+                          </a:solidFill>
+                          <a:latin typeface="+mn-lt"/>
+                          <a:ea typeface="+mn-ea"/>
+                          <a:cs typeface="+mn-cs"/>
+                        </a:rPr>
+                        <a:t># void </a:t>
+                      </a:r>
+                      <a:r>
+                        <a:rPr lang="en-US" altLang="ko-KR" sz="900" kern="1200" baseline="0" dirty="0" err="1" smtClean="0">
+                          <a:solidFill>
+                            <a:schemeClr val="dk1"/>
+                          </a:solidFill>
+                          <a:latin typeface="+mn-lt"/>
+                          <a:ea typeface="+mn-ea"/>
+                          <a:cs typeface="+mn-cs"/>
+                        </a:rPr>
+                        <a:t>IncreaseGameScore</a:t>
+                      </a:r>
+                      <a:r>
+                        <a:rPr lang="en-US" altLang="ko-KR" sz="900" kern="1200" baseline="0" dirty="0" smtClean="0">
+                          <a:solidFill>
+                            <a:schemeClr val="dk1"/>
+                          </a:solidFill>
+                          <a:latin typeface="+mn-lt"/>
+                          <a:ea typeface="+mn-ea"/>
+                          <a:cs typeface="+mn-cs"/>
+                        </a:rPr>
+                        <a:t>(APPLE_CLR </a:t>
+                      </a:r>
+                      <a:r>
+                        <a:rPr lang="en-US" altLang="ko-KR" sz="900" kern="1200" baseline="0" dirty="0" err="1" smtClean="0">
+                          <a:solidFill>
+                            <a:schemeClr val="dk1"/>
+                          </a:solidFill>
+                          <a:latin typeface="+mn-lt"/>
+                          <a:ea typeface="+mn-ea"/>
+                          <a:cs typeface="+mn-cs"/>
+                        </a:rPr>
+                        <a:t>a_nColor</a:t>
+                      </a:r>
+                      <a:r>
+                        <a:rPr lang="en-US" altLang="ko-KR" sz="900" kern="1200" baseline="0" dirty="0" smtClean="0">
+                          <a:solidFill>
+                            <a:schemeClr val="dk1"/>
+                          </a:solidFill>
+                          <a:latin typeface="+mn-lt"/>
+                          <a:ea typeface="+mn-ea"/>
+                          <a:cs typeface="+mn-cs"/>
+                        </a:rPr>
+                        <a:t> = NONECOLOR);</a:t>
+                      </a:r>
+                    </a:p>
+                    <a:p>
+                      <a:pPr marL="0" marR="0" indent="0" algn="l" defTabSz="914400" rtl="0" eaLnBrk="1" fontAlgn="auto" latinLnBrk="1" hangingPunct="1">
+                        <a:lnSpc>
+                          <a:spcPct val="100000"/>
+                        </a:lnSpc>
+                        <a:spcBef>
+                          <a:spcPts val="0"/>
+                        </a:spcBef>
+                        <a:spcAft>
+                          <a:spcPts val="0"/>
+                        </a:spcAft>
+                        <a:buClrTx/>
+                        <a:buSzTx/>
+                        <a:buFontTx/>
+                        <a:buNone/>
+                        <a:tabLst/>
+                        <a:defRPr/>
+                      </a:pPr>
+                      <a:r>
+                        <a:rPr lang="en-US" altLang="ko-KR" sz="900" kern="1200" baseline="0" dirty="0" smtClean="0">
+                          <a:solidFill>
+                            <a:schemeClr val="dk1"/>
+                          </a:solidFill>
+                          <a:latin typeface="+mn-lt"/>
+                          <a:ea typeface="+mn-ea"/>
+                          <a:cs typeface="+mn-cs"/>
+                        </a:rPr>
+                        <a:t>+ </a:t>
+                      </a:r>
+                      <a:r>
+                        <a:rPr lang="en-US" altLang="ko-KR" sz="900" kern="1200" baseline="0" dirty="0" err="1" smtClean="0">
+                          <a:solidFill>
+                            <a:schemeClr val="dk1"/>
+                          </a:solidFill>
+                          <a:latin typeface="+mn-lt"/>
+                          <a:ea typeface="+mn-ea"/>
+                          <a:cs typeface="+mn-cs"/>
+                        </a:rPr>
+                        <a:t>SnakeGame</a:t>
+                      </a:r>
+                      <a:r>
+                        <a:rPr lang="en-US" altLang="ko-KR" sz="900" kern="1200" baseline="0" dirty="0" smtClean="0">
+                          <a:solidFill>
+                            <a:schemeClr val="dk1"/>
+                          </a:solidFill>
+                          <a:latin typeface="+mn-lt"/>
+                          <a:ea typeface="+mn-ea"/>
+                          <a:cs typeface="+mn-cs"/>
+                        </a:rPr>
+                        <a:t>();</a:t>
+                      </a:r>
+                    </a:p>
+                    <a:p>
+                      <a:pPr marL="0" marR="0" indent="0" algn="l" defTabSz="914400" rtl="0" eaLnBrk="1" fontAlgn="auto" latinLnBrk="1" hangingPunct="1">
+                        <a:lnSpc>
+                          <a:spcPct val="100000"/>
+                        </a:lnSpc>
+                        <a:spcBef>
+                          <a:spcPts val="0"/>
+                        </a:spcBef>
+                        <a:spcAft>
+                          <a:spcPts val="0"/>
+                        </a:spcAft>
+                        <a:buClrTx/>
+                        <a:buSzTx/>
+                        <a:buFontTx/>
+                        <a:buNone/>
+                        <a:tabLst/>
+                        <a:defRPr/>
+                      </a:pPr>
+                      <a:r>
+                        <a:rPr lang="en-US" altLang="ko-KR" sz="900" kern="1200" baseline="0" dirty="0" smtClean="0">
+                          <a:solidFill>
+                            <a:schemeClr val="dk1"/>
+                          </a:solidFill>
+                          <a:latin typeface="+mn-lt"/>
+                          <a:ea typeface="+mn-ea"/>
+                          <a:cs typeface="+mn-cs"/>
+                        </a:rPr>
+                        <a:t>+ ~</a:t>
+                      </a:r>
+                      <a:r>
+                        <a:rPr lang="en-US" altLang="ko-KR" sz="900" kern="1200" baseline="0" dirty="0" err="1" smtClean="0">
+                          <a:solidFill>
+                            <a:schemeClr val="dk1"/>
+                          </a:solidFill>
+                          <a:latin typeface="+mn-lt"/>
+                          <a:ea typeface="+mn-ea"/>
+                          <a:cs typeface="+mn-cs"/>
+                        </a:rPr>
+                        <a:t>SnakeGame</a:t>
+                      </a:r>
+                      <a:r>
+                        <a:rPr lang="en-US" altLang="ko-KR" sz="900" kern="1200" baseline="0" dirty="0" smtClean="0">
+                          <a:solidFill>
+                            <a:schemeClr val="dk1"/>
+                          </a:solidFill>
+                          <a:latin typeface="+mn-lt"/>
+                          <a:ea typeface="+mn-ea"/>
+                          <a:cs typeface="+mn-cs"/>
+                        </a:rPr>
+                        <a:t>();</a:t>
+                      </a:r>
+                    </a:p>
+                    <a:p>
+                      <a:pPr marL="0" marR="0" indent="0" algn="l" defTabSz="914400" rtl="0" eaLnBrk="1" fontAlgn="auto" latinLnBrk="1" hangingPunct="1">
+                        <a:lnSpc>
+                          <a:spcPct val="100000"/>
+                        </a:lnSpc>
+                        <a:spcBef>
+                          <a:spcPts val="0"/>
+                        </a:spcBef>
+                        <a:spcAft>
+                          <a:spcPts val="0"/>
+                        </a:spcAft>
+                        <a:buClrTx/>
+                        <a:buSzTx/>
+                        <a:buFontTx/>
+                        <a:buNone/>
+                        <a:tabLst/>
+                        <a:defRPr/>
+                      </a:pPr>
+                      <a:endParaRPr lang="en-US" altLang="ko-KR" sz="900" kern="1200" baseline="0" dirty="0" smtClean="0">
+                        <a:solidFill>
+                          <a:schemeClr val="dk1"/>
+                        </a:solidFill>
+                        <a:latin typeface="+mn-lt"/>
+                        <a:ea typeface="+mn-ea"/>
+                        <a:cs typeface="+mn-cs"/>
+                      </a:endParaRPr>
+                    </a:p>
+                    <a:p>
+                      <a:pPr marL="0" marR="0" indent="0" algn="l" defTabSz="914400" rtl="0" eaLnBrk="1" fontAlgn="auto" latinLnBrk="1" hangingPunct="1">
+                        <a:lnSpc>
+                          <a:spcPct val="100000"/>
+                        </a:lnSpc>
+                        <a:spcBef>
+                          <a:spcPts val="0"/>
+                        </a:spcBef>
+                        <a:spcAft>
+                          <a:spcPts val="0"/>
+                        </a:spcAft>
+                        <a:buClrTx/>
+                        <a:buSzTx/>
+                        <a:buFontTx/>
+                        <a:buNone/>
+                        <a:tabLst/>
+                        <a:defRPr/>
+                      </a:pPr>
+                      <a:r>
+                        <a:rPr lang="en-US" altLang="ko-KR" sz="900" kern="1200" baseline="0" dirty="0" smtClean="0">
+                          <a:solidFill>
+                            <a:schemeClr val="dk1"/>
+                          </a:solidFill>
+                          <a:latin typeface="+mn-lt"/>
+                          <a:ea typeface="+mn-ea"/>
+                          <a:cs typeface="+mn-cs"/>
+                        </a:rPr>
+                        <a:t>+ bool </a:t>
+                      </a:r>
+                      <a:r>
+                        <a:rPr lang="en-US" altLang="ko-KR" sz="900" kern="1200" baseline="0" dirty="0" err="1" smtClean="0">
+                          <a:solidFill>
+                            <a:schemeClr val="dk1"/>
+                          </a:solidFill>
+                          <a:latin typeface="+mn-lt"/>
+                          <a:ea typeface="+mn-ea"/>
+                          <a:cs typeface="+mn-cs"/>
+                        </a:rPr>
+                        <a:t>MoveStraight</a:t>
+                      </a:r>
+                      <a:r>
+                        <a:rPr lang="en-US" altLang="ko-KR" sz="900" kern="1200" baseline="0" dirty="0" smtClean="0">
+                          <a:solidFill>
+                            <a:schemeClr val="dk1"/>
+                          </a:solidFill>
+                          <a:latin typeface="+mn-lt"/>
+                          <a:ea typeface="+mn-ea"/>
+                          <a:cs typeface="+mn-cs"/>
+                        </a:rPr>
+                        <a:t>();</a:t>
+                      </a:r>
+                    </a:p>
+                    <a:p>
+                      <a:pPr marL="0" marR="0" indent="0" algn="l" defTabSz="914400" rtl="0" eaLnBrk="1" fontAlgn="auto" latinLnBrk="1" hangingPunct="1">
+                        <a:lnSpc>
+                          <a:spcPct val="100000"/>
+                        </a:lnSpc>
+                        <a:spcBef>
+                          <a:spcPts val="0"/>
+                        </a:spcBef>
+                        <a:spcAft>
+                          <a:spcPts val="0"/>
+                        </a:spcAft>
+                        <a:buClrTx/>
+                        <a:buSzTx/>
+                        <a:buFontTx/>
+                        <a:buNone/>
+                        <a:tabLst/>
+                        <a:defRPr/>
+                      </a:pPr>
+                      <a:r>
+                        <a:rPr lang="en-US" altLang="ko-KR" sz="900" kern="1200" baseline="0" dirty="0" smtClean="0">
+                          <a:solidFill>
+                            <a:schemeClr val="dk1"/>
+                          </a:solidFill>
+                          <a:latin typeface="+mn-lt"/>
+                          <a:ea typeface="+mn-ea"/>
+                          <a:cs typeface="+mn-cs"/>
+                        </a:rPr>
+                        <a:t>+ void </a:t>
+                      </a:r>
+                      <a:r>
+                        <a:rPr lang="en-US" altLang="ko-KR" sz="900" kern="1200" baseline="0" dirty="0" err="1" smtClean="0">
+                          <a:solidFill>
+                            <a:schemeClr val="dk1"/>
+                          </a:solidFill>
+                          <a:latin typeface="+mn-lt"/>
+                          <a:ea typeface="+mn-ea"/>
+                          <a:cs typeface="+mn-cs"/>
+                        </a:rPr>
+                        <a:t>ChangeDirection</a:t>
+                      </a:r>
+                      <a:r>
+                        <a:rPr lang="en-US" altLang="ko-KR" sz="900" kern="1200" baseline="0" dirty="0" smtClean="0">
+                          <a:solidFill>
+                            <a:schemeClr val="dk1"/>
+                          </a:solidFill>
+                          <a:latin typeface="+mn-lt"/>
+                          <a:ea typeface="+mn-ea"/>
+                          <a:cs typeface="+mn-cs"/>
+                        </a:rPr>
+                        <a:t>(Direction </a:t>
+                      </a:r>
+                      <a:r>
+                        <a:rPr lang="en-US" altLang="ko-KR" sz="900" kern="1200" baseline="0" dirty="0" err="1" smtClean="0">
+                          <a:solidFill>
+                            <a:schemeClr val="dk1"/>
+                          </a:solidFill>
+                          <a:latin typeface="+mn-lt"/>
+                          <a:ea typeface="+mn-ea"/>
+                          <a:cs typeface="+mn-cs"/>
+                        </a:rPr>
+                        <a:t>a_dir</a:t>
+                      </a:r>
+                      <a:r>
+                        <a:rPr lang="en-US" altLang="ko-KR" sz="900" kern="1200" baseline="0" dirty="0" smtClean="0">
+                          <a:solidFill>
+                            <a:schemeClr val="dk1"/>
+                          </a:solidFill>
+                          <a:latin typeface="+mn-lt"/>
+                          <a:ea typeface="+mn-ea"/>
+                          <a:cs typeface="+mn-cs"/>
+                        </a:rPr>
+                        <a:t>);</a:t>
+                      </a:r>
+                    </a:p>
+                    <a:p>
+                      <a:pPr marL="0" marR="0" indent="0" algn="l" defTabSz="914400" rtl="0" eaLnBrk="1" fontAlgn="auto" latinLnBrk="1" hangingPunct="1">
+                        <a:lnSpc>
+                          <a:spcPct val="100000"/>
+                        </a:lnSpc>
+                        <a:spcBef>
+                          <a:spcPts val="0"/>
+                        </a:spcBef>
+                        <a:spcAft>
+                          <a:spcPts val="0"/>
+                        </a:spcAft>
+                        <a:buClrTx/>
+                        <a:buSzTx/>
+                        <a:buFontTx/>
+                        <a:buNone/>
+                        <a:tabLst/>
+                        <a:defRPr/>
+                      </a:pPr>
+                      <a:r>
+                        <a:rPr lang="en-US" altLang="ko-KR" sz="900" kern="1200" baseline="0" dirty="0" smtClean="0">
+                          <a:solidFill>
+                            <a:schemeClr val="dk1"/>
+                          </a:solidFill>
+                          <a:latin typeface="+mn-lt"/>
+                          <a:ea typeface="+mn-ea"/>
+                          <a:cs typeface="+mn-cs"/>
+                        </a:rPr>
+                        <a:t>+ void </a:t>
+                      </a:r>
+                      <a:r>
+                        <a:rPr lang="en-US" altLang="ko-KR" sz="900" kern="1200" baseline="0" dirty="0" err="1" smtClean="0">
+                          <a:solidFill>
+                            <a:schemeClr val="dk1"/>
+                          </a:solidFill>
+                          <a:latin typeface="+mn-lt"/>
+                          <a:ea typeface="+mn-ea"/>
+                          <a:cs typeface="+mn-cs"/>
+                        </a:rPr>
+                        <a:t>MakeApple</a:t>
+                      </a:r>
+                      <a:r>
+                        <a:rPr lang="en-US" altLang="ko-KR" sz="900" kern="1200" baseline="0" dirty="0" smtClean="0">
+                          <a:solidFill>
+                            <a:schemeClr val="dk1"/>
+                          </a:solidFill>
+                          <a:latin typeface="+mn-lt"/>
+                          <a:ea typeface="+mn-ea"/>
+                          <a:cs typeface="+mn-cs"/>
+                        </a:rPr>
+                        <a:t>();</a:t>
+                      </a:r>
+                    </a:p>
+                    <a:p>
+                      <a:pPr marL="0" marR="0" indent="0" algn="l" defTabSz="914400" rtl="0" eaLnBrk="1" fontAlgn="auto" latinLnBrk="1" hangingPunct="1">
+                        <a:lnSpc>
+                          <a:spcPct val="100000"/>
+                        </a:lnSpc>
+                        <a:spcBef>
+                          <a:spcPts val="0"/>
+                        </a:spcBef>
+                        <a:spcAft>
+                          <a:spcPts val="0"/>
+                        </a:spcAft>
+                        <a:buClrTx/>
+                        <a:buSzTx/>
+                        <a:buFontTx/>
+                        <a:buNone/>
+                        <a:tabLst/>
+                        <a:defRPr/>
+                      </a:pPr>
+                      <a:endParaRPr lang="en-US" altLang="ko-KR" sz="900" kern="1200" baseline="0" dirty="0" smtClean="0">
+                        <a:solidFill>
+                          <a:schemeClr val="dk1"/>
+                        </a:solidFill>
+                        <a:latin typeface="+mn-lt"/>
+                        <a:ea typeface="+mn-ea"/>
+                        <a:cs typeface="+mn-cs"/>
+                      </a:endParaRPr>
+                    </a:p>
+                    <a:p>
+                      <a:pPr marL="0" marR="0" indent="0" algn="l" defTabSz="914400" rtl="0" eaLnBrk="1" fontAlgn="auto" latinLnBrk="1" hangingPunct="1">
+                        <a:lnSpc>
+                          <a:spcPct val="100000"/>
+                        </a:lnSpc>
+                        <a:spcBef>
+                          <a:spcPts val="0"/>
+                        </a:spcBef>
+                        <a:spcAft>
+                          <a:spcPts val="0"/>
+                        </a:spcAft>
+                        <a:buClrTx/>
+                        <a:buSzTx/>
+                        <a:buFontTx/>
+                        <a:buNone/>
+                        <a:tabLst/>
+                        <a:defRPr/>
+                      </a:pPr>
+                      <a:r>
+                        <a:rPr lang="en-US" altLang="ko-KR" sz="900" kern="1200" baseline="0" dirty="0" smtClean="0">
+                          <a:solidFill>
+                            <a:schemeClr val="dk1"/>
+                          </a:solidFill>
+                          <a:latin typeface="+mn-lt"/>
+                          <a:ea typeface="+mn-ea"/>
+                          <a:cs typeface="+mn-cs"/>
+                        </a:rPr>
+                        <a:t>+ </a:t>
+                      </a:r>
+                      <a:r>
+                        <a:rPr lang="en-US" altLang="ko-KR" sz="900" kern="1200" baseline="0" dirty="0" err="1" smtClean="0">
+                          <a:solidFill>
+                            <a:schemeClr val="dk1"/>
+                          </a:solidFill>
+                          <a:latin typeface="+mn-lt"/>
+                          <a:ea typeface="+mn-ea"/>
+                          <a:cs typeface="+mn-cs"/>
+                        </a:rPr>
+                        <a:t>const</a:t>
+                      </a:r>
+                      <a:r>
+                        <a:rPr lang="en-US" altLang="ko-KR" sz="900" kern="1200" baseline="0" dirty="0" smtClean="0">
+                          <a:solidFill>
+                            <a:schemeClr val="dk1"/>
+                          </a:solidFill>
+                          <a:latin typeface="+mn-lt"/>
+                          <a:ea typeface="+mn-ea"/>
+                          <a:cs typeface="+mn-cs"/>
+                        </a:rPr>
+                        <a:t> Map* </a:t>
+                      </a:r>
+                      <a:r>
+                        <a:rPr lang="en-US" altLang="ko-KR" sz="900" kern="1200" baseline="0" dirty="0" err="1" smtClean="0">
+                          <a:solidFill>
+                            <a:schemeClr val="dk1"/>
+                          </a:solidFill>
+                          <a:latin typeface="+mn-lt"/>
+                          <a:ea typeface="+mn-ea"/>
+                          <a:cs typeface="+mn-cs"/>
+                        </a:rPr>
+                        <a:t>GetMap</a:t>
+                      </a:r>
+                      <a:r>
+                        <a:rPr lang="en-US" altLang="ko-KR" sz="900" kern="1200" baseline="0" dirty="0" smtClean="0">
+                          <a:solidFill>
+                            <a:schemeClr val="dk1"/>
+                          </a:solidFill>
+                          <a:latin typeface="+mn-lt"/>
+                          <a:ea typeface="+mn-ea"/>
+                          <a:cs typeface="+mn-cs"/>
+                        </a:rPr>
+                        <a:t>() </a:t>
+                      </a:r>
+                      <a:r>
+                        <a:rPr lang="en-US" altLang="ko-KR" sz="900" kern="1200" baseline="0" dirty="0" err="1" smtClean="0">
+                          <a:solidFill>
+                            <a:schemeClr val="dk1"/>
+                          </a:solidFill>
+                          <a:latin typeface="+mn-lt"/>
+                          <a:ea typeface="+mn-ea"/>
+                          <a:cs typeface="+mn-cs"/>
+                        </a:rPr>
+                        <a:t>const</a:t>
+                      </a:r>
+                      <a:r>
+                        <a:rPr lang="en-US" altLang="ko-KR" sz="900" kern="1200" baseline="0" dirty="0" smtClean="0">
+                          <a:solidFill>
+                            <a:schemeClr val="dk1"/>
+                          </a:solidFill>
+                          <a:latin typeface="+mn-lt"/>
+                          <a:ea typeface="+mn-ea"/>
+                          <a:cs typeface="+mn-cs"/>
+                        </a:rPr>
+                        <a:t>;</a:t>
+                      </a:r>
+                    </a:p>
+                    <a:p>
+                      <a:pPr marL="0" marR="0" indent="0" algn="l" defTabSz="914400" rtl="0" eaLnBrk="1" fontAlgn="auto" latinLnBrk="1" hangingPunct="1">
+                        <a:lnSpc>
+                          <a:spcPct val="100000"/>
+                        </a:lnSpc>
+                        <a:spcBef>
+                          <a:spcPts val="0"/>
+                        </a:spcBef>
+                        <a:spcAft>
+                          <a:spcPts val="0"/>
+                        </a:spcAft>
+                        <a:buClrTx/>
+                        <a:buSzTx/>
+                        <a:buFontTx/>
+                        <a:buNone/>
+                        <a:tabLst/>
+                        <a:defRPr/>
+                      </a:pPr>
+                      <a:r>
+                        <a:rPr lang="en-US" altLang="ko-KR" sz="900" kern="1200" baseline="0" dirty="0" smtClean="0">
+                          <a:solidFill>
+                            <a:schemeClr val="dk1"/>
+                          </a:solidFill>
+                          <a:latin typeface="+mn-lt"/>
+                          <a:ea typeface="+mn-ea"/>
+                          <a:cs typeface="+mn-cs"/>
+                        </a:rPr>
+                        <a:t>+ </a:t>
+                      </a:r>
+                      <a:r>
+                        <a:rPr lang="en-US" altLang="ko-KR" sz="900" kern="1200" baseline="0" dirty="0" err="1" smtClean="0">
+                          <a:solidFill>
+                            <a:schemeClr val="dk1"/>
+                          </a:solidFill>
+                          <a:latin typeface="+mn-lt"/>
+                          <a:ea typeface="+mn-ea"/>
+                          <a:cs typeface="+mn-cs"/>
+                        </a:rPr>
+                        <a:t>const</a:t>
+                      </a:r>
+                      <a:r>
+                        <a:rPr lang="en-US" altLang="ko-KR" sz="900" kern="1200" baseline="0" dirty="0" smtClean="0">
+                          <a:solidFill>
+                            <a:schemeClr val="dk1"/>
+                          </a:solidFill>
+                          <a:latin typeface="+mn-lt"/>
+                          <a:ea typeface="+mn-ea"/>
+                          <a:cs typeface="+mn-cs"/>
+                        </a:rPr>
+                        <a:t> Snake* </a:t>
+                      </a:r>
+                      <a:r>
+                        <a:rPr lang="en-US" altLang="ko-KR" sz="900" kern="1200" baseline="0" dirty="0" err="1" smtClean="0">
+                          <a:solidFill>
+                            <a:schemeClr val="dk1"/>
+                          </a:solidFill>
+                          <a:latin typeface="+mn-lt"/>
+                          <a:ea typeface="+mn-ea"/>
+                          <a:cs typeface="+mn-cs"/>
+                        </a:rPr>
+                        <a:t>GetSnake</a:t>
+                      </a:r>
+                      <a:r>
+                        <a:rPr lang="en-US" altLang="ko-KR" sz="900" kern="1200" baseline="0" dirty="0" smtClean="0">
+                          <a:solidFill>
+                            <a:schemeClr val="dk1"/>
+                          </a:solidFill>
+                          <a:latin typeface="+mn-lt"/>
+                          <a:ea typeface="+mn-ea"/>
+                          <a:cs typeface="+mn-cs"/>
+                        </a:rPr>
+                        <a:t>() </a:t>
+                      </a:r>
+                      <a:r>
+                        <a:rPr lang="en-US" altLang="ko-KR" sz="900" kern="1200" baseline="0" dirty="0" err="1" smtClean="0">
+                          <a:solidFill>
+                            <a:schemeClr val="dk1"/>
+                          </a:solidFill>
+                          <a:latin typeface="+mn-lt"/>
+                          <a:ea typeface="+mn-ea"/>
+                          <a:cs typeface="+mn-cs"/>
+                        </a:rPr>
+                        <a:t>const</a:t>
+                      </a:r>
+                      <a:r>
+                        <a:rPr lang="en-US" altLang="ko-KR" sz="900" kern="1200" baseline="0" dirty="0" smtClean="0">
+                          <a:solidFill>
+                            <a:schemeClr val="dk1"/>
+                          </a:solidFill>
+                          <a:latin typeface="+mn-lt"/>
+                          <a:ea typeface="+mn-ea"/>
+                          <a:cs typeface="+mn-cs"/>
+                        </a:rPr>
+                        <a:t>;</a:t>
+                      </a:r>
+                      <a:endParaRPr lang="en-US" altLang="ko-KR" sz="900" baseline="0" dirty="0" smtClean="0"/>
+                    </a:p>
+                    <a:p>
+                      <a:pPr latinLnBrk="1"/>
+                      <a:endParaRPr lang="en-US" altLang="ko-KR" sz="1000" baseline="0" dirty="0" smtClean="0"/>
+                    </a:p>
+                  </a:txBody>
+                  <a:tcPr/>
+                </a:tc>
+                <a:extLst>
+                  <a:ext uri="{0D108BD9-81ED-4DB2-BD59-A6C34878D82A}">
+                    <a16:rowId xmlns:a16="http://schemas.microsoft.com/office/drawing/2014/main" val="10002"/>
+                  </a:ext>
+                </a:extLst>
+              </a:tr>
+            </a:tbl>
+          </a:graphicData>
+        </a:graphic>
+      </p:graphicFrame>
+      <p:cxnSp>
+        <p:nvCxnSpPr>
+          <p:cNvPr id="20" name="꺾인 연결선 19"/>
+          <p:cNvCxnSpPr/>
+          <p:nvPr/>
+        </p:nvCxnSpPr>
+        <p:spPr>
+          <a:xfrm flipV="1">
+            <a:off x="1330036" y="2111433"/>
+            <a:ext cx="2248569" cy="798023"/>
+          </a:xfrm>
+          <a:prstGeom prst="bentConnector3">
+            <a:avLst>
+              <a:gd name="adj1" fmla="val 84751"/>
+            </a:avLst>
+          </a:prstGeom>
+          <a:ln>
+            <a:tailEnd type="arrow" w="lg" len="lg"/>
+          </a:ln>
+        </p:spPr>
+        <p:style>
+          <a:lnRef idx="1">
+            <a:schemeClr val="accent1"/>
+          </a:lnRef>
+          <a:fillRef idx="0">
+            <a:schemeClr val="accent1"/>
+          </a:fillRef>
+          <a:effectRef idx="0">
+            <a:schemeClr val="accent1"/>
+          </a:effectRef>
+          <a:fontRef idx="minor">
+            <a:schemeClr val="tx1"/>
+          </a:fontRef>
+        </p:style>
+      </p:cxnSp>
+      <p:cxnSp>
+        <p:nvCxnSpPr>
+          <p:cNvPr id="22" name="꺾인 연결선 21"/>
+          <p:cNvCxnSpPr/>
+          <p:nvPr/>
+        </p:nvCxnSpPr>
+        <p:spPr>
+          <a:xfrm>
+            <a:off x="1486905" y="3058274"/>
+            <a:ext cx="1980334" cy="1513726"/>
+          </a:xfrm>
+          <a:prstGeom prst="bentConnector3">
+            <a:avLst>
+              <a:gd name="adj1" fmla="val 88618"/>
+            </a:avLst>
+          </a:prstGeom>
+          <a:ln>
+            <a:tailEnd type="arrow" w="lg" len="lg"/>
+          </a:ln>
+        </p:spPr>
+        <p:style>
+          <a:lnRef idx="1">
+            <a:schemeClr val="accent1"/>
+          </a:lnRef>
+          <a:fillRef idx="0">
+            <a:schemeClr val="accent1"/>
+          </a:fillRef>
+          <a:effectRef idx="0">
+            <a:schemeClr val="accent1"/>
+          </a:effectRef>
+          <a:fontRef idx="minor">
+            <a:schemeClr val="tx1"/>
+          </a:fontRef>
+        </p:style>
+      </p:cxnSp>
+      <p:cxnSp>
+        <p:nvCxnSpPr>
+          <p:cNvPr id="23" name="직선 화살표 연결선 22"/>
+          <p:cNvCxnSpPr/>
+          <p:nvPr/>
+        </p:nvCxnSpPr>
+        <p:spPr>
+          <a:xfrm>
+            <a:off x="5170516" y="2493818"/>
+            <a:ext cx="3524576" cy="1"/>
+          </a:xfrm>
+          <a:prstGeom prst="straightConnector1">
+            <a:avLst/>
+          </a:prstGeom>
+          <a:ln>
+            <a:tailEnd type="arrow" w="lg" len="lg"/>
+          </a:ln>
+        </p:spPr>
+        <p:style>
+          <a:lnRef idx="1">
+            <a:schemeClr val="accent1"/>
+          </a:lnRef>
+          <a:fillRef idx="0">
+            <a:schemeClr val="accent1"/>
+          </a:fillRef>
+          <a:effectRef idx="0">
+            <a:schemeClr val="accent1"/>
+          </a:effectRef>
+          <a:fontRef idx="minor">
+            <a:schemeClr val="tx1"/>
+          </a:fontRef>
+        </p:style>
+      </p:cxnSp>
+      <p:sp>
+        <p:nvSpPr>
+          <p:cNvPr id="25" name="TextBox 24"/>
+          <p:cNvSpPr txBox="1"/>
+          <p:nvPr/>
+        </p:nvSpPr>
+        <p:spPr>
+          <a:xfrm>
+            <a:off x="7109014" y="5104215"/>
+            <a:ext cx="4600940" cy="369332"/>
+          </a:xfrm>
+          <a:prstGeom prst="rect">
+            <a:avLst/>
+          </a:prstGeom>
+          <a:noFill/>
+        </p:spPr>
+        <p:txBody>
+          <a:bodyPr wrap="none" rtlCol="0">
+            <a:spAutoFit/>
+          </a:bodyPr>
+          <a:lstStyle/>
+          <a:p>
+            <a:r>
+              <a:rPr lang="en-US" altLang="ko-KR" dirty="0" smtClean="0"/>
+              <a:t>&lt;</a:t>
+            </a:r>
+            <a:r>
+              <a:rPr lang="ko-KR" altLang="en-US" dirty="0" smtClean="0"/>
+              <a:t>뱀 </a:t>
+            </a:r>
+            <a:r>
+              <a:rPr lang="en-US" altLang="ko-KR" dirty="0" smtClean="0"/>
+              <a:t>UML – 2017. </a:t>
+            </a:r>
+            <a:r>
+              <a:rPr lang="en-US" altLang="ko-KR" dirty="0" smtClean="0"/>
+              <a:t>7. 19 </a:t>
+            </a:r>
+            <a:r>
+              <a:rPr lang="ko-KR" altLang="en-US" dirty="0" smtClean="0"/>
+              <a:t>추가 수정된 </a:t>
+            </a:r>
+            <a:r>
+              <a:rPr lang="ko-KR" altLang="en-US" dirty="0" smtClean="0"/>
+              <a:t>사항</a:t>
+            </a:r>
+            <a:r>
+              <a:rPr lang="en-US" altLang="ko-KR" dirty="0" smtClean="0"/>
+              <a:t>&gt;</a:t>
+            </a:r>
+            <a:endParaRPr lang="ko-KR" altLang="en-US" dirty="0"/>
+          </a:p>
+        </p:txBody>
+      </p:sp>
+      <p:graphicFrame>
+        <p:nvGraphicFramePr>
+          <p:cNvPr id="14" name="표 13"/>
+          <p:cNvGraphicFramePr>
+            <a:graphicFrameLocks noGrp="1"/>
+          </p:cNvGraphicFramePr>
+          <p:nvPr>
+            <p:extLst>
+              <p:ext uri="{D42A27DB-BD31-4B8C-83A1-F6EECF244321}">
+                <p14:modId xmlns:p14="http://schemas.microsoft.com/office/powerpoint/2010/main" val="3493577939"/>
+              </p:ext>
+            </p:extLst>
+          </p:nvPr>
+        </p:nvGraphicFramePr>
+        <p:xfrm>
+          <a:off x="361531" y="478930"/>
+          <a:ext cx="2759039" cy="1485054"/>
+        </p:xfrm>
+        <a:graphic>
+          <a:graphicData uri="http://schemas.openxmlformats.org/drawingml/2006/table">
+            <a:tbl>
+              <a:tblPr firstRow="1" bandRow="1">
+                <a:tableStyleId>{5C22544A-7EE6-4342-B048-85BDC9FD1C3A}</a:tableStyleId>
+              </a:tblPr>
+              <a:tblGrid>
+                <a:gridCol w="2759039">
+                  <a:extLst>
+                    <a:ext uri="{9D8B030D-6E8A-4147-A177-3AD203B41FA5}">
+                      <a16:colId xmlns:a16="http://schemas.microsoft.com/office/drawing/2014/main" val="20000"/>
+                    </a:ext>
+                  </a:extLst>
+                </a:gridCol>
+              </a:tblGrid>
+              <a:tr h="235852">
+                <a:tc>
+                  <a:txBody>
+                    <a:bodyPr/>
+                    <a:lstStyle/>
+                    <a:p>
+                      <a:pPr latinLnBrk="1"/>
+                      <a:r>
+                        <a:rPr lang="en-US" altLang="ko-KR" sz="1000" b="1" i="1" kern="1200" dirty="0" err="1" smtClean="0">
+                          <a:solidFill>
+                            <a:schemeClr val="lt1"/>
+                          </a:solidFill>
+                          <a:latin typeface="+mn-lt"/>
+                          <a:ea typeface="+mn-ea"/>
+                          <a:cs typeface="+mn-cs"/>
+                        </a:rPr>
+                        <a:t>CSnakeGameComponent</a:t>
+                      </a:r>
+                      <a:endParaRPr lang="ko-KR" altLang="en-US" sz="1000" b="1" i="1" kern="1200" dirty="0">
+                        <a:solidFill>
+                          <a:schemeClr val="lt1"/>
+                        </a:solidFill>
+                        <a:latin typeface="+mn-lt"/>
+                        <a:ea typeface="+mn-ea"/>
+                        <a:cs typeface="+mn-cs"/>
+                      </a:endParaRPr>
+                    </a:p>
+                  </a:txBody>
+                  <a:tcPr/>
+                </a:tc>
+                <a:extLst>
+                  <a:ext uri="{0D108BD9-81ED-4DB2-BD59-A6C34878D82A}">
+                    <a16:rowId xmlns:a16="http://schemas.microsoft.com/office/drawing/2014/main" val="10000"/>
+                  </a:ext>
+                </a:extLst>
+              </a:tr>
+              <a:tr h="326814">
+                <a:tc>
+                  <a:txBody>
+                    <a:bodyPr/>
+                    <a:lstStyle/>
+                    <a:p>
+                      <a:pPr latinLnBrk="1"/>
+                      <a:r>
+                        <a:rPr lang="en-US" altLang="ko-KR" sz="1000" kern="1200" dirty="0" smtClean="0">
+                          <a:solidFill>
+                            <a:schemeClr val="dk1"/>
+                          </a:solidFill>
+                          <a:latin typeface="+mn-lt"/>
+                          <a:ea typeface="+mn-ea"/>
+                          <a:cs typeface="+mn-cs"/>
+                        </a:rPr>
+                        <a:t># </a:t>
+                      </a:r>
+                      <a:r>
+                        <a:rPr lang="en-US" altLang="ko-KR" sz="1000" kern="1200" dirty="0" err="1" smtClean="0">
+                          <a:solidFill>
+                            <a:schemeClr val="dk1"/>
+                          </a:solidFill>
+                          <a:latin typeface="+mn-lt"/>
+                          <a:ea typeface="+mn-ea"/>
+                          <a:cs typeface="+mn-cs"/>
+                        </a:rPr>
+                        <a:t>CObserver</a:t>
+                      </a:r>
+                      <a:r>
+                        <a:rPr lang="en-US" altLang="ko-KR" sz="1000" kern="1200" dirty="0" smtClean="0">
+                          <a:solidFill>
+                            <a:schemeClr val="dk1"/>
+                          </a:solidFill>
+                          <a:latin typeface="+mn-lt"/>
+                          <a:ea typeface="+mn-ea"/>
+                          <a:cs typeface="+mn-cs"/>
+                        </a:rPr>
+                        <a:t>* </a:t>
+                      </a:r>
+                      <a:r>
+                        <a:rPr lang="en-US" altLang="ko-KR" sz="1000" kern="1200" dirty="0" err="1" smtClean="0">
+                          <a:solidFill>
+                            <a:schemeClr val="dk1"/>
+                          </a:solidFill>
+                          <a:latin typeface="+mn-lt"/>
+                          <a:ea typeface="+mn-ea"/>
+                          <a:cs typeface="+mn-cs"/>
+                        </a:rPr>
+                        <a:t>m_observer</a:t>
+                      </a:r>
+                      <a:r>
+                        <a:rPr lang="en-US" altLang="ko-KR" sz="1000" kern="1200" dirty="0" smtClean="0">
+                          <a:solidFill>
+                            <a:schemeClr val="dk1"/>
+                          </a:solidFill>
+                          <a:latin typeface="+mn-lt"/>
+                          <a:ea typeface="+mn-ea"/>
+                          <a:cs typeface="+mn-cs"/>
+                        </a:rPr>
+                        <a:t>;</a:t>
+                      </a:r>
+                      <a:endParaRPr lang="ko-KR" altLang="en-US" sz="1000" kern="1200" dirty="0">
+                        <a:solidFill>
+                          <a:schemeClr val="dk1"/>
+                        </a:solidFill>
+                        <a:latin typeface="+mn-lt"/>
+                        <a:ea typeface="+mn-ea"/>
+                        <a:cs typeface="+mn-cs"/>
+                      </a:endParaRPr>
+                    </a:p>
+                  </a:txBody>
+                  <a:tcPr/>
+                </a:tc>
+                <a:extLst>
+                  <a:ext uri="{0D108BD9-81ED-4DB2-BD59-A6C34878D82A}">
+                    <a16:rowId xmlns:a16="http://schemas.microsoft.com/office/drawing/2014/main" val="10001"/>
+                  </a:ext>
+                </a:extLst>
+              </a:tr>
+              <a:tr h="618433">
+                <a:tc>
+                  <a:txBody>
+                    <a:bodyPr/>
+                    <a:lstStyle/>
+                    <a:p>
+                      <a:pPr marL="0" algn="l" defTabSz="914400" rtl="0" eaLnBrk="1" latinLnBrk="1" hangingPunct="1"/>
+                      <a:r>
+                        <a:rPr lang="en-US" altLang="ko-KR" sz="900" b="0" kern="1200" baseline="0" dirty="0" smtClean="0">
+                          <a:solidFill>
+                            <a:schemeClr val="tx1"/>
+                          </a:solidFill>
+                          <a:latin typeface="+mn-lt"/>
+                          <a:ea typeface="+mn-ea"/>
+                          <a:cs typeface="+mn-cs"/>
+                        </a:rPr>
+                        <a:t>+ </a:t>
+                      </a:r>
+                      <a:r>
+                        <a:rPr lang="en-US" altLang="ko-KR" sz="900" b="0" kern="1200" baseline="0" dirty="0" err="1" smtClean="0">
+                          <a:solidFill>
+                            <a:schemeClr val="tx1"/>
+                          </a:solidFill>
+                          <a:latin typeface="+mn-lt"/>
+                          <a:ea typeface="+mn-ea"/>
+                          <a:cs typeface="+mn-cs"/>
+                        </a:rPr>
+                        <a:t>CSnakeGameComponent</a:t>
+                      </a:r>
+                      <a:r>
+                        <a:rPr lang="en-US" altLang="ko-KR" sz="900" b="0" kern="1200" baseline="0" dirty="0" smtClean="0">
+                          <a:solidFill>
+                            <a:schemeClr val="tx1"/>
+                          </a:solidFill>
+                          <a:latin typeface="+mn-lt"/>
+                          <a:ea typeface="+mn-ea"/>
+                          <a:cs typeface="+mn-cs"/>
+                        </a:rPr>
+                        <a:t>();</a:t>
+                      </a:r>
+                    </a:p>
+                    <a:p>
+                      <a:pPr marL="0" algn="l" defTabSz="914400" rtl="0" eaLnBrk="1" latinLnBrk="1" hangingPunct="1"/>
+                      <a:r>
+                        <a:rPr lang="en-US" altLang="ko-KR" sz="900" b="0" kern="1200" baseline="0" dirty="0" smtClean="0">
+                          <a:solidFill>
+                            <a:schemeClr val="tx1"/>
+                          </a:solidFill>
+                          <a:latin typeface="+mn-lt"/>
+                          <a:ea typeface="+mn-ea"/>
+                          <a:cs typeface="+mn-cs"/>
+                        </a:rPr>
+                        <a:t>+ </a:t>
+                      </a:r>
+                      <a:r>
+                        <a:rPr lang="en-US" altLang="ko-KR" sz="900" b="0" i="1" kern="1200" baseline="0" dirty="0" smtClean="0">
+                          <a:solidFill>
+                            <a:schemeClr val="tx1"/>
+                          </a:solidFill>
+                          <a:latin typeface="+mn-lt"/>
+                          <a:ea typeface="+mn-ea"/>
+                          <a:cs typeface="+mn-cs"/>
+                        </a:rPr>
+                        <a:t>~</a:t>
+                      </a:r>
+                      <a:r>
+                        <a:rPr lang="en-US" altLang="ko-KR" sz="900" b="0" i="1" kern="1200" baseline="0" dirty="0" err="1" smtClean="0">
+                          <a:solidFill>
+                            <a:schemeClr val="tx1"/>
+                          </a:solidFill>
+                          <a:latin typeface="+mn-lt"/>
+                          <a:ea typeface="+mn-ea"/>
+                          <a:cs typeface="+mn-cs"/>
+                        </a:rPr>
+                        <a:t>CSnakeGameComponent</a:t>
+                      </a:r>
+                      <a:r>
+                        <a:rPr lang="en-US" altLang="ko-KR" sz="900" b="0" i="1" kern="1200" baseline="0" dirty="0" smtClean="0">
+                          <a:solidFill>
+                            <a:schemeClr val="tx1"/>
+                          </a:solidFill>
+                          <a:latin typeface="+mn-lt"/>
+                          <a:ea typeface="+mn-ea"/>
+                          <a:cs typeface="+mn-cs"/>
+                        </a:rPr>
+                        <a:t>();</a:t>
+                      </a:r>
+                    </a:p>
+                    <a:p>
+                      <a:pPr marL="0" algn="l" defTabSz="914400" rtl="0" eaLnBrk="1" latinLnBrk="1" hangingPunct="1"/>
+                      <a:endParaRPr lang="ko-KR" altLang="en-US" sz="900" b="0" kern="1200" baseline="0" dirty="0" smtClean="0">
+                        <a:solidFill>
+                          <a:schemeClr val="tx1"/>
+                        </a:solidFill>
+                        <a:latin typeface="+mn-lt"/>
+                        <a:ea typeface="+mn-ea"/>
+                        <a:cs typeface="+mn-cs"/>
+                      </a:endParaRPr>
+                    </a:p>
+                    <a:p>
+                      <a:pPr marL="0" algn="l" defTabSz="914400" rtl="0" eaLnBrk="1" latinLnBrk="1" hangingPunct="1"/>
+                      <a:r>
+                        <a:rPr lang="en-US" altLang="ko-KR" sz="900" b="0" kern="1200" baseline="0" dirty="0" smtClean="0">
+                          <a:solidFill>
+                            <a:schemeClr val="tx1"/>
+                          </a:solidFill>
+                          <a:latin typeface="+mn-lt"/>
+                          <a:ea typeface="+mn-ea"/>
+                          <a:cs typeface="+mn-cs"/>
+                        </a:rPr>
+                        <a:t>+ void </a:t>
+                      </a:r>
+                      <a:r>
+                        <a:rPr lang="en-US" altLang="ko-KR" sz="900" b="0" kern="1200" baseline="0" dirty="0" err="1" smtClean="0">
+                          <a:solidFill>
+                            <a:schemeClr val="tx1"/>
+                          </a:solidFill>
+                          <a:latin typeface="+mn-lt"/>
+                          <a:ea typeface="+mn-ea"/>
+                          <a:cs typeface="+mn-cs"/>
+                        </a:rPr>
+                        <a:t>NotifyObserver</a:t>
+                      </a:r>
+                      <a:r>
+                        <a:rPr lang="en-US" altLang="ko-KR" sz="900" b="0" kern="1200" baseline="0" dirty="0" smtClean="0">
+                          <a:solidFill>
+                            <a:schemeClr val="tx1"/>
+                          </a:solidFill>
+                          <a:latin typeface="+mn-lt"/>
+                          <a:ea typeface="+mn-ea"/>
+                          <a:cs typeface="+mn-cs"/>
+                        </a:rPr>
+                        <a:t>(bool </a:t>
+                      </a:r>
+                      <a:r>
+                        <a:rPr lang="en-US" altLang="ko-KR" sz="900" b="0" kern="1200" baseline="0" dirty="0" err="1" smtClean="0">
+                          <a:solidFill>
+                            <a:schemeClr val="tx1"/>
+                          </a:solidFill>
+                          <a:latin typeface="+mn-lt"/>
+                          <a:ea typeface="+mn-ea"/>
+                          <a:cs typeface="+mn-cs"/>
+                        </a:rPr>
+                        <a:t>bDraw</a:t>
+                      </a:r>
+                      <a:r>
+                        <a:rPr lang="en-US" altLang="ko-KR" sz="900" b="0" kern="1200" baseline="0" dirty="0" smtClean="0">
+                          <a:solidFill>
+                            <a:schemeClr val="tx1"/>
+                          </a:solidFill>
+                          <a:latin typeface="+mn-lt"/>
+                          <a:ea typeface="+mn-ea"/>
+                          <a:cs typeface="+mn-cs"/>
+                        </a:rPr>
+                        <a:t>=true, </a:t>
+                      </a:r>
+                      <a:r>
+                        <a:rPr lang="en-US" altLang="ko-KR" sz="900" b="0" kern="1200" baseline="0" dirty="0" err="1" smtClean="0">
+                          <a:solidFill>
+                            <a:schemeClr val="tx1"/>
+                          </a:solidFill>
+                          <a:latin typeface="+mn-lt"/>
+                          <a:ea typeface="+mn-ea"/>
+                          <a:cs typeface="+mn-cs"/>
+                        </a:rPr>
+                        <a:t>int</a:t>
+                      </a:r>
+                      <a:r>
+                        <a:rPr lang="en-US" altLang="ko-KR" sz="900" b="0" kern="1200" baseline="0" dirty="0" smtClean="0">
+                          <a:solidFill>
+                            <a:schemeClr val="tx1"/>
+                          </a:solidFill>
+                          <a:latin typeface="+mn-lt"/>
+                          <a:ea typeface="+mn-ea"/>
+                          <a:cs typeface="+mn-cs"/>
+                        </a:rPr>
+                        <a:t> </a:t>
+                      </a:r>
+                      <a:r>
+                        <a:rPr lang="en-US" altLang="ko-KR" sz="900" b="0" kern="1200" baseline="0" dirty="0" err="1" smtClean="0">
+                          <a:solidFill>
+                            <a:schemeClr val="tx1"/>
+                          </a:solidFill>
+                          <a:latin typeface="+mn-lt"/>
+                          <a:ea typeface="+mn-ea"/>
+                          <a:cs typeface="+mn-cs"/>
+                        </a:rPr>
+                        <a:t>a_nScore</a:t>
+                      </a:r>
+                      <a:r>
+                        <a:rPr lang="en-US" altLang="ko-KR" sz="900" b="0" kern="1200" baseline="0" dirty="0" smtClean="0">
+                          <a:solidFill>
+                            <a:schemeClr val="tx1"/>
+                          </a:solidFill>
+                          <a:latin typeface="+mn-lt"/>
+                          <a:ea typeface="+mn-ea"/>
+                          <a:cs typeface="+mn-cs"/>
+                        </a:rPr>
+                        <a:t>=-1);</a:t>
+                      </a:r>
+                    </a:p>
+                    <a:p>
+                      <a:pPr marL="0" algn="l" defTabSz="914400" rtl="0" eaLnBrk="1" latinLnBrk="1" hangingPunct="1"/>
+                      <a:r>
+                        <a:rPr lang="en-US" altLang="ko-KR" sz="900" b="0" kern="1200" baseline="0" dirty="0" smtClean="0">
+                          <a:solidFill>
+                            <a:schemeClr val="tx1"/>
+                          </a:solidFill>
+                          <a:latin typeface="+mn-lt"/>
+                          <a:ea typeface="+mn-ea"/>
+                          <a:cs typeface="+mn-cs"/>
+                        </a:rPr>
+                        <a:t>+ </a:t>
+                      </a:r>
+                      <a:r>
+                        <a:rPr lang="en-US" altLang="ko-KR" sz="900" b="0" i="1" kern="1200" baseline="0" dirty="0" smtClean="0">
+                          <a:solidFill>
+                            <a:schemeClr val="tx1"/>
+                          </a:solidFill>
+                          <a:latin typeface="+mn-lt"/>
+                          <a:ea typeface="+mn-ea"/>
+                          <a:cs typeface="+mn-cs"/>
+                        </a:rPr>
+                        <a:t>void </a:t>
+                      </a:r>
+                      <a:r>
+                        <a:rPr lang="en-US" altLang="ko-KR" sz="900" b="0" i="1" kern="1200" baseline="0" dirty="0" err="1" smtClean="0">
+                          <a:solidFill>
+                            <a:schemeClr val="tx1"/>
+                          </a:solidFill>
+                          <a:latin typeface="+mn-lt"/>
+                          <a:ea typeface="+mn-ea"/>
+                          <a:cs typeface="+mn-cs"/>
+                        </a:rPr>
+                        <a:t>SetObserver</a:t>
+                      </a:r>
+                      <a:r>
+                        <a:rPr lang="en-US" altLang="ko-KR" sz="900" b="0" i="1" kern="1200" baseline="0" dirty="0" smtClean="0">
+                          <a:solidFill>
+                            <a:schemeClr val="tx1"/>
+                          </a:solidFill>
+                          <a:latin typeface="+mn-lt"/>
+                          <a:ea typeface="+mn-ea"/>
+                          <a:cs typeface="+mn-cs"/>
+                        </a:rPr>
+                        <a:t>(</a:t>
+                      </a:r>
+                      <a:r>
+                        <a:rPr lang="en-US" altLang="ko-KR" sz="900" b="0" i="1" kern="1200" baseline="0" dirty="0" err="1" smtClean="0">
+                          <a:solidFill>
+                            <a:schemeClr val="tx1"/>
+                          </a:solidFill>
+                          <a:latin typeface="+mn-lt"/>
+                          <a:ea typeface="+mn-ea"/>
+                          <a:cs typeface="+mn-cs"/>
+                        </a:rPr>
+                        <a:t>CObserver</a:t>
+                      </a:r>
+                      <a:r>
+                        <a:rPr lang="en-US" altLang="ko-KR" sz="900" b="0" i="1" kern="1200" baseline="0" dirty="0" smtClean="0">
+                          <a:solidFill>
+                            <a:schemeClr val="tx1"/>
+                          </a:solidFill>
+                          <a:latin typeface="+mn-lt"/>
+                          <a:ea typeface="+mn-ea"/>
+                          <a:cs typeface="+mn-cs"/>
+                        </a:rPr>
+                        <a:t>* </a:t>
+                      </a:r>
+                      <a:r>
+                        <a:rPr lang="en-US" altLang="ko-KR" sz="900" b="0" i="1" kern="1200" baseline="0" dirty="0" err="1" smtClean="0">
+                          <a:solidFill>
+                            <a:schemeClr val="tx1"/>
+                          </a:solidFill>
+                          <a:latin typeface="+mn-lt"/>
+                          <a:ea typeface="+mn-ea"/>
+                          <a:cs typeface="+mn-cs"/>
+                        </a:rPr>
+                        <a:t>a_observer</a:t>
+                      </a:r>
+                      <a:r>
+                        <a:rPr lang="en-US" altLang="ko-KR" sz="900" b="0" i="1" kern="1200" baseline="0" dirty="0" smtClean="0">
+                          <a:solidFill>
+                            <a:schemeClr val="tx1"/>
+                          </a:solidFill>
+                          <a:latin typeface="+mn-lt"/>
+                          <a:ea typeface="+mn-ea"/>
+                          <a:cs typeface="+mn-cs"/>
+                        </a:rPr>
+                        <a:t>) = 0;</a:t>
+                      </a:r>
+                      <a:endParaRPr lang="en-US" altLang="ko-KR" sz="900" b="0" i="1" kern="1200" baseline="0" dirty="0" smtClean="0">
+                        <a:solidFill>
+                          <a:schemeClr val="tx1"/>
+                        </a:solidFill>
+                        <a:latin typeface="+mn-lt"/>
+                        <a:ea typeface="+mn-ea"/>
+                        <a:cs typeface="+mn-cs"/>
+                      </a:endParaRPr>
+                    </a:p>
+                  </a:txBody>
+                  <a:tcPr/>
+                </a:tc>
+                <a:extLst>
+                  <a:ext uri="{0D108BD9-81ED-4DB2-BD59-A6C34878D82A}">
+                    <a16:rowId xmlns:a16="http://schemas.microsoft.com/office/drawing/2014/main" val="10002"/>
+                  </a:ext>
+                </a:extLst>
+              </a:tr>
+            </a:tbl>
+          </a:graphicData>
+        </a:graphic>
+      </p:graphicFrame>
+      <p:cxnSp>
+        <p:nvCxnSpPr>
+          <p:cNvPr id="26" name="직선 화살표 연결선 25"/>
+          <p:cNvCxnSpPr/>
+          <p:nvPr/>
+        </p:nvCxnSpPr>
+        <p:spPr>
+          <a:xfrm flipH="1" flipV="1">
+            <a:off x="1687484" y="2019990"/>
+            <a:ext cx="2378" cy="413624"/>
+          </a:xfrm>
+          <a:prstGeom prst="straightConnector1">
+            <a:avLst/>
+          </a:prstGeom>
+          <a:ln w="38100">
+            <a:solidFill>
+              <a:schemeClr val="accent1"/>
+            </a:solidFill>
+            <a:tailEnd type="triangle" w="lg" len="lg"/>
+          </a:ln>
+        </p:spPr>
+        <p:style>
+          <a:lnRef idx="1">
+            <a:schemeClr val="accent1"/>
+          </a:lnRef>
+          <a:fillRef idx="0">
+            <a:schemeClr val="accent1"/>
+          </a:fillRef>
+          <a:effectRef idx="0">
+            <a:schemeClr val="accent1"/>
+          </a:effectRef>
+          <a:fontRef idx="minor">
+            <a:schemeClr val="tx1"/>
+          </a:fontRef>
+        </p:style>
+      </p:cxnSp>
+      <p:graphicFrame>
+        <p:nvGraphicFramePr>
+          <p:cNvPr id="27" name="표 26"/>
+          <p:cNvGraphicFramePr>
+            <a:graphicFrameLocks noGrp="1"/>
+          </p:cNvGraphicFramePr>
+          <p:nvPr>
+            <p:extLst>
+              <p:ext uri="{D42A27DB-BD31-4B8C-83A1-F6EECF244321}">
+                <p14:modId xmlns:p14="http://schemas.microsoft.com/office/powerpoint/2010/main" val="2934490796"/>
+              </p:ext>
+            </p:extLst>
+          </p:nvPr>
+        </p:nvGraphicFramePr>
+        <p:xfrm>
+          <a:off x="3928052" y="724018"/>
+          <a:ext cx="2647673" cy="1210734"/>
+        </p:xfrm>
+        <a:graphic>
+          <a:graphicData uri="http://schemas.openxmlformats.org/drawingml/2006/table">
+            <a:tbl>
+              <a:tblPr firstRow="1" bandRow="1">
+                <a:tableStyleId>{5C22544A-7EE6-4342-B048-85BDC9FD1C3A}</a:tableStyleId>
+              </a:tblPr>
+              <a:tblGrid>
+                <a:gridCol w="2647673">
+                  <a:extLst>
+                    <a:ext uri="{9D8B030D-6E8A-4147-A177-3AD203B41FA5}">
+                      <a16:colId xmlns:a16="http://schemas.microsoft.com/office/drawing/2014/main" val="20000"/>
+                    </a:ext>
+                  </a:extLst>
+                </a:gridCol>
+              </a:tblGrid>
+              <a:tr h="235852">
+                <a:tc>
+                  <a:txBody>
+                    <a:bodyPr/>
+                    <a:lstStyle/>
+                    <a:p>
+                      <a:pPr latinLnBrk="1"/>
+                      <a:r>
+                        <a:rPr lang="en-US" altLang="ko-KR" sz="1000" b="1" i="1" kern="1200" dirty="0" err="1" smtClean="0">
+                          <a:solidFill>
+                            <a:schemeClr val="lt1"/>
+                          </a:solidFill>
+                          <a:latin typeface="+mn-lt"/>
+                          <a:ea typeface="+mn-ea"/>
+                          <a:cs typeface="+mn-cs"/>
+                        </a:rPr>
+                        <a:t>CObserver</a:t>
+                      </a:r>
+                      <a:endParaRPr lang="ko-KR" altLang="en-US" sz="1000" b="1" i="1" kern="1200" dirty="0">
+                        <a:solidFill>
+                          <a:schemeClr val="lt1"/>
+                        </a:solidFill>
+                        <a:latin typeface="+mn-lt"/>
+                        <a:ea typeface="+mn-ea"/>
+                        <a:cs typeface="+mn-cs"/>
+                      </a:endParaRPr>
+                    </a:p>
+                  </a:txBody>
+                  <a:tcPr/>
+                </a:tc>
+                <a:extLst>
+                  <a:ext uri="{0D108BD9-81ED-4DB2-BD59-A6C34878D82A}">
+                    <a16:rowId xmlns:a16="http://schemas.microsoft.com/office/drawing/2014/main" val="10000"/>
+                  </a:ext>
+                </a:extLst>
+              </a:tr>
+              <a:tr h="326814">
+                <a:tc>
+                  <a:txBody>
+                    <a:bodyPr/>
+                    <a:lstStyle/>
+                    <a:p>
+                      <a:pPr latinLnBrk="1"/>
+                      <a:r>
+                        <a:rPr lang="en-US" altLang="ko-KR" sz="1000" kern="1200" dirty="0" smtClean="0">
+                          <a:solidFill>
+                            <a:schemeClr val="dk1"/>
+                          </a:solidFill>
+                          <a:latin typeface="+mn-lt"/>
+                          <a:ea typeface="+mn-ea"/>
+                          <a:cs typeface="+mn-cs"/>
+                        </a:rPr>
+                        <a:t># </a:t>
+                      </a:r>
+                      <a:r>
+                        <a:rPr lang="en-US" altLang="ko-KR" sz="1000" kern="1200" dirty="0" err="1" smtClean="0">
+                          <a:solidFill>
+                            <a:schemeClr val="dk1"/>
+                          </a:solidFill>
+                          <a:latin typeface="+mn-lt"/>
+                          <a:ea typeface="+mn-ea"/>
+                          <a:cs typeface="+mn-cs"/>
+                        </a:rPr>
+                        <a:t>CObserver</a:t>
+                      </a:r>
+                      <a:r>
+                        <a:rPr lang="en-US" altLang="ko-KR" sz="1000" kern="1200" dirty="0" smtClean="0">
+                          <a:solidFill>
+                            <a:schemeClr val="dk1"/>
+                          </a:solidFill>
+                          <a:latin typeface="+mn-lt"/>
+                          <a:ea typeface="+mn-ea"/>
+                          <a:cs typeface="+mn-cs"/>
+                        </a:rPr>
+                        <a:t>* </a:t>
+                      </a:r>
+                      <a:r>
+                        <a:rPr lang="en-US" altLang="ko-KR" sz="1000" kern="1200" dirty="0" err="1" smtClean="0">
+                          <a:solidFill>
+                            <a:schemeClr val="dk1"/>
+                          </a:solidFill>
+                          <a:latin typeface="+mn-lt"/>
+                          <a:ea typeface="+mn-ea"/>
+                          <a:cs typeface="+mn-cs"/>
+                        </a:rPr>
+                        <a:t>m_observer</a:t>
+                      </a:r>
+                      <a:r>
+                        <a:rPr lang="en-US" altLang="ko-KR" sz="1000" kern="1200" dirty="0" smtClean="0">
+                          <a:solidFill>
+                            <a:schemeClr val="dk1"/>
+                          </a:solidFill>
+                          <a:latin typeface="+mn-lt"/>
+                          <a:ea typeface="+mn-ea"/>
+                          <a:cs typeface="+mn-cs"/>
+                        </a:rPr>
+                        <a:t>;</a:t>
+                      </a:r>
+                      <a:endParaRPr lang="ko-KR" altLang="en-US" sz="1000" kern="1200" dirty="0">
+                        <a:solidFill>
+                          <a:schemeClr val="dk1"/>
+                        </a:solidFill>
+                        <a:latin typeface="+mn-lt"/>
+                        <a:ea typeface="+mn-ea"/>
+                        <a:cs typeface="+mn-cs"/>
+                      </a:endParaRPr>
+                    </a:p>
+                  </a:txBody>
+                  <a:tcPr/>
+                </a:tc>
+                <a:extLst>
+                  <a:ext uri="{0D108BD9-81ED-4DB2-BD59-A6C34878D82A}">
+                    <a16:rowId xmlns:a16="http://schemas.microsoft.com/office/drawing/2014/main" val="10001"/>
+                  </a:ext>
+                </a:extLst>
+              </a:tr>
+              <a:tr h="618433">
+                <a:tc>
+                  <a:txBody>
+                    <a:bodyPr/>
+                    <a:lstStyle/>
+                    <a:p>
+                      <a:pPr marL="0" algn="l" defTabSz="914400" rtl="0" eaLnBrk="1" latinLnBrk="1" hangingPunct="1"/>
+                      <a:r>
+                        <a:rPr lang="en-US" altLang="ko-KR" sz="900" b="0" kern="1200" baseline="0" dirty="0" smtClean="0">
+                          <a:solidFill>
+                            <a:schemeClr val="tx1"/>
+                          </a:solidFill>
+                          <a:latin typeface="+mn-lt"/>
+                          <a:ea typeface="+mn-ea"/>
+                          <a:cs typeface="+mn-cs"/>
+                        </a:rPr>
+                        <a:t>+ </a:t>
+                      </a:r>
+                      <a:r>
+                        <a:rPr lang="en-US" altLang="ko-KR" sz="900" b="0" kern="1200" baseline="0" dirty="0" err="1" smtClean="0">
+                          <a:solidFill>
+                            <a:schemeClr val="tx1"/>
+                          </a:solidFill>
+                          <a:latin typeface="+mn-lt"/>
+                          <a:ea typeface="+mn-ea"/>
+                          <a:cs typeface="+mn-cs"/>
+                        </a:rPr>
+                        <a:t>CObserver</a:t>
+                      </a:r>
+                      <a:r>
+                        <a:rPr lang="en-US" altLang="ko-KR" sz="900" b="0" kern="1200" baseline="0" dirty="0" smtClean="0">
+                          <a:solidFill>
+                            <a:schemeClr val="tx1"/>
+                          </a:solidFill>
+                          <a:latin typeface="+mn-lt"/>
+                          <a:ea typeface="+mn-ea"/>
+                          <a:cs typeface="+mn-cs"/>
+                        </a:rPr>
+                        <a:t>();</a:t>
+                      </a:r>
+                    </a:p>
+                    <a:p>
+                      <a:pPr marL="0" algn="l" defTabSz="914400" rtl="0" eaLnBrk="1" latinLnBrk="1" hangingPunct="1"/>
+                      <a:r>
+                        <a:rPr lang="en-US" altLang="ko-KR" sz="900" b="0" i="1" kern="1200" baseline="0" dirty="0" smtClean="0">
+                          <a:solidFill>
+                            <a:schemeClr val="tx1"/>
+                          </a:solidFill>
+                          <a:latin typeface="+mn-lt"/>
+                          <a:ea typeface="+mn-ea"/>
+                          <a:cs typeface="+mn-cs"/>
+                        </a:rPr>
+                        <a:t>+ ~</a:t>
+                      </a:r>
+                      <a:r>
+                        <a:rPr lang="en-US" altLang="ko-KR" sz="900" b="0" i="1" kern="1200" baseline="0" dirty="0" err="1" smtClean="0">
+                          <a:solidFill>
+                            <a:schemeClr val="tx1"/>
+                          </a:solidFill>
+                          <a:latin typeface="+mn-lt"/>
+                          <a:ea typeface="+mn-ea"/>
+                          <a:cs typeface="+mn-cs"/>
+                        </a:rPr>
+                        <a:t>CObserver</a:t>
+                      </a:r>
+                      <a:r>
+                        <a:rPr lang="en-US" altLang="ko-KR" sz="900" b="0" i="1" kern="1200" baseline="0" dirty="0" smtClean="0">
+                          <a:solidFill>
+                            <a:schemeClr val="tx1"/>
+                          </a:solidFill>
+                          <a:latin typeface="+mn-lt"/>
+                          <a:ea typeface="+mn-ea"/>
+                          <a:cs typeface="+mn-cs"/>
+                        </a:rPr>
+                        <a:t>();</a:t>
+                      </a:r>
+                    </a:p>
+                    <a:p>
+                      <a:pPr marL="0" algn="l" defTabSz="914400" rtl="0" eaLnBrk="1" latinLnBrk="1" hangingPunct="1"/>
+                      <a:r>
+                        <a:rPr lang="en-US" altLang="ko-KR" sz="900" b="0" i="1" kern="1200" baseline="0" dirty="0" smtClean="0">
+                          <a:solidFill>
+                            <a:schemeClr val="tx1"/>
+                          </a:solidFill>
+                          <a:latin typeface="+mn-lt"/>
+                          <a:ea typeface="+mn-ea"/>
+                          <a:cs typeface="+mn-cs"/>
+                        </a:rPr>
+                        <a:t>+ void </a:t>
+                      </a:r>
+                      <a:r>
+                        <a:rPr lang="en-US" altLang="ko-KR" sz="900" b="0" i="1" kern="1200" baseline="0" dirty="0" err="1" smtClean="0">
+                          <a:solidFill>
+                            <a:schemeClr val="tx1"/>
+                          </a:solidFill>
+                          <a:latin typeface="+mn-lt"/>
+                          <a:ea typeface="+mn-ea"/>
+                          <a:cs typeface="+mn-cs"/>
+                        </a:rPr>
+                        <a:t>UpdateUI</a:t>
+                      </a:r>
+                      <a:r>
+                        <a:rPr lang="en-US" altLang="ko-KR" sz="900" b="0" i="1" kern="1200" baseline="0" dirty="0" smtClean="0">
+                          <a:solidFill>
+                            <a:schemeClr val="tx1"/>
+                          </a:solidFill>
+                          <a:latin typeface="+mn-lt"/>
+                          <a:ea typeface="+mn-ea"/>
+                          <a:cs typeface="+mn-cs"/>
+                        </a:rPr>
+                        <a:t>()=0;</a:t>
+                      </a:r>
+                    </a:p>
+                    <a:p>
+                      <a:pPr marL="0" algn="l" defTabSz="914400" rtl="0" eaLnBrk="1" latinLnBrk="1" hangingPunct="1"/>
+                      <a:r>
+                        <a:rPr lang="en-US" altLang="ko-KR" sz="900" b="0" i="1" kern="1200" baseline="0" dirty="0" smtClean="0">
+                          <a:solidFill>
+                            <a:schemeClr val="tx1"/>
+                          </a:solidFill>
+                          <a:latin typeface="+mn-lt"/>
+                          <a:ea typeface="+mn-ea"/>
+                          <a:cs typeface="+mn-cs"/>
+                        </a:rPr>
+                        <a:t>+ void </a:t>
+                      </a:r>
+                      <a:r>
+                        <a:rPr lang="en-US" altLang="ko-KR" sz="900" b="0" i="1" kern="1200" baseline="0" dirty="0" err="1" smtClean="0">
+                          <a:solidFill>
+                            <a:schemeClr val="tx1"/>
+                          </a:solidFill>
+                          <a:latin typeface="+mn-lt"/>
+                          <a:ea typeface="+mn-ea"/>
+                          <a:cs typeface="+mn-cs"/>
+                        </a:rPr>
+                        <a:t>UpdateScore</a:t>
+                      </a:r>
+                      <a:r>
+                        <a:rPr lang="en-US" altLang="ko-KR" sz="900" b="0" i="1" kern="1200" baseline="0" dirty="0" smtClean="0">
+                          <a:solidFill>
+                            <a:schemeClr val="tx1"/>
+                          </a:solidFill>
+                          <a:latin typeface="+mn-lt"/>
+                          <a:ea typeface="+mn-ea"/>
+                          <a:cs typeface="+mn-cs"/>
+                        </a:rPr>
+                        <a:t>(</a:t>
+                      </a:r>
+                      <a:r>
+                        <a:rPr lang="en-US" altLang="ko-KR" sz="900" b="0" i="1" kern="1200" baseline="0" dirty="0" err="1" smtClean="0">
+                          <a:solidFill>
+                            <a:schemeClr val="tx1"/>
+                          </a:solidFill>
+                          <a:latin typeface="+mn-lt"/>
+                          <a:ea typeface="+mn-ea"/>
+                          <a:cs typeface="+mn-cs"/>
+                        </a:rPr>
+                        <a:t>int</a:t>
+                      </a:r>
+                      <a:r>
+                        <a:rPr lang="en-US" altLang="ko-KR" sz="900" b="0" i="1" kern="1200" baseline="0" dirty="0" smtClean="0">
+                          <a:solidFill>
+                            <a:schemeClr val="tx1"/>
+                          </a:solidFill>
+                          <a:latin typeface="+mn-lt"/>
+                          <a:ea typeface="+mn-ea"/>
+                          <a:cs typeface="+mn-cs"/>
+                        </a:rPr>
+                        <a:t> </a:t>
+                      </a:r>
+                      <a:r>
+                        <a:rPr lang="en-US" altLang="ko-KR" sz="900" b="0" i="1" kern="1200" baseline="0" dirty="0" err="1" smtClean="0">
+                          <a:solidFill>
+                            <a:schemeClr val="tx1"/>
+                          </a:solidFill>
+                          <a:latin typeface="+mn-lt"/>
+                          <a:ea typeface="+mn-ea"/>
+                          <a:cs typeface="+mn-cs"/>
+                        </a:rPr>
+                        <a:t>a_nScore</a:t>
+                      </a:r>
+                      <a:r>
+                        <a:rPr lang="en-US" altLang="ko-KR" sz="900" b="0" i="1" kern="1200" baseline="0" dirty="0" smtClean="0">
+                          <a:solidFill>
+                            <a:schemeClr val="tx1"/>
+                          </a:solidFill>
+                          <a:latin typeface="+mn-lt"/>
+                          <a:ea typeface="+mn-ea"/>
+                          <a:cs typeface="+mn-cs"/>
+                        </a:rPr>
+                        <a:t>)=0;</a:t>
+                      </a:r>
+                      <a:endParaRPr lang="en-US" altLang="ko-KR" sz="900" b="0" i="1" kern="1200" baseline="0" dirty="0" smtClean="0">
+                        <a:solidFill>
+                          <a:schemeClr val="tx1"/>
+                        </a:solidFill>
+                        <a:latin typeface="+mn-lt"/>
+                        <a:ea typeface="+mn-ea"/>
+                        <a:cs typeface="+mn-cs"/>
+                      </a:endParaRPr>
+                    </a:p>
+                  </a:txBody>
+                  <a:tcPr/>
+                </a:tc>
+                <a:extLst>
+                  <a:ext uri="{0D108BD9-81ED-4DB2-BD59-A6C34878D82A}">
+                    <a16:rowId xmlns:a16="http://schemas.microsoft.com/office/drawing/2014/main" val="10002"/>
+                  </a:ext>
+                </a:extLst>
+              </a:tr>
+            </a:tbl>
+          </a:graphicData>
+        </a:graphic>
+      </p:graphicFrame>
+      <p:cxnSp>
+        <p:nvCxnSpPr>
+          <p:cNvPr id="38" name="직선 화살표 연결선 37"/>
+          <p:cNvCxnSpPr/>
+          <p:nvPr/>
+        </p:nvCxnSpPr>
+        <p:spPr>
+          <a:xfrm>
+            <a:off x="2028305" y="856211"/>
+            <a:ext cx="1899747" cy="8314"/>
+          </a:xfrm>
+          <a:prstGeom prst="straightConnector1">
+            <a:avLst/>
+          </a:prstGeom>
+          <a:ln>
+            <a:tailEnd type="arrow" w="lg" len="lg"/>
+          </a:ln>
+        </p:spPr>
+        <p:style>
+          <a:lnRef idx="1">
+            <a:schemeClr val="accent1"/>
+          </a:lnRef>
+          <a:fillRef idx="0">
+            <a:schemeClr val="accent1"/>
+          </a:fillRef>
+          <a:effectRef idx="0">
+            <a:schemeClr val="accent1"/>
+          </a:effectRef>
+          <a:fontRef idx="minor">
+            <a:schemeClr val="tx1"/>
+          </a:fontRef>
+        </p:style>
+      </p:cxnSp>
+    </p:spTree>
+    <p:extLst>
+      <p:ext uri="{BB962C8B-B14F-4D97-AF65-F5344CB8AC3E}">
+        <p14:creationId xmlns:p14="http://schemas.microsoft.com/office/powerpoint/2010/main" val="2869492527"/>
       </p:ext>
     </p:extLst>
   </p:cSld>

</xml_diff>